<commit_message>
worked on the git presentation powerpoint
</commit_message>
<xml_diff>
--- a/git_presentation/git_presentation.pptx
+++ b/git_presentation/git_presentation.pptx
@@ -6,6 +6,26 @@
   </p:sldMasterIdLst>
   <p:sldIdLst>
     <p:sldId id="256" r:id="rId2"/>
+    <p:sldId id="257" r:id="rId3"/>
+    <p:sldId id="258" r:id="rId4"/>
+    <p:sldId id="259" r:id="rId5"/>
+    <p:sldId id="260" r:id="rId6"/>
+    <p:sldId id="261" r:id="rId7"/>
+    <p:sldId id="262" r:id="rId8"/>
+    <p:sldId id="263" r:id="rId9"/>
+    <p:sldId id="264" r:id="rId10"/>
+    <p:sldId id="265" r:id="rId11"/>
+    <p:sldId id="266" r:id="rId12"/>
+    <p:sldId id="267" r:id="rId13"/>
+    <p:sldId id="268" r:id="rId14"/>
+    <p:sldId id="269" r:id="rId15"/>
+    <p:sldId id="270" r:id="rId16"/>
+    <p:sldId id="271" r:id="rId17"/>
+    <p:sldId id="272" r:id="rId18"/>
+    <p:sldId id="273" r:id="rId19"/>
+    <p:sldId id="274" r:id="rId20"/>
+    <p:sldId id="275" r:id="rId21"/>
+    <p:sldId id="276" r:id="rId22"/>
   </p:sldIdLst>
   <p:sldSz cx="12192000" cy="6858000"/>
   <p:notesSz cx="6858000" cy="9144000"/>
@@ -238,7 +258,7 @@
           <a:p>
             <a:fld id="{7E3245CE-4719-4FC9-B907-BD8BBC34E05C}" type="datetimeFigureOut">
               <a:rPr lang="en-US" smtClean="0"/>
-              <a:t>9/20/2015</a:t>
+              <a:t>9/21/15</a:t>
             </a:fld>
             <a:endParaRPr lang="en-US"/>
           </a:p>
@@ -408,7 +428,7 @@
           <a:p>
             <a:fld id="{7E3245CE-4719-4FC9-B907-BD8BBC34E05C}" type="datetimeFigureOut">
               <a:rPr lang="en-US" smtClean="0"/>
-              <a:t>9/20/2015</a:t>
+              <a:t>9/21/15</a:t>
             </a:fld>
             <a:endParaRPr lang="en-US"/>
           </a:p>
@@ -588,7 +608,7 @@
           <a:p>
             <a:fld id="{7E3245CE-4719-4FC9-B907-BD8BBC34E05C}" type="datetimeFigureOut">
               <a:rPr lang="en-US" smtClean="0"/>
-              <a:t>9/20/2015</a:t>
+              <a:t>9/21/15</a:t>
             </a:fld>
             <a:endParaRPr lang="en-US"/>
           </a:p>
@@ -758,7 +778,7 @@
           <a:p>
             <a:fld id="{7E3245CE-4719-4FC9-B907-BD8BBC34E05C}" type="datetimeFigureOut">
               <a:rPr lang="en-US" smtClean="0"/>
-              <a:t>9/20/2015</a:t>
+              <a:t>9/21/15</a:t>
             </a:fld>
             <a:endParaRPr lang="en-US"/>
           </a:p>
@@ -1004,7 +1024,7 @@
           <a:p>
             <a:fld id="{7E3245CE-4719-4FC9-B907-BD8BBC34E05C}" type="datetimeFigureOut">
               <a:rPr lang="en-US" smtClean="0"/>
-              <a:t>9/20/2015</a:t>
+              <a:t>9/21/15</a:t>
             </a:fld>
             <a:endParaRPr lang="en-US"/>
           </a:p>
@@ -1236,7 +1256,7 @@
           <a:p>
             <a:fld id="{7E3245CE-4719-4FC9-B907-BD8BBC34E05C}" type="datetimeFigureOut">
               <a:rPr lang="en-US" smtClean="0"/>
-              <a:t>9/20/2015</a:t>
+              <a:t>9/21/15</a:t>
             </a:fld>
             <a:endParaRPr lang="en-US"/>
           </a:p>
@@ -1603,7 +1623,7 @@
           <a:p>
             <a:fld id="{7E3245CE-4719-4FC9-B907-BD8BBC34E05C}" type="datetimeFigureOut">
               <a:rPr lang="en-US" smtClean="0"/>
-              <a:t>9/20/2015</a:t>
+              <a:t>9/21/15</a:t>
             </a:fld>
             <a:endParaRPr lang="en-US"/>
           </a:p>
@@ -1721,7 +1741,7 @@
           <a:p>
             <a:fld id="{7E3245CE-4719-4FC9-B907-BD8BBC34E05C}" type="datetimeFigureOut">
               <a:rPr lang="en-US" smtClean="0"/>
-              <a:t>9/20/2015</a:t>
+              <a:t>9/21/15</a:t>
             </a:fld>
             <a:endParaRPr lang="en-US"/>
           </a:p>
@@ -1816,7 +1836,7 @@
           <a:p>
             <a:fld id="{7E3245CE-4719-4FC9-B907-BD8BBC34E05C}" type="datetimeFigureOut">
               <a:rPr lang="en-US" smtClean="0"/>
-              <a:t>9/20/2015</a:t>
+              <a:t>9/21/15</a:t>
             </a:fld>
             <a:endParaRPr lang="en-US"/>
           </a:p>
@@ -2093,7 +2113,7 @@
           <a:p>
             <a:fld id="{7E3245CE-4719-4FC9-B907-BD8BBC34E05C}" type="datetimeFigureOut">
               <a:rPr lang="en-US" smtClean="0"/>
-              <a:t>9/20/2015</a:t>
+              <a:t>9/21/15</a:t>
             </a:fld>
             <a:endParaRPr lang="en-US"/>
           </a:p>
@@ -2346,7 +2366,7 @@
           <a:p>
             <a:fld id="{7E3245CE-4719-4FC9-B907-BD8BBC34E05C}" type="datetimeFigureOut">
               <a:rPr lang="en-US" smtClean="0"/>
-              <a:t>9/20/2015</a:t>
+              <a:t>9/21/15</a:t>
             </a:fld>
             <a:endParaRPr lang="en-US"/>
           </a:p>
@@ -2559,7 +2579,7 @@
           <a:p>
             <a:fld id="{7E3245CE-4719-4FC9-B907-BD8BBC34E05C}" type="datetimeFigureOut">
               <a:rPr lang="en-US" smtClean="0"/>
-              <a:t>9/20/2015</a:t>
+              <a:t>9/21/15</a:t>
             </a:fld>
             <a:endParaRPr lang="en-US"/>
           </a:p>
@@ -2976,10 +2996,34 @@
         </p:nvSpPr>
         <p:spPr/>
         <p:txBody>
-          <a:bodyPr/>
-          <a:lstStyle/>
-          <a:p>
-            <a:endParaRPr lang="en-US"/>
+          <a:bodyPr>
+            <a:normAutofit fontScale="90000"/>
+          </a:bodyPr>
+          <a:lstStyle/>
+          <a:p>
+            <a:r>
+              <a:rPr lang="en-US" sz="6700" dirty="0" smtClean="0"/>
+              <a:t>Version Control </a:t>
+            </a:r>
+            <a:br>
+              <a:rPr lang="en-US" sz="6700" dirty="0" smtClean="0"/>
+            </a:br>
+            <a:r>
+              <a:rPr lang="en-US" sz="5300" dirty="0" smtClean="0"/>
+              <a:t>and</a:t>
+            </a:r>
+            <a:r>
+              <a:rPr lang="en-US" dirty="0" smtClean="0"/>
+              <a:t/>
+            </a:r>
+            <a:br>
+              <a:rPr lang="en-US" dirty="0" smtClean="0"/>
+            </a:br>
+            <a:r>
+              <a:rPr lang="en-US" sz="6700" dirty="0" err="1" smtClean="0"/>
+              <a:t>Git</a:t>
+            </a:r>
+            <a:endParaRPr lang="en-US" sz="6700" dirty="0"/>
           </a:p>
         </p:txBody>
       </p:sp>
@@ -2993,12 +3037,21 @@
             <p:ph type="subTitle" idx="1"/>
           </p:nvPr>
         </p:nvSpPr>
-        <p:spPr/>
-        <p:txBody>
-          <a:bodyPr/>
-          <a:lstStyle/>
-          <a:p>
-            <a:endParaRPr lang="en-US"/>
+        <p:spPr>
+          <a:xfrm>
+            <a:off x="1524000" y="4015803"/>
+            <a:ext cx="9144000" cy="1655762"/>
+          </a:xfrm>
+        </p:spPr>
+        <p:txBody>
+          <a:bodyPr/>
+          <a:lstStyle/>
+          <a:p>
+            <a:r>
+              <a:rPr lang="en-US" dirty="0" smtClean="0"/>
+              <a:t>By: James Milam</a:t>
+            </a:r>
+            <a:endParaRPr lang="en-US" dirty="0"/>
           </a:p>
         </p:txBody>
       </p:sp>
@@ -3006,6 +3059,2485 @@
     <p:extLst>
       <p:ext uri="{BB962C8B-B14F-4D97-AF65-F5344CB8AC3E}">
         <p14:creationId xmlns:p14="http://schemas.microsoft.com/office/powerpoint/2010/main" val="2546499725"/>
+      </p:ext>
+    </p:extLst>
+  </p:cSld>
+  <p:clrMapOvr>
+    <a:masterClrMapping/>
+  </p:clrMapOvr>
+  <p:timing>
+    <p:tnLst>
+      <p:par>
+        <p:cTn xmlns:p14="http://schemas.microsoft.com/office/powerpoint/2010/main" id="1" dur="indefinite" restart="never" nodeType="tmRoot"/>
+      </p:par>
+    </p:tnLst>
+  </p:timing>
+</p:sld>
+</file>
+
+<file path=ppt/slides/slide10.xml><?xml version="1.0" encoding="utf-8"?>
+<p:sld xmlns:a="http://schemas.openxmlformats.org/drawingml/2006/main" xmlns:r="http://schemas.openxmlformats.org/officeDocument/2006/relationships" xmlns:p="http://schemas.openxmlformats.org/presentationml/2006/main">
+  <p:cSld>
+    <p:spTree>
+      <p:nvGrpSpPr>
+        <p:cNvPr id="1" name=""/>
+        <p:cNvGrpSpPr/>
+        <p:nvPr/>
+      </p:nvGrpSpPr>
+      <p:grpSpPr>
+        <a:xfrm>
+          <a:off x="0" y="0"/>
+          <a:ext cx="0" cy="0"/>
+          <a:chOff x="0" y="0"/>
+          <a:chExt cx="0" cy="0"/>
+        </a:xfrm>
+      </p:grpSpPr>
+      <p:sp>
+        <p:nvSpPr>
+          <p:cNvPr id="2" name="Title 1"/>
+          <p:cNvSpPr>
+            <a:spLocks noGrp="1"/>
+          </p:cNvSpPr>
+          <p:nvPr>
+            <p:ph type="title"/>
+          </p:nvPr>
+        </p:nvSpPr>
+        <p:spPr/>
+        <p:txBody>
+          <a:bodyPr/>
+          <a:lstStyle/>
+          <a:p>
+            <a:r>
+              <a:rPr lang="en-US" dirty="0" err="1" smtClean="0"/>
+              <a:t>Git</a:t>
+            </a:r>
+            <a:r>
+              <a:rPr lang="en-US" dirty="0" smtClean="0"/>
+              <a:t> Conceptually Save vs. Commit</a:t>
+            </a:r>
+            <a:endParaRPr lang="en-US" dirty="0"/>
+          </a:p>
+        </p:txBody>
+      </p:sp>
+      <p:sp>
+        <p:nvSpPr>
+          <p:cNvPr id="3" name="Content Placeholder 2"/>
+          <p:cNvSpPr>
+            <a:spLocks noGrp="1"/>
+          </p:cNvSpPr>
+          <p:nvPr>
+            <p:ph idx="1"/>
+          </p:nvPr>
+        </p:nvSpPr>
+        <p:spPr/>
+        <p:txBody>
+          <a:bodyPr/>
+          <a:lstStyle/>
+          <a:p>
+            <a:endParaRPr lang="en-US"/>
+          </a:p>
+        </p:txBody>
+      </p:sp>
+    </p:spTree>
+    <p:extLst>
+      <p:ext uri="{BB962C8B-B14F-4D97-AF65-F5344CB8AC3E}">
+        <p14:creationId xmlns:p14="http://schemas.microsoft.com/office/powerpoint/2010/main" val="2275853731"/>
+      </p:ext>
+    </p:extLst>
+  </p:cSld>
+  <p:clrMapOvr>
+    <a:masterClrMapping/>
+  </p:clrMapOvr>
+</p:sld>
+</file>
+
+<file path=ppt/slides/slide11.xml><?xml version="1.0" encoding="utf-8"?>
+<p:sld xmlns:a="http://schemas.openxmlformats.org/drawingml/2006/main" xmlns:r="http://schemas.openxmlformats.org/officeDocument/2006/relationships" xmlns:p="http://schemas.openxmlformats.org/presentationml/2006/main">
+  <p:cSld>
+    <p:spTree>
+      <p:nvGrpSpPr>
+        <p:cNvPr id="1" name=""/>
+        <p:cNvGrpSpPr/>
+        <p:nvPr/>
+      </p:nvGrpSpPr>
+      <p:grpSpPr>
+        <a:xfrm>
+          <a:off x="0" y="0"/>
+          <a:ext cx="0" cy="0"/>
+          <a:chOff x="0" y="0"/>
+          <a:chExt cx="0" cy="0"/>
+        </a:xfrm>
+      </p:grpSpPr>
+      <p:sp>
+        <p:nvSpPr>
+          <p:cNvPr id="2" name="Title 1"/>
+          <p:cNvSpPr>
+            <a:spLocks noGrp="1"/>
+          </p:cNvSpPr>
+          <p:nvPr>
+            <p:ph type="title"/>
+          </p:nvPr>
+        </p:nvSpPr>
+        <p:spPr/>
+        <p:txBody>
+          <a:bodyPr/>
+          <a:lstStyle/>
+          <a:p>
+            <a:r>
+              <a:rPr lang="en-US" dirty="0" err="1" smtClean="0"/>
+              <a:t>Git</a:t>
+            </a:r>
+            <a:r>
+              <a:rPr lang="en-US" dirty="0" smtClean="0"/>
+              <a:t> Conceptually Commit Staging Process</a:t>
+            </a:r>
+            <a:endParaRPr lang="en-US" dirty="0"/>
+          </a:p>
+        </p:txBody>
+      </p:sp>
+      <p:sp>
+        <p:nvSpPr>
+          <p:cNvPr id="3" name="Content Placeholder 2"/>
+          <p:cNvSpPr>
+            <a:spLocks noGrp="1"/>
+          </p:cNvSpPr>
+          <p:nvPr>
+            <p:ph idx="1"/>
+          </p:nvPr>
+        </p:nvSpPr>
+        <p:spPr/>
+        <p:txBody>
+          <a:bodyPr/>
+          <a:lstStyle/>
+          <a:p>
+            <a:endParaRPr lang="en-US"/>
+          </a:p>
+        </p:txBody>
+      </p:sp>
+    </p:spTree>
+    <p:extLst>
+      <p:ext uri="{BB962C8B-B14F-4D97-AF65-F5344CB8AC3E}">
+        <p14:creationId xmlns:p14="http://schemas.microsoft.com/office/powerpoint/2010/main" val="2321026531"/>
+      </p:ext>
+    </p:extLst>
+  </p:cSld>
+  <p:clrMapOvr>
+    <a:masterClrMapping/>
+  </p:clrMapOvr>
+</p:sld>
+</file>
+
+<file path=ppt/slides/slide12.xml><?xml version="1.0" encoding="utf-8"?>
+<p:sld xmlns:a="http://schemas.openxmlformats.org/drawingml/2006/main" xmlns:r="http://schemas.openxmlformats.org/officeDocument/2006/relationships" xmlns:p="http://schemas.openxmlformats.org/presentationml/2006/main">
+  <p:cSld>
+    <p:spTree>
+      <p:nvGrpSpPr>
+        <p:cNvPr id="1" name=""/>
+        <p:cNvGrpSpPr/>
+        <p:nvPr/>
+      </p:nvGrpSpPr>
+      <p:grpSpPr>
+        <a:xfrm>
+          <a:off x="0" y="0"/>
+          <a:ext cx="0" cy="0"/>
+          <a:chOff x="0" y="0"/>
+          <a:chExt cx="0" cy="0"/>
+        </a:xfrm>
+      </p:grpSpPr>
+      <p:sp>
+        <p:nvSpPr>
+          <p:cNvPr id="2" name="Title 1"/>
+          <p:cNvSpPr>
+            <a:spLocks noGrp="1"/>
+          </p:cNvSpPr>
+          <p:nvPr>
+            <p:ph type="title"/>
+          </p:nvPr>
+        </p:nvSpPr>
+        <p:spPr/>
+        <p:txBody>
+          <a:bodyPr/>
+          <a:lstStyle/>
+          <a:p>
+            <a:r>
+              <a:rPr lang="en-US" dirty="0" err="1" smtClean="0"/>
+              <a:t>Git</a:t>
+            </a:r>
+            <a:r>
+              <a:rPr lang="en-US" dirty="0" smtClean="0"/>
+              <a:t> Conceptually Push/Pull</a:t>
+            </a:r>
+            <a:endParaRPr lang="en-US" dirty="0"/>
+          </a:p>
+        </p:txBody>
+      </p:sp>
+      <p:sp>
+        <p:nvSpPr>
+          <p:cNvPr id="3" name="Content Placeholder 2"/>
+          <p:cNvSpPr>
+            <a:spLocks noGrp="1"/>
+          </p:cNvSpPr>
+          <p:nvPr>
+            <p:ph idx="1"/>
+          </p:nvPr>
+        </p:nvSpPr>
+        <p:spPr/>
+        <p:txBody>
+          <a:bodyPr/>
+          <a:lstStyle/>
+          <a:p>
+            <a:endParaRPr lang="en-US"/>
+          </a:p>
+        </p:txBody>
+      </p:sp>
+    </p:spTree>
+    <p:extLst>
+      <p:ext uri="{BB962C8B-B14F-4D97-AF65-F5344CB8AC3E}">
+        <p14:creationId xmlns:p14="http://schemas.microsoft.com/office/powerpoint/2010/main" val="309397693"/>
+      </p:ext>
+    </p:extLst>
+  </p:cSld>
+  <p:clrMapOvr>
+    <a:masterClrMapping/>
+  </p:clrMapOvr>
+</p:sld>
+</file>
+
+<file path=ppt/slides/slide13.xml><?xml version="1.0" encoding="utf-8"?>
+<p:sld xmlns:a="http://schemas.openxmlformats.org/drawingml/2006/main" xmlns:r="http://schemas.openxmlformats.org/officeDocument/2006/relationships" xmlns:p="http://schemas.openxmlformats.org/presentationml/2006/main">
+  <p:cSld>
+    <p:spTree>
+      <p:nvGrpSpPr>
+        <p:cNvPr id="1" name=""/>
+        <p:cNvGrpSpPr/>
+        <p:nvPr/>
+      </p:nvGrpSpPr>
+      <p:grpSpPr>
+        <a:xfrm>
+          <a:off x="0" y="0"/>
+          <a:ext cx="0" cy="0"/>
+          <a:chOff x="0" y="0"/>
+          <a:chExt cx="0" cy="0"/>
+        </a:xfrm>
+      </p:grpSpPr>
+      <p:sp>
+        <p:nvSpPr>
+          <p:cNvPr id="2" name="Title 1"/>
+          <p:cNvSpPr>
+            <a:spLocks noGrp="1"/>
+          </p:cNvSpPr>
+          <p:nvPr>
+            <p:ph type="title"/>
+          </p:nvPr>
+        </p:nvSpPr>
+        <p:spPr/>
+        <p:txBody>
+          <a:bodyPr/>
+          <a:lstStyle/>
+          <a:p>
+            <a:r>
+              <a:rPr lang="en-US" dirty="0" err="1" smtClean="0"/>
+              <a:t>Git</a:t>
+            </a:r>
+            <a:r>
+              <a:rPr lang="en-US" dirty="0" smtClean="0"/>
+              <a:t> Commands Obtain/ </a:t>
+            </a:r>
+            <a:r>
+              <a:rPr lang="en-US" dirty="0" err="1" smtClean="0"/>
+              <a:t>git</a:t>
+            </a:r>
+            <a:r>
+              <a:rPr lang="en-US" dirty="0" smtClean="0"/>
+              <a:t> clone</a:t>
+            </a:r>
+            <a:endParaRPr lang="en-US" dirty="0"/>
+          </a:p>
+        </p:txBody>
+      </p:sp>
+      <p:sp>
+        <p:nvSpPr>
+          <p:cNvPr id="3" name="Content Placeholder 2"/>
+          <p:cNvSpPr>
+            <a:spLocks noGrp="1"/>
+          </p:cNvSpPr>
+          <p:nvPr>
+            <p:ph idx="1"/>
+          </p:nvPr>
+        </p:nvSpPr>
+        <p:spPr/>
+        <p:txBody>
+          <a:bodyPr/>
+          <a:lstStyle/>
+          <a:p>
+            <a:endParaRPr lang="en-US"/>
+          </a:p>
+        </p:txBody>
+      </p:sp>
+    </p:spTree>
+    <p:extLst>
+      <p:ext uri="{BB962C8B-B14F-4D97-AF65-F5344CB8AC3E}">
+        <p14:creationId xmlns:p14="http://schemas.microsoft.com/office/powerpoint/2010/main" val="814980747"/>
+      </p:ext>
+    </p:extLst>
+  </p:cSld>
+  <p:clrMapOvr>
+    <a:masterClrMapping/>
+  </p:clrMapOvr>
+</p:sld>
+</file>
+
+<file path=ppt/slides/slide14.xml><?xml version="1.0" encoding="utf-8"?>
+<p:sld xmlns:a="http://schemas.openxmlformats.org/drawingml/2006/main" xmlns:r="http://schemas.openxmlformats.org/officeDocument/2006/relationships" xmlns:p="http://schemas.openxmlformats.org/presentationml/2006/main">
+  <p:cSld>
+    <p:spTree>
+      <p:nvGrpSpPr>
+        <p:cNvPr id="1" name=""/>
+        <p:cNvGrpSpPr/>
+        <p:nvPr/>
+      </p:nvGrpSpPr>
+      <p:grpSpPr>
+        <a:xfrm>
+          <a:off x="0" y="0"/>
+          <a:ext cx="0" cy="0"/>
+          <a:chOff x="0" y="0"/>
+          <a:chExt cx="0" cy="0"/>
+        </a:xfrm>
+      </p:grpSpPr>
+      <p:sp>
+        <p:nvSpPr>
+          <p:cNvPr id="2" name="Title 1"/>
+          <p:cNvSpPr>
+            <a:spLocks noGrp="1"/>
+          </p:cNvSpPr>
+          <p:nvPr>
+            <p:ph type="title"/>
+          </p:nvPr>
+        </p:nvSpPr>
+        <p:spPr/>
+        <p:txBody>
+          <a:bodyPr/>
+          <a:lstStyle/>
+          <a:p>
+            <a:r>
+              <a:rPr lang="en-US" dirty="0" err="1" smtClean="0"/>
+              <a:t>Git</a:t>
+            </a:r>
+            <a:r>
+              <a:rPr lang="en-US" dirty="0" smtClean="0"/>
+              <a:t> push/pull</a:t>
+            </a:r>
+            <a:endParaRPr lang="en-US" dirty="0"/>
+          </a:p>
+        </p:txBody>
+      </p:sp>
+      <p:sp>
+        <p:nvSpPr>
+          <p:cNvPr id="3" name="Content Placeholder 2"/>
+          <p:cNvSpPr>
+            <a:spLocks noGrp="1"/>
+          </p:cNvSpPr>
+          <p:nvPr>
+            <p:ph idx="1"/>
+          </p:nvPr>
+        </p:nvSpPr>
+        <p:spPr/>
+        <p:txBody>
+          <a:bodyPr/>
+          <a:lstStyle/>
+          <a:p>
+            <a:endParaRPr lang="en-US"/>
+          </a:p>
+        </p:txBody>
+      </p:sp>
+    </p:spTree>
+    <p:extLst>
+      <p:ext uri="{BB962C8B-B14F-4D97-AF65-F5344CB8AC3E}">
+        <p14:creationId xmlns:p14="http://schemas.microsoft.com/office/powerpoint/2010/main" val="1909840175"/>
+      </p:ext>
+    </p:extLst>
+  </p:cSld>
+  <p:clrMapOvr>
+    <a:masterClrMapping/>
+  </p:clrMapOvr>
+</p:sld>
+</file>
+
+<file path=ppt/slides/slide15.xml><?xml version="1.0" encoding="utf-8"?>
+<p:sld xmlns:a="http://schemas.openxmlformats.org/drawingml/2006/main" xmlns:r="http://schemas.openxmlformats.org/officeDocument/2006/relationships" xmlns:p="http://schemas.openxmlformats.org/presentationml/2006/main">
+  <p:cSld>
+    <p:spTree>
+      <p:nvGrpSpPr>
+        <p:cNvPr id="1" name=""/>
+        <p:cNvGrpSpPr/>
+        <p:nvPr/>
+      </p:nvGrpSpPr>
+      <p:grpSpPr>
+        <a:xfrm>
+          <a:off x="0" y="0"/>
+          <a:ext cx="0" cy="0"/>
+          <a:chOff x="0" y="0"/>
+          <a:chExt cx="0" cy="0"/>
+        </a:xfrm>
+      </p:grpSpPr>
+      <p:sp>
+        <p:nvSpPr>
+          <p:cNvPr id="2" name="Title 1"/>
+          <p:cNvSpPr>
+            <a:spLocks noGrp="1"/>
+          </p:cNvSpPr>
+          <p:nvPr>
+            <p:ph type="title"/>
+          </p:nvPr>
+        </p:nvSpPr>
+        <p:spPr/>
+        <p:txBody>
+          <a:bodyPr/>
+          <a:lstStyle/>
+          <a:p>
+            <a:r>
+              <a:rPr lang="en-US" dirty="0" err="1" smtClean="0"/>
+              <a:t>Git</a:t>
+            </a:r>
+            <a:r>
+              <a:rPr lang="en-US" dirty="0" smtClean="0"/>
+              <a:t> status/add/reset</a:t>
+            </a:r>
+            <a:endParaRPr lang="en-US" dirty="0"/>
+          </a:p>
+        </p:txBody>
+      </p:sp>
+      <p:sp>
+        <p:nvSpPr>
+          <p:cNvPr id="3" name="Content Placeholder 2"/>
+          <p:cNvSpPr>
+            <a:spLocks noGrp="1"/>
+          </p:cNvSpPr>
+          <p:nvPr>
+            <p:ph idx="1"/>
+          </p:nvPr>
+        </p:nvSpPr>
+        <p:spPr/>
+        <p:txBody>
+          <a:bodyPr/>
+          <a:lstStyle/>
+          <a:p>
+            <a:endParaRPr lang="en-US"/>
+          </a:p>
+        </p:txBody>
+      </p:sp>
+    </p:spTree>
+    <p:extLst>
+      <p:ext uri="{BB962C8B-B14F-4D97-AF65-F5344CB8AC3E}">
+        <p14:creationId xmlns:p14="http://schemas.microsoft.com/office/powerpoint/2010/main" val="3568461123"/>
+      </p:ext>
+    </p:extLst>
+  </p:cSld>
+  <p:clrMapOvr>
+    <a:masterClrMapping/>
+  </p:clrMapOvr>
+</p:sld>
+</file>
+
+<file path=ppt/slides/slide16.xml><?xml version="1.0" encoding="utf-8"?>
+<p:sld xmlns:a="http://schemas.openxmlformats.org/drawingml/2006/main" xmlns:r="http://schemas.openxmlformats.org/officeDocument/2006/relationships" xmlns:p="http://schemas.openxmlformats.org/presentationml/2006/main">
+  <p:cSld>
+    <p:spTree>
+      <p:nvGrpSpPr>
+        <p:cNvPr id="1" name=""/>
+        <p:cNvGrpSpPr/>
+        <p:nvPr/>
+      </p:nvGrpSpPr>
+      <p:grpSpPr>
+        <a:xfrm>
+          <a:off x="0" y="0"/>
+          <a:ext cx="0" cy="0"/>
+          <a:chOff x="0" y="0"/>
+          <a:chExt cx="0" cy="0"/>
+        </a:xfrm>
+      </p:grpSpPr>
+      <p:sp>
+        <p:nvSpPr>
+          <p:cNvPr id="2" name="Title 1"/>
+          <p:cNvSpPr>
+            <a:spLocks noGrp="1"/>
+          </p:cNvSpPr>
+          <p:nvPr>
+            <p:ph type="title"/>
+          </p:nvPr>
+        </p:nvSpPr>
+        <p:spPr/>
+        <p:txBody>
+          <a:bodyPr/>
+          <a:lstStyle/>
+          <a:p>
+            <a:r>
+              <a:rPr lang="en-US" dirty="0" err="1" smtClean="0"/>
+              <a:t>Git</a:t>
+            </a:r>
+            <a:r>
+              <a:rPr lang="en-US" dirty="0" smtClean="0"/>
+              <a:t> commit</a:t>
+            </a:r>
+            <a:endParaRPr lang="en-US" dirty="0"/>
+          </a:p>
+        </p:txBody>
+      </p:sp>
+      <p:sp>
+        <p:nvSpPr>
+          <p:cNvPr id="3" name="Content Placeholder 2"/>
+          <p:cNvSpPr>
+            <a:spLocks noGrp="1"/>
+          </p:cNvSpPr>
+          <p:nvPr>
+            <p:ph idx="1"/>
+          </p:nvPr>
+        </p:nvSpPr>
+        <p:spPr/>
+        <p:txBody>
+          <a:bodyPr/>
+          <a:lstStyle/>
+          <a:p>
+            <a:endParaRPr lang="en-US"/>
+          </a:p>
+        </p:txBody>
+      </p:sp>
+    </p:spTree>
+    <p:extLst>
+      <p:ext uri="{BB962C8B-B14F-4D97-AF65-F5344CB8AC3E}">
+        <p14:creationId xmlns:p14="http://schemas.microsoft.com/office/powerpoint/2010/main" val="228523302"/>
+      </p:ext>
+    </p:extLst>
+  </p:cSld>
+  <p:clrMapOvr>
+    <a:masterClrMapping/>
+  </p:clrMapOvr>
+</p:sld>
+</file>
+
+<file path=ppt/slides/slide17.xml><?xml version="1.0" encoding="utf-8"?>
+<p:sld xmlns:a="http://schemas.openxmlformats.org/drawingml/2006/main" xmlns:r="http://schemas.openxmlformats.org/officeDocument/2006/relationships" xmlns:p="http://schemas.openxmlformats.org/presentationml/2006/main">
+  <p:cSld>
+    <p:spTree>
+      <p:nvGrpSpPr>
+        <p:cNvPr id="1" name=""/>
+        <p:cNvGrpSpPr/>
+        <p:nvPr/>
+      </p:nvGrpSpPr>
+      <p:grpSpPr>
+        <a:xfrm>
+          <a:off x="0" y="0"/>
+          <a:ext cx="0" cy="0"/>
+          <a:chOff x="0" y="0"/>
+          <a:chExt cx="0" cy="0"/>
+        </a:xfrm>
+      </p:grpSpPr>
+      <p:sp>
+        <p:nvSpPr>
+          <p:cNvPr id="2" name="Title 1"/>
+          <p:cNvSpPr>
+            <a:spLocks noGrp="1"/>
+          </p:cNvSpPr>
+          <p:nvPr>
+            <p:ph type="title"/>
+          </p:nvPr>
+        </p:nvSpPr>
+        <p:spPr/>
+        <p:txBody>
+          <a:bodyPr/>
+          <a:lstStyle/>
+          <a:p>
+            <a:r>
+              <a:rPr lang="en-US" dirty="0" err="1" smtClean="0"/>
+              <a:t>Git</a:t>
+            </a:r>
+            <a:r>
+              <a:rPr lang="en-US" dirty="0" smtClean="0"/>
+              <a:t> diff/</a:t>
+            </a:r>
+            <a:r>
+              <a:rPr lang="en-US" dirty="0" err="1" smtClean="0"/>
+              <a:t>git</a:t>
+            </a:r>
+            <a:r>
+              <a:rPr lang="en-US" dirty="0" smtClean="0"/>
+              <a:t> help</a:t>
+            </a:r>
+            <a:endParaRPr lang="en-US" dirty="0"/>
+          </a:p>
+        </p:txBody>
+      </p:sp>
+      <p:sp>
+        <p:nvSpPr>
+          <p:cNvPr id="3" name="Content Placeholder 2"/>
+          <p:cNvSpPr>
+            <a:spLocks noGrp="1"/>
+          </p:cNvSpPr>
+          <p:nvPr>
+            <p:ph idx="1"/>
+          </p:nvPr>
+        </p:nvSpPr>
+        <p:spPr/>
+        <p:txBody>
+          <a:bodyPr/>
+          <a:lstStyle/>
+          <a:p>
+            <a:endParaRPr lang="en-US"/>
+          </a:p>
+        </p:txBody>
+      </p:sp>
+    </p:spTree>
+    <p:extLst>
+      <p:ext uri="{BB962C8B-B14F-4D97-AF65-F5344CB8AC3E}">
+        <p14:creationId xmlns:p14="http://schemas.microsoft.com/office/powerpoint/2010/main" val="3206775485"/>
+      </p:ext>
+    </p:extLst>
+  </p:cSld>
+  <p:clrMapOvr>
+    <a:masterClrMapping/>
+  </p:clrMapOvr>
+</p:sld>
+</file>
+
+<file path=ppt/slides/slide18.xml><?xml version="1.0" encoding="utf-8"?>
+<p:sld xmlns:a="http://schemas.openxmlformats.org/drawingml/2006/main" xmlns:r="http://schemas.openxmlformats.org/officeDocument/2006/relationships" xmlns:p="http://schemas.openxmlformats.org/presentationml/2006/main">
+  <p:cSld>
+    <p:spTree>
+      <p:nvGrpSpPr>
+        <p:cNvPr id="1" name=""/>
+        <p:cNvGrpSpPr/>
+        <p:nvPr/>
+      </p:nvGrpSpPr>
+      <p:grpSpPr>
+        <a:xfrm>
+          <a:off x="0" y="0"/>
+          <a:ext cx="0" cy="0"/>
+          <a:chOff x="0" y="0"/>
+          <a:chExt cx="0" cy="0"/>
+        </a:xfrm>
+      </p:grpSpPr>
+      <p:sp>
+        <p:nvSpPr>
+          <p:cNvPr id="2" name="Title 1"/>
+          <p:cNvSpPr>
+            <a:spLocks noGrp="1"/>
+          </p:cNvSpPr>
+          <p:nvPr>
+            <p:ph type="title"/>
+          </p:nvPr>
+        </p:nvSpPr>
+        <p:spPr/>
+        <p:txBody>
+          <a:bodyPr/>
+          <a:lstStyle/>
+          <a:p>
+            <a:r>
+              <a:rPr lang="en-US" dirty="0" err="1" smtClean="0"/>
+              <a:t>Git</a:t>
+            </a:r>
+            <a:r>
+              <a:rPr lang="en-US" dirty="0" smtClean="0"/>
+              <a:t> commands diagram</a:t>
+            </a:r>
+            <a:endParaRPr lang="en-US" dirty="0"/>
+          </a:p>
+        </p:txBody>
+      </p:sp>
+      <p:sp>
+        <p:nvSpPr>
+          <p:cNvPr id="3" name="Content Placeholder 2"/>
+          <p:cNvSpPr>
+            <a:spLocks noGrp="1"/>
+          </p:cNvSpPr>
+          <p:nvPr>
+            <p:ph idx="1"/>
+          </p:nvPr>
+        </p:nvSpPr>
+        <p:spPr/>
+        <p:txBody>
+          <a:bodyPr/>
+          <a:lstStyle/>
+          <a:p>
+            <a:endParaRPr lang="en-US"/>
+          </a:p>
+        </p:txBody>
+      </p:sp>
+    </p:spTree>
+    <p:extLst>
+      <p:ext uri="{BB962C8B-B14F-4D97-AF65-F5344CB8AC3E}">
+        <p14:creationId xmlns:p14="http://schemas.microsoft.com/office/powerpoint/2010/main" val="2754472481"/>
+      </p:ext>
+    </p:extLst>
+  </p:cSld>
+  <p:clrMapOvr>
+    <a:masterClrMapping/>
+  </p:clrMapOvr>
+</p:sld>
+</file>
+
+<file path=ppt/slides/slide19.xml><?xml version="1.0" encoding="utf-8"?>
+<p:sld xmlns:a="http://schemas.openxmlformats.org/drawingml/2006/main" xmlns:r="http://schemas.openxmlformats.org/officeDocument/2006/relationships" xmlns:p="http://schemas.openxmlformats.org/presentationml/2006/main">
+  <p:cSld>
+    <p:spTree>
+      <p:nvGrpSpPr>
+        <p:cNvPr id="1" name=""/>
+        <p:cNvGrpSpPr/>
+        <p:nvPr/>
+      </p:nvGrpSpPr>
+      <p:grpSpPr>
+        <a:xfrm>
+          <a:off x="0" y="0"/>
+          <a:ext cx="0" cy="0"/>
+          <a:chOff x="0" y="0"/>
+          <a:chExt cx="0" cy="0"/>
+        </a:xfrm>
+      </p:grpSpPr>
+      <p:sp>
+        <p:nvSpPr>
+          <p:cNvPr id="2" name="Title 1"/>
+          <p:cNvSpPr>
+            <a:spLocks noGrp="1"/>
+          </p:cNvSpPr>
+          <p:nvPr>
+            <p:ph type="title"/>
+          </p:nvPr>
+        </p:nvSpPr>
+        <p:spPr/>
+        <p:txBody>
+          <a:bodyPr/>
+          <a:lstStyle/>
+          <a:p>
+            <a:r>
+              <a:rPr lang="en-US" dirty="0" err="1" smtClean="0"/>
+              <a:t>Github</a:t>
+            </a:r>
+            <a:r>
+              <a:rPr lang="en-US" dirty="0" smtClean="0"/>
+              <a:t> Brief Overview</a:t>
+            </a:r>
+            <a:endParaRPr lang="en-US" dirty="0"/>
+          </a:p>
+        </p:txBody>
+      </p:sp>
+      <p:sp>
+        <p:nvSpPr>
+          <p:cNvPr id="3" name="Content Placeholder 2"/>
+          <p:cNvSpPr>
+            <a:spLocks noGrp="1"/>
+          </p:cNvSpPr>
+          <p:nvPr>
+            <p:ph idx="1"/>
+          </p:nvPr>
+        </p:nvSpPr>
+        <p:spPr/>
+        <p:txBody>
+          <a:bodyPr/>
+          <a:lstStyle/>
+          <a:p>
+            <a:endParaRPr lang="en-US"/>
+          </a:p>
+        </p:txBody>
+      </p:sp>
+    </p:spTree>
+    <p:extLst>
+      <p:ext uri="{BB962C8B-B14F-4D97-AF65-F5344CB8AC3E}">
+        <p14:creationId xmlns:p14="http://schemas.microsoft.com/office/powerpoint/2010/main" val="3013041104"/>
+      </p:ext>
+    </p:extLst>
+  </p:cSld>
+  <p:clrMapOvr>
+    <a:masterClrMapping/>
+  </p:clrMapOvr>
+</p:sld>
+</file>
+
+<file path=ppt/slides/slide2.xml><?xml version="1.0" encoding="utf-8"?>
+<p:sld xmlns:a="http://schemas.openxmlformats.org/drawingml/2006/main" xmlns:r="http://schemas.openxmlformats.org/officeDocument/2006/relationships" xmlns:p="http://schemas.openxmlformats.org/presentationml/2006/main">
+  <p:cSld>
+    <p:spTree>
+      <p:nvGrpSpPr>
+        <p:cNvPr id="1" name=""/>
+        <p:cNvGrpSpPr/>
+        <p:nvPr/>
+      </p:nvGrpSpPr>
+      <p:grpSpPr>
+        <a:xfrm>
+          <a:off x="0" y="0"/>
+          <a:ext cx="0" cy="0"/>
+          <a:chOff x="0" y="0"/>
+          <a:chExt cx="0" cy="0"/>
+        </a:xfrm>
+      </p:grpSpPr>
+      <p:sp>
+        <p:nvSpPr>
+          <p:cNvPr id="2" name="Title 1"/>
+          <p:cNvSpPr>
+            <a:spLocks noGrp="1"/>
+          </p:cNvSpPr>
+          <p:nvPr>
+            <p:ph type="title"/>
+          </p:nvPr>
+        </p:nvSpPr>
+        <p:spPr/>
+        <p:txBody>
+          <a:bodyPr/>
+          <a:lstStyle/>
+          <a:p>
+            <a:r>
+              <a:rPr lang="en-US" dirty="0" smtClean="0"/>
+              <a:t>Contents of Presentation</a:t>
+            </a:r>
+            <a:endParaRPr lang="en-US" dirty="0"/>
+          </a:p>
+        </p:txBody>
+      </p:sp>
+      <p:sp>
+        <p:nvSpPr>
+          <p:cNvPr id="3" name="Content Placeholder 2"/>
+          <p:cNvSpPr>
+            <a:spLocks noGrp="1"/>
+          </p:cNvSpPr>
+          <p:nvPr>
+            <p:ph idx="1"/>
+          </p:nvPr>
+        </p:nvSpPr>
+        <p:spPr/>
+        <p:txBody>
+          <a:bodyPr/>
+          <a:lstStyle/>
+          <a:p>
+            <a:r>
+              <a:rPr lang="en-US" dirty="0" smtClean="0"/>
+              <a:t>What is and why use version control</a:t>
+            </a:r>
+          </a:p>
+          <a:p>
+            <a:r>
+              <a:rPr lang="en-US" dirty="0" smtClean="0"/>
+              <a:t>Two main types of version control</a:t>
+            </a:r>
+          </a:p>
+          <a:p>
+            <a:r>
+              <a:rPr lang="en-US" dirty="0" err="1" smtClean="0"/>
+              <a:t>Git</a:t>
+            </a:r>
+            <a:r>
+              <a:rPr lang="en-US" dirty="0" smtClean="0"/>
+              <a:t> conceptually</a:t>
+            </a:r>
+          </a:p>
+          <a:p>
+            <a:r>
+              <a:rPr lang="en-US" dirty="0" err="1" smtClean="0"/>
+              <a:t>Git</a:t>
+            </a:r>
+            <a:r>
+              <a:rPr lang="en-US" dirty="0" smtClean="0"/>
+              <a:t> commands</a:t>
+            </a:r>
+          </a:p>
+          <a:p>
+            <a:r>
+              <a:rPr lang="en-US" dirty="0" err="1" smtClean="0"/>
+              <a:t>Github</a:t>
+            </a:r>
+            <a:r>
+              <a:rPr lang="en-US" dirty="0" smtClean="0"/>
+              <a:t> brief overview</a:t>
+            </a:r>
+          </a:p>
+          <a:p>
+            <a:r>
+              <a:rPr lang="en-US" dirty="0" smtClean="0"/>
+              <a:t>Moving Forward</a:t>
+            </a:r>
+          </a:p>
+        </p:txBody>
+      </p:sp>
+    </p:spTree>
+    <p:extLst>
+      <p:ext uri="{BB962C8B-B14F-4D97-AF65-F5344CB8AC3E}">
+        <p14:creationId xmlns:p14="http://schemas.microsoft.com/office/powerpoint/2010/main" val="1831184312"/>
+      </p:ext>
+    </p:extLst>
+  </p:cSld>
+  <p:clrMapOvr>
+    <a:masterClrMapping/>
+  </p:clrMapOvr>
+  <p:timing>
+    <p:tnLst>
+      <p:par>
+        <p:cTn xmlns:p14="http://schemas.microsoft.com/office/powerpoint/2010/main" id="1" dur="indefinite" restart="never" nodeType="tmRoot"/>
+      </p:par>
+    </p:tnLst>
+  </p:timing>
+</p:sld>
+</file>
+
+<file path=ppt/slides/slide20.xml><?xml version="1.0" encoding="utf-8"?>
+<p:sld xmlns:a="http://schemas.openxmlformats.org/drawingml/2006/main" xmlns:r="http://schemas.openxmlformats.org/officeDocument/2006/relationships" xmlns:p="http://schemas.openxmlformats.org/presentationml/2006/main">
+  <p:cSld>
+    <p:spTree>
+      <p:nvGrpSpPr>
+        <p:cNvPr id="1" name=""/>
+        <p:cNvGrpSpPr/>
+        <p:nvPr/>
+      </p:nvGrpSpPr>
+      <p:grpSpPr>
+        <a:xfrm>
+          <a:off x="0" y="0"/>
+          <a:ext cx="0" cy="0"/>
+          <a:chOff x="0" y="0"/>
+          <a:chExt cx="0" cy="0"/>
+        </a:xfrm>
+      </p:grpSpPr>
+      <p:sp>
+        <p:nvSpPr>
+          <p:cNvPr id="2" name="Title 1"/>
+          <p:cNvSpPr>
+            <a:spLocks noGrp="1"/>
+          </p:cNvSpPr>
+          <p:nvPr>
+            <p:ph type="title"/>
+          </p:nvPr>
+        </p:nvSpPr>
+        <p:spPr/>
+        <p:txBody>
+          <a:bodyPr/>
+          <a:lstStyle/>
+          <a:p>
+            <a:r>
+              <a:rPr lang="en-US" dirty="0" smtClean="0"/>
+              <a:t>Moving Forward</a:t>
+            </a:r>
+            <a:endParaRPr lang="en-US" dirty="0"/>
+          </a:p>
+        </p:txBody>
+      </p:sp>
+      <p:sp>
+        <p:nvSpPr>
+          <p:cNvPr id="3" name="Content Placeholder 2"/>
+          <p:cNvSpPr>
+            <a:spLocks noGrp="1"/>
+          </p:cNvSpPr>
+          <p:nvPr>
+            <p:ph idx="1"/>
+          </p:nvPr>
+        </p:nvSpPr>
+        <p:spPr/>
+        <p:txBody>
+          <a:bodyPr/>
+          <a:lstStyle/>
+          <a:p>
+            <a:endParaRPr lang="en-US"/>
+          </a:p>
+        </p:txBody>
+      </p:sp>
+    </p:spTree>
+    <p:extLst>
+      <p:ext uri="{BB962C8B-B14F-4D97-AF65-F5344CB8AC3E}">
+        <p14:creationId xmlns:p14="http://schemas.microsoft.com/office/powerpoint/2010/main" val="2501713456"/>
+      </p:ext>
+    </p:extLst>
+  </p:cSld>
+  <p:clrMapOvr>
+    <a:masterClrMapping/>
+  </p:clrMapOvr>
+</p:sld>
+</file>
+
+<file path=ppt/slides/slide21.xml><?xml version="1.0" encoding="utf-8"?>
+<p:sld xmlns:a="http://schemas.openxmlformats.org/drawingml/2006/main" xmlns:r="http://schemas.openxmlformats.org/officeDocument/2006/relationships" xmlns:p="http://schemas.openxmlformats.org/presentationml/2006/main">
+  <p:cSld>
+    <p:spTree>
+      <p:nvGrpSpPr>
+        <p:cNvPr id="1" name=""/>
+        <p:cNvGrpSpPr/>
+        <p:nvPr/>
+      </p:nvGrpSpPr>
+      <p:grpSpPr>
+        <a:xfrm>
+          <a:off x="0" y="0"/>
+          <a:ext cx="0" cy="0"/>
+          <a:chOff x="0" y="0"/>
+          <a:chExt cx="0" cy="0"/>
+        </a:xfrm>
+      </p:grpSpPr>
+      <p:sp>
+        <p:nvSpPr>
+          <p:cNvPr id="2" name="Title 1"/>
+          <p:cNvSpPr>
+            <a:spLocks noGrp="1"/>
+          </p:cNvSpPr>
+          <p:nvPr>
+            <p:ph type="title"/>
+          </p:nvPr>
+        </p:nvSpPr>
+        <p:spPr/>
+        <p:txBody>
+          <a:bodyPr/>
+          <a:lstStyle/>
+          <a:p>
+            <a:r>
+              <a:rPr lang="en-US" dirty="0" smtClean="0"/>
+              <a:t>Conclusion</a:t>
+            </a:r>
+            <a:endParaRPr lang="en-US" dirty="0"/>
+          </a:p>
+        </p:txBody>
+      </p:sp>
+      <p:sp>
+        <p:nvSpPr>
+          <p:cNvPr id="3" name="Content Placeholder 2"/>
+          <p:cNvSpPr>
+            <a:spLocks noGrp="1"/>
+          </p:cNvSpPr>
+          <p:nvPr>
+            <p:ph idx="1"/>
+          </p:nvPr>
+        </p:nvSpPr>
+        <p:spPr/>
+        <p:txBody>
+          <a:bodyPr/>
+          <a:lstStyle/>
+          <a:p>
+            <a:endParaRPr lang="en-US"/>
+          </a:p>
+        </p:txBody>
+      </p:sp>
+    </p:spTree>
+    <p:extLst>
+      <p:ext uri="{BB962C8B-B14F-4D97-AF65-F5344CB8AC3E}">
+        <p14:creationId xmlns:p14="http://schemas.microsoft.com/office/powerpoint/2010/main" val="593670890"/>
+      </p:ext>
+    </p:extLst>
+  </p:cSld>
+  <p:clrMapOvr>
+    <a:masterClrMapping/>
+  </p:clrMapOvr>
+</p:sld>
+</file>
+
+<file path=ppt/slides/slide3.xml><?xml version="1.0" encoding="utf-8"?>
+<p:sld xmlns:a="http://schemas.openxmlformats.org/drawingml/2006/main" xmlns:r="http://schemas.openxmlformats.org/officeDocument/2006/relationships" xmlns:p="http://schemas.openxmlformats.org/presentationml/2006/main">
+  <p:cSld>
+    <p:spTree>
+      <p:nvGrpSpPr>
+        <p:cNvPr id="1" name=""/>
+        <p:cNvGrpSpPr/>
+        <p:nvPr/>
+      </p:nvGrpSpPr>
+      <p:grpSpPr>
+        <a:xfrm>
+          <a:off x="0" y="0"/>
+          <a:ext cx="0" cy="0"/>
+          <a:chOff x="0" y="0"/>
+          <a:chExt cx="0" cy="0"/>
+        </a:xfrm>
+      </p:grpSpPr>
+      <p:sp>
+        <p:nvSpPr>
+          <p:cNvPr id="2" name="Title 1"/>
+          <p:cNvSpPr>
+            <a:spLocks noGrp="1"/>
+          </p:cNvSpPr>
+          <p:nvPr>
+            <p:ph type="title"/>
+          </p:nvPr>
+        </p:nvSpPr>
+        <p:spPr/>
+        <p:txBody>
+          <a:bodyPr/>
+          <a:lstStyle/>
+          <a:p>
+            <a:r>
+              <a:rPr lang="en-US" dirty="0" smtClean="0"/>
+              <a:t>Traditional Saving of Files</a:t>
+            </a:r>
+            <a:endParaRPr lang="en-US" dirty="0"/>
+          </a:p>
+        </p:txBody>
+      </p:sp>
+      <p:pic>
+        <p:nvPicPr>
+          <p:cNvPr id="5" name="Content Placeholder 4"/>
+          <p:cNvPicPr>
+            <a:picLocks noGrp="1" noChangeAspect="1"/>
+          </p:cNvPicPr>
+          <p:nvPr>
+            <p:ph idx="1"/>
+          </p:nvPr>
+        </p:nvPicPr>
+        <p:blipFill>
+          <a:blip r:embed="rId2"/>
+          <a:srcRect t="14388" b="14388"/>
+          <a:stretch>
+            <a:fillRect/>
+          </a:stretch>
+        </p:blipFill>
+        <p:spPr>
+          <a:xfrm>
+            <a:off x="3981558" y="2432327"/>
+            <a:ext cx="4206133" cy="1740491"/>
+          </a:xfrm>
+        </p:spPr>
+      </p:pic>
+      <p:pic>
+        <p:nvPicPr>
+          <p:cNvPr id="7" name="Picture 6"/>
+          <p:cNvPicPr>
+            <a:picLocks noChangeAspect="1"/>
+          </p:cNvPicPr>
+          <p:nvPr/>
+        </p:nvPicPr>
+        <p:blipFill>
+          <a:blip r:embed="rId3"/>
+          <a:stretch>
+            <a:fillRect/>
+          </a:stretch>
+        </p:blipFill>
+        <p:spPr>
+          <a:xfrm>
+            <a:off x="7906830" y="1676972"/>
+            <a:ext cx="3251200" cy="3251200"/>
+          </a:xfrm>
+          <a:prstGeom prst="rect">
+            <a:avLst/>
+          </a:prstGeom>
+        </p:spPr>
+      </p:pic>
+      <p:pic>
+        <p:nvPicPr>
+          <p:cNvPr id="8" name="Picture 7"/>
+          <p:cNvPicPr>
+            <a:picLocks noChangeAspect="1"/>
+          </p:cNvPicPr>
+          <p:nvPr/>
+        </p:nvPicPr>
+        <p:blipFill>
+          <a:blip r:embed="rId4"/>
+          <a:stretch>
+            <a:fillRect/>
+          </a:stretch>
+        </p:blipFill>
+        <p:spPr>
+          <a:xfrm>
+            <a:off x="1344953" y="1830159"/>
+            <a:ext cx="2944827" cy="2944827"/>
+          </a:xfrm>
+          <a:prstGeom prst="rect">
+            <a:avLst/>
+          </a:prstGeom>
+        </p:spPr>
+      </p:pic>
+    </p:spTree>
+    <p:extLst>
+      <p:ext uri="{BB962C8B-B14F-4D97-AF65-F5344CB8AC3E}">
+        <p14:creationId xmlns:p14="http://schemas.microsoft.com/office/powerpoint/2010/main" val="3048952283"/>
+      </p:ext>
+    </p:extLst>
+  </p:cSld>
+  <p:clrMapOvr>
+    <a:masterClrMapping/>
+  </p:clrMapOvr>
+  <p:timing>
+    <p:tnLst>
+      <p:par>
+        <p:cTn xmlns:p14="http://schemas.microsoft.com/office/powerpoint/2010/main" id="1" dur="indefinite" restart="never" nodeType="tmRoot">
+          <p:childTnLst>
+            <p:seq concurrent="1" nextAc="seek">
+              <p:cTn id="2" dur="indefinite" nodeType="mainSeq">
+                <p:childTnLst>
+                  <p:par>
+                    <p:cTn id="3" fill="hold">
+                      <p:stCondLst>
+                        <p:cond delay="indefinite"/>
+                      </p:stCondLst>
+                      <p:childTnLst>
+                        <p:par>
+                          <p:cTn id="4" fill="hold">
+                            <p:stCondLst>
+                              <p:cond delay="0"/>
+                            </p:stCondLst>
+                            <p:childTnLst>
+                              <p:par>
+                                <p:cTn id="5" presetID="9" presetClass="entr" presetSubtype="0" fill="hold" nodeType="clickEffect">
+                                  <p:stCondLst>
+                                    <p:cond delay="0"/>
+                                  </p:stCondLst>
+                                  <p:childTnLst>
+                                    <p:set>
+                                      <p:cBhvr>
+                                        <p:cTn id="6" dur="1" fill="hold">
+                                          <p:stCondLst>
+                                            <p:cond delay="0"/>
+                                          </p:stCondLst>
+                                        </p:cTn>
+                                        <p:tgtEl>
+                                          <p:spTgt spid="5"/>
+                                        </p:tgtEl>
+                                        <p:attrNameLst>
+                                          <p:attrName>style.visibility</p:attrName>
+                                        </p:attrNameLst>
+                                      </p:cBhvr>
+                                      <p:to>
+                                        <p:strVal val="visible"/>
+                                      </p:to>
+                                    </p:set>
+                                    <p:animEffect transition="in" filter="dissolve">
+                                      <p:cBhvr>
+                                        <p:cTn id="7" dur="500"/>
+                                        <p:tgtEl>
+                                          <p:spTgt spid="5"/>
+                                        </p:tgtEl>
+                                      </p:cBhvr>
+                                    </p:animEffect>
+                                  </p:childTnLst>
+                                </p:cTn>
+                              </p:par>
+                            </p:childTnLst>
+                          </p:cTn>
+                        </p:par>
+                        <p:par>
+                          <p:cTn id="8" fill="hold">
+                            <p:stCondLst>
+                              <p:cond delay="500"/>
+                            </p:stCondLst>
+                            <p:childTnLst>
+                              <p:par>
+                                <p:cTn id="9" presetID="9" presetClass="entr" presetSubtype="0" fill="hold" nodeType="afterEffect">
+                                  <p:stCondLst>
+                                    <p:cond delay="0"/>
+                                  </p:stCondLst>
+                                  <p:childTnLst>
+                                    <p:set>
+                                      <p:cBhvr>
+                                        <p:cTn id="10" dur="1" fill="hold">
+                                          <p:stCondLst>
+                                            <p:cond delay="0"/>
+                                          </p:stCondLst>
+                                        </p:cTn>
+                                        <p:tgtEl>
+                                          <p:spTgt spid="7"/>
+                                        </p:tgtEl>
+                                        <p:attrNameLst>
+                                          <p:attrName>style.visibility</p:attrName>
+                                        </p:attrNameLst>
+                                      </p:cBhvr>
+                                      <p:to>
+                                        <p:strVal val="visible"/>
+                                      </p:to>
+                                    </p:set>
+                                    <p:animEffect transition="in" filter="dissolve">
+                                      <p:cBhvr>
+                                        <p:cTn id="11" dur="500"/>
+                                        <p:tgtEl>
+                                          <p:spTgt spid="7"/>
+                                        </p:tgtEl>
+                                      </p:cBhvr>
+                                    </p:animEffect>
+                                  </p:childTnLst>
+                                </p:cTn>
+                              </p:par>
+                            </p:childTnLst>
+                          </p:cTn>
+                        </p:par>
+                      </p:childTnLst>
+                    </p:cTn>
+                  </p:par>
+                  <p:par>
+                    <p:cTn id="12" fill="hold">
+                      <p:stCondLst>
+                        <p:cond delay="indefinite"/>
+                      </p:stCondLst>
+                      <p:childTnLst>
+                        <p:par>
+                          <p:cTn id="13" fill="hold">
+                            <p:stCondLst>
+                              <p:cond delay="0"/>
+                            </p:stCondLst>
+                            <p:childTnLst>
+                              <p:par>
+                                <p:cTn id="14" presetID="9" presetClass="exit" presetSubtype="0" fill="hold" nodeType="clickEffect">
+                                  <p:stCondLst>
+                                    <p:cond delay="0"/>
+                                  </p:stCondLst>
+                                  <p:childTnLst>
+                                    <p:animEffect transition="out" filter="dissolve">
+                                      <p:cBhvr>
+                                        <p:cTn id="15" dur="500"/>
+                                        <p:tgtEl>
+                                          <p:spTgt spid="8"/>
+                                        </p:tgtEl>
+                                      </p:cBhvr>
+                                    </p:animEffect>
+                                    <p:set>
+                                      <p:cBhvr>
+                                        <p:cTn id="16" dur="1" fill="hold">
+                                          <p:stCondLst>
+                                            <p:cond delay="499"/>
+                                          </p:stCondLst>
+                                        </p:cTn>
+                                        <p:tgtEl>
+                                          <p:spTgt spid="8"/>
+                                        </p:tgtEl>
+                                        <p:attrNameLst>
+                                          <p:attrName>style.visibility</p:attrName>
+                                        </p:attrNameLst>
+                                      </p:cBhvr>
+                                      <p:to>
+                                        <p:strVal val="hidden"/>
+                                      </p:to>
+                                    </p:set>
+                                  </p:childTnLst>
+                                </p:cTn>
+                              </p:par>
+                              <p:par>
+                                <p:cTn id="17" presetID="9" presetClass="exit" presetSubtype="0" fill="hold" nodeType="withEffect">
+                                  <p:stCondLst>
+                                    <p:cond delay="0"/>
+                                  </p:stCondLst>
+                                  <p:childTnLst>
+                                    <p:animEffect transition="out" filter="dissolve">
+                                      <p:cBhvr>
+                                        <p:cTn id="18" dur="500"/>
+                                        <p:tgtEl>
+                                          <p:spTgt spid="5"/>
+                                        </p:tgtEl>
+                                      </p:cBhvr>
+                                    </p:animEffect>
+                                    <p:set>
+                                      <p:cBhvr>
+                                        <p:cTn id="19" dur="1" fill="hold">
+                                          <p:stCondLst>
+                                            <p:cond delay="499"/>
+                                          </p:stCondLst>
+                                        </p:cTn>
+                                        <p:tgtEl>
+                                          <p:spTgt spid="5"/>
+                                        </p:tgtEl>
+                                        <p:attrNameLst>
+                                          <p:attrName>style.visibility</p:attrName>
+                                        </p:attrNameLst>
+                                      </p:cBhvr>
+                                      <p:to>
+                                        <p:strVal val="hidden"/>
+                                      </p:to>
+                                    </p:set>
+                                  </p:childTnLst>
+                                </p:cTn>
+                              </p:par>
+                              <p:par>
+                                <p:cTn id="20" presetID="0" presetClass="path" presetSubtype="0" accel="50000" decel="50000" fill="hold" nodeType="withEffect">
+                                  <p:stCondLst>
+                                    <p:cond delay="0"/>
+                                  </p:stCondLst>
+                                  <p:childTnLst>
+                                    <p:animMotion origin="layout" path="M 7.5511E-7 -2.96133E-6 L -0.54628 -0.00092 " pathEditMode="relative" rAng="0" ptsTypes="AA">
+                                      <p:cBhvr>
+                                        <p:cTn id="21" dur="2000" fill="hold"/>
+                                        <p:tgtEl>
+                                          <p:spTgt spid="7"/>
+                                        </p:tgtEl>
+                                        <p:attrNameLst>
+                                          <p:attrName>ppt_x</p:attrName>
+                                          <p:attrName>ppt_y</p:attrName>
+                                        </p:attrNameLst>
+                                      </p:cBhvr>
+                                      <p:rCtr x="-27314" y="-46"/>
+                                    </p:animMotion>
+                                  </p:childTnLst>
+                                </p:cTn>
+                              </p:par>
+                            </p:childTnLst>
+                          </p:cTn>
+                        </p:par>
+                      </p:childTnLst>
+                    </p:cTn>
+                  </p:par>
+                </p:childTnLst>
+              </p:cTn>
+              <p:prevCondLst>
+                <p:cond evt="onPrev" delay="0">
+                  <p:tgtEl>
+                    <p:sldTgt/>
+                  </p:tgtEl>
+                </p:cond>
+              </p:prevCondLst>
+              <p:nextCondLst>
+                <p:cond evt="onNext" delay="0">
+                  <p:tgtEl>
+                    <p:sldTgt/>
+                  </p:tgtEl>
+                </p:cond>
+              </p:nextCondLst>
+            </p:seq>
+          </p:childTnLst>
+        </p:cTn>
+      </p:par>
+    </p:tnLst>
+  </p:timing>
+</p:sld>
+</file>
+
+<file path=ppt/slides/slide4.xml><?xml version="1.0" encoding="utf-8"?>
+<p:sld xmlns:a="http://schemas.openxmlformats.org/drawingml/2006/main" xmlns:r="http://schemas.openxmlformats.org/officeDocument/2006/relationships" xmlns:p="http://schemas.openxmlformats.org/presentationml/2006/main">
+  <p:cSld>
+    <p:spTree>
+      <p:nvGrpSpPr>
+        <p:cNvPr id="1" name=""/>
+        <p:cNvGrpSpPr/>
+        <p:nvPr/>
+      </p:nvGrpSpPr>
+      <p:grpSpPr>
+        <a:xfrm>
+          <a:off x="0" y="0"/>
+          <a:ext cx="0" cy="0"/>
+          <a:chOff x="0" y="0"/>
+          <a:chExt cx="0" cy="0"/>
+        </a:xfrm>
+      </p:grpSpPr>
+      <p:pic>
+        <p:nvPicPr>
+          <p:cNvPr id="7" name="Content Placeholder 4"/>
+          <p:cNvPicPr>
+            <a:picLocks noChangeAspect="1"/>
+          </p:cNvPicPr>
+          <p:nvPr/>
+        </p:nvPicPr>
+        <p:blipFill>
+          <a:blip r:embed="rId2"/>
+          <a:srcRect t="14388" b="14388"/>
+          <a:stretch>
+            <a:fillRect/>
+          </a:stretch>
+        </p:blipFill>
+        <p:spPr>
+          <a:xfrm>
+            <a:off x="6679676" y="3474587"/>
+            <a:ext cx="2414340" cy="999050"/>
+          </a:xfrm>
+          <a:prstGeom prst="rect">
+            <a:avLst/>
+          </a:prstGeom>
+        </p:spPr>
+      </p:pic>
+      <p:sp>
+        <p:nvSpPr>
+          <p:cNvPr id="2" name="Title 1"/>
+          <p:cNvSpPr>
+            <a:spLocks noGrp="1"/>
+          </p:cNvSpPr>
+          <p:nvPr>
+            <p:ph type="title"/>
+          </p:nvPr>
+        </p:nvSpPr>
+        <p:spPr/>
+        <p:txBody>
+          <a:bodyPr/>
+          <a:lstStyle/>
+          <a:p>
+            <a:r>
+              <a:rPr lang="en-US" dirty="0" smtClean="0"/>
+              <a:t>Version Control Saving of Files</a:t>
+            </a:r>
+            <a:endParaRPr lang="en-US" dirty="0"/>
+          </a:p>
+        </p:txBody>
+      </p:sp>
+      <p:pic>
+        <p:nvPicPr>
+          <p:cNvPr id="4" name="Content Placeholder 4"/>
+          <p:cNvPicPr>
+            <a:picLocks noChangeAspect="1"/>
+          </p:cNvPicPr>
+          <p:nvPr/>
+        </p:nvPicPr>
+        <p:blipFill>
+          <a:blip r:embed="rId2"/>
+          <a:srcRect t="14388" b="14388"/>
+          <a:stretch>
+            <a:fillRect/>
+          </a:stretch>
+        </p:blipFill>
+        <p:spPr>
+          <a:xfrm>
+            <a:off x="2257597" y="3474587"/>
+            <a:ext cx="2414340" cy="999050"/>
+          </a:xfrm>
+          <a:prstGeom prst="rect">
+            <a:avLst/>
+          </a:prstGeom>
+        </p:spPr>
+      </p:pic>
+      <p:pic>
+        <p:nvPicPr>
+          <p:cNvPr id="5" name="Picture 4"/>
+          <p:cNvPicPr>
+            <a:picLocks noChangeAspect="1"/>
+          </p:cNvPicPr>
+          <p:nvPr/>
+        </p:nvPicPr>
+        <p:blipFill>
+          <a:blip r:embed="rId3"/>
+          <a:stretch>
+            <a:fillRect/>
+          </a:stretch>
+        </p:blipFill>
+        <p:spPr>
+          <a:xfrm>
+            <a:off x="4711754" y="2797294"/>
+            <a:ext cx="2353637" cy="2353637"/>
+          </a:xfrm>
+          <a:prstGeom prst="rect">
+            <a:avLst/>
+          </a:prstGeom>
+        </p:spPr>
+      </p:pic>
+      <p:pic>
+        <p:nvPicPr>
+          <p:cNvPr id="6" name="Picture 5"/>
+          <p:cNvPicPr>
+            <a:picLocks noChangeAspect="1"/>
+          </p:cNvPicPr>
+          <p:nvPr/>
+        </p:nvPicPr>
+        <p:blipFill>
+          <a:blip r:embed="rId4"/>
+          <a:stretch>
+            <a:fillRect/>
+          </a:stretch>
+        </p:blipFill>
+        <p:spPr>
+          <a:xfrm>
+            <a:off x="247365" y="2905493"/>
+            <a:ext cx="2137238" cy="2137238"/>
+          </a:xfrm>
+          <a:prstGeom prst="rect">
+            <a:avLst/>
+          </a:prstGeom>
+        </p:spPr>
+      </p:pic>
+      <p:pic>
+        <p:nvPicPr>
+          <p:cNvPr id="8" name="Picture 7"/>
+          <p:cNvPicPr>
+            <a:picLocks noChangeAspect="1"/>
+          </p:cNvPicPr>
+          <p:nvPr/>
+        </p:nvPicPr>
+        <p:blipFill>
+          <a:blip r:embed="rId5"/>
+          <a:stretch>
+            <a:fillRect/>
+          </a:stretch>
+        </p:blipFill>
+        <p:spPr>
+          <a:xfrm>
+            <a:off x="8920911" y="2735442"/>
+            <a:ext cx="2477340" cy="2477340"/>
+          </a:xfrm>
+          <a:prstGeom prst="rect">
+            <a:avLst/>
+          </a:prstGeom>
+        </p:spPr>
+      </p:pic>
+      <p:sp>
+        <p:nvSpPr>
+          <p:cNvPr id="9" name="TextBox 8"/>
+          <p:cNvSpPr txBox="1"/>
+          <p:nvPr/>
+        </p:nvSpPr>
+        <p:spPr>
+          <a:xfrm>
+            <a:off x="2166445" y="1790106"/>
+            <a:ext cx="2626168" cy="646331"/>
+          </a:xfrm>
+          <a:prstGeom prst="rect">
+            <a:avLst/>
+          </a:prstGeom>
+          <a:noFill/>
+        </p:spPr>
+        <p:txBody>
+          <a:bodyPr wrap="square" rtlCol="0">
+            <a:spAutoFit/>
+          </a:bodyPr>
+          <a:lstStyle/>
+          <a:p>
+            <a:r>
+              <a:rPr lang="en-US" dirty="0" smtClean="0"/>
+              <a:t>“Started work on rotation matrix function”</a:t>
+            </a:r>
+            <a:endParaRPr lang="en-US" dirty="0"/>
+          </a:p>
+        </p:txBody>
+      </p:sp>
+      <p:sp>
+        <p:nvSpPr>
+          <p:cNvPr id="10" name="TextBox 9"/>
+          <p:cNvSpPr txBox="1"/>
+          <p:nvPr/>
+        </p:nvSpPr>
+        <p:spPr>
+          <a:xfrm>
+            <a:off x="6746436" y="1790106"/>
+            <a:ext cx="2792818" cy="646331"/>
+          </a:xfrm>
+          <a:prstGeom prst="rect">
+            <a:avLst/>
+          </a:prstGeom>
+          <a:noFill/>
+        </p:spPr>
+        <p:txBody>
+          <a:bodyPr wrap="square" rtlCol="0">
+            <a:spAutoFit/>
+          </a:bodyPr>
+          <a:lstStyle/>
+          <a:p>
+            <a:r>
+              <a:rPr lang="en-US" dirty="0" smtClean="0"/>
+              <a:t>“Added comments to the transition matrix function”</a:t>
+            </a:r>
+            <a:endParaRPr lang="en-US" dirty="0"/>
+          </a:p>
+        </p:txBody>
+      </p:sp>
+      <p:sp>
+        <p:nvSpPr>
+          <p:cNvPr id="11" name="TextBox 10"/>
+          <p:cNvSpPr txBox="1"/>
+          <p:nvPr/>
+        </p:nvSpPr>
+        <p:spPr>
+          <a:xfrm>
+            <a:off x="3591587" y="2433738"/>
+            <a:ext cx="1212519" cy="369332"/>
+          </a:xfrm>
+          <a:prstGeom prst="rect">
+            <a:avLst/>
+          </a:prstGeom>
+          <a:noFill/>
+        </p:spPr>
+        <p:txBody>
+          <a:bodyPr wrap="square" rtlCol="0">
+            <a:spAutoFit/>
+          </a:bodyPr>
+          <a:lstStyle/>
+          <a:p>
+            <a:r>
+              <a:rPr lang="en-US" dirty="0" smtClean="0"/>
+              <a:t>- John</a:t>
+            </a:r>
+            <a:endParaRPr lang="en-US" dirty="0"/>
+          </a:p>
+        </p:txBody>
+      </p:sp>
+      <p:sp>
+        <p:nvSpPr>
+          <p:cNvPr id="12" name="TextBox 11"/>
+          <p:cNvSpPr txBox="1"/>
+          <p:nvPr/>
+        </p:nvSpPr>
+        <p:spPr>
+          <a:xfrm>
+            <a:off x="8378453" y="2433738"/>
+            <a:ext cx="1172294" cy="369332"/>
+          </a:xfrm>
+          <a:prstGeom prst="rect">
+            <a:avLst/>
+          </a:prstGeom>
+          <a:noFill/>
+        </p:spPr>
+        <p:txBody>
+          <a:bodyPr wrap="square" rtlCol="0">
+            <a:spAutoFit/>
+          </a:bodyPr>
+          <a:lstStyle/>
+          <a:p>
+            <a:r>
+              <a:rPr lang="en-US" dirty="0" smtClean="0"/>
+              <a:t>- Steve</a:t>
+            </a:r>
+            <a:endParaRPr lang="en-US" dirty="0"/>
+          </a:p>
+        </p:txBody>
+      </p:sp>
+    </p:spTree>
+    <p:extLst>
+      <p:ext uri="{BB962C8B-B14F-4D97-AF65-F5344CB8AC3E}">
+        <p14:creationId xmlns:p14="http://schemas.microsoft.com/office/powerpoint/2010/main" val="698522601"/>
+      </p:ext>
+    </p:extLst>
+  </p:cSld>
+  <p:clrMapOvr>
+    <a:masterClrMapping/>
+  </p:clrMapOvr>
+  <p:timing>
+    <p:tnLst>
+      <p:par>
+        <p:cTn xmlns:p14="http://schemas.microsoft.com/office/powerpoint/2010/main" id="1" dur="indefinite" restart="never" nodeType="tmRoot">
+          <p:childTnLst>
+            <p:seq concurrent="1" nextAc="seek">
+              <p:cTn id="2" dur="indefinite" nodeType="mainSeq">
+                <p:childTnLst>
+                  <p:par>
+                    <p:cTn id="3" fill="hold">
+                      <p:stCondLst>
+                        <p:cond delay="indefinite"/>
+                      </p:stCondLst>
+                      <p:childTnLst>
+                        <p:par>
+                          <p:cTn id="4" fill="hold">
+                            <p:stCondLst>
+                              <p:cond delay="0"/>
+                            </p:stCondLst>
+                            <p:childTnLst>
+                              <p:par>
+                                <p:cTn id="5" presetID="9" presetClass="entr" presetSubtype="0" fill="hold" nodeType="clickEffect">
+                                  <p:stCondLst>
+                                    <p:cond delay="0"/>
+                                  </p:stCondLst>
+                                  <p:childTnLst>
+                                    <p:set>
+                                      <p:cBhvr>
+                                        <p:cTn id="6" dur="1" fill="hold">
+                                          <p:stCondLst>
+                                            <p:cond delay="0"/>
+                                          </p:stCondLst>
+                                        </p:cTn>
+                                        <p:tgtEl>
+                                          <p:spTgt spid="4"/>
+                                        </p:tgtEl>
+                                        <p:attrNameLst>
+                                          <p:attrName>style.visibility</p:attrName>
+                                        </p:attrNameLst>
+                                      </p:cBhvr>
+                                      <p:to>
+                                        <p:strVal val="visible"/>
+                                      </p:to>
+                                    </p:set>
+                                    <p:animEffect transition="in" filter="dissolve">
+                                      <p:cBhvr>
+                                        <p:cTn id="7" dur="500"/>
+                                        <p:tgtEl>
+                                          <p:spTgt spid="4"/>
+                                        </p:tgtEl>
+                                      </p:cBhvr>
+                                    </p:animEffect>
+                                  </p:childTnLst>
+                                </p:cTn>
+                              </p:par>
+                            </p:childTnLst>
+                          </p:cTn>
+                        </p:par>
+                        <p:par>
+                          <p:cTn id="8" fill="hold">
+                            <p:stCondLst>
+                              <p:cond delay="500"/>
+                            </p:stCondLst>
+                            <p:childTnLst>
+                              <p:par>
+                                <p:cTn id="9" presetID="9" presetClass="entr" presetSubtype="0" fill="hold" nodeType="afterEffect">
+                                  <p:stCondLst>
+                                    <p:cond delay="0"/>
+                                  </p:stCondLst>
+                                  <p:childTnLst>
+                                    <p:set>
+                                      <p:cBhvr>
+                                        <p:cTn id="10" dur="1" fill="hold">
+                                          <p:stCondLst>
+                                            <p:cond delay="0"/>
+                                          </p:stCondLst>
+                                        </p:cTn>
+                                        <p:tgtEl>
+                                          <p:spTgt spid="5"/>
+                                        </p:tgtEl>
+                                        <p:attrNameLst>
+                                          <p:attrName>style.visibility</p:attrName>
+                                        </p:attrNameLst>
+                                      </p:cBhvr>
+                                      <p:to>
+                                        <p:strVal val="visible"/>
+                                      </p:to>
+                                    </p:set>
+                                    <p:animEffect transition="in" filter="dissolve">
+                                      <p:cBhvr>
+                                        <p:cTn id="11" dur="500"/>
+                                        <p:tgtEl>
+                                          <p:spTgt spid="5"/>
+                                        </p:tgtEl>
+                                      </p:cBhvr>
+                                    </p:animEffect>
+                                  </p:childTnLst>
+                                </p:cTn>
+                              </p:par>
+                            </p:childTnLst>
+                          </p:cTn>
+                        </p:par>
+                        <p:par>
+                          <p:cTn id="12" fill="hold">
+                            <p:stCondLst>
+                              <p:cond delay="1000"/>
+                            </p:stCondLst>
+                            <p:childTnLst>
+                              <p:par>
+                                <p:cTn id="13" presetID="9" presetClass="entr" presetSubtype="0" fill="hold" nodeType="afterEffect">
+                                  <p:stCondLst>
+                                    <p:cond delay="0"/>
+                                  </p:stCondLst>
+                                  <p:childTnLst>
+                                    <p:set>
+                                      <p:cBhvr>
+                                        <p:cTn id="14" dur="1" fill="hold">
+                                          <p:stCondLst>
+                                            <p:cond delay="0"/>
+                                          </p:stCondLst>
+                                        </p:cTn>
+                                        <p:tgtEl>
+                                          <p:spTgt spid="7"/>
+                                        </p:tgtEl>
+                                        <p:attrNameLst>
+                                          <p:attrName>style.visibility</p:attrName>
+                                        </p:attrNameLst>
+                                      </p:cBhvr>
+                                      <p:to>
+                                        <p:strVal val="visible"/>
+                                      </p:to>
+                                    </p:set>
+                                    <p:animEffect transition="in" filter="dissolve">
+                                      <p:cBhvr>
+                                        <p:cTn id="15" dur="500"/>
+                                        <p:tgtEl>
+                                          <p:spTgt spid="7"/>
+                                        </p:tgtEl>
+                                      </p:cBhvr>
+                                    </p:animEffect>
+                                  </p:childTnLst>
+                                </p:cTn>
+                              </p:par>
+                            </p:childTnLst>
+                          </p:cTn>
+                        </p:par>
+                        <p:par>
+                          <p:cTn id="16" fill="hold">
+                            <p:stCondLst>
+                              <p:cond delay="1500"/>
+                            </p:stCondLst>
+                            <p:childTnLst>
+                              <p:par>
+                                <p:cTn id="17" presetID="9" presetClass="entr" presetSubtype="0" fill="hold" nodeType="afterEffect">
+                                  <p:stCondLst>
+                                    <p:cond delay="0"/>
+                                  </p:stCondLst>
+                                  <p:childTnLst>
+                                    <p:set>
+                                      <p:cBhvr>
+                                        <p:cTn id="18" dur="1" fill="hold">
+                                          <p:stCondLst>
+                                            <p:cond delay="0"/>
+                                          </p:stCondLst>
+                                        </p:cTn>
+                                        <p:tgtEl>
+                                          <p:spTgt spid="8"/>
+                                        </p:tgtEl>
+                                        <p:attrNameLst>
+                                          <p:attrName>style.visibility</p:attrName>
+                                        </p:attrNameLst>
+                                      </p:cBhvr>
+                                      <p:to>
+                                        <p:strVal val="visible"/>
+                                      </p:to>
+                                    </p:set>
+                                    <p:animEffect transition="in" filter="dissolve">
+                                      <p:cBhvr>
+                                        <p:cTn id="19" dur="500"/>
+                                        <p:tgtEl>
+                                          <p:spTgt spid="8"/>
+                                        </p:tgtEl>
+                                      </p:cBhvr>
+                                    </p:animEffect>
+                                  </p:childTnLst>
+                                </p:cTn>
+                              </p:par>
+                            </p:childTnLst>
+                          </p:cTn>
+                        </p:par>
+                      </p:childTnLst>
+                    </p:cTn>
+                  </p:par>
+                  <p:par>
+                    <p:cTn id="20" fill="hold">
+                      <p:stCondLst>
+                        <p:cond delay="indefinite"/>
+                      </p:stCondLst>
+                      <p:childTnLst>
+                        <p:par>
+                          <p:cTn id="21" fill="hold">
+                            <p:stCondLst>
+                              <p:cond delay="0"/>
+                            </p:stCondLst>
+                            <p:childTnLst>
+                              <p:par>
+                                <p:cTn id="22" presetID="9" presetClass="entr" presetSubtype="0" fill="hold" grpId="0" nodeType="clickEffect">
+                                  <p:stCondLst>
+                                    <p:cond delay="0"/>
+                                  </p:stCondLst>
+                                  <p:childTnLst>
+                                    <p:set>
+                                      <p:cBhvr>
+                                        <p:cTn id="23" dur="1" fill="hold">
+                                          <p:stCondLst>
+                                            <p:cond delay="0"/>
+                                          </p:stCondLst>
+                                        </p:cTn>
+                                        <p:tgtEl>
+                                          <p:spTgt spid="9"/>
+                                        </p:tgtEl>
+                                        <p:attrNameLst>
+                                          <p:attrName>style.visibility</p:attrName>
+                                        </p:attrNameLst>
+                                      </p:cBhvr>
+                                      <p:to>
+                                        <p:strVal val="visible"/>
+                                      </p:to>
+                                    </p:set>
+                                    <p:animEffect transition="in" filter="dissolve">
+                                      <p:cBhvr>
+                                        <p:cTn id="24" dur="500"/>
+                                        <p:tgtEl>
+                                          <p:spTgt spid="9"/>
+                                        </p:tgtEl>
+                                      </p:cBhvr>
+                                    </p:animEffect>
+                                  </p:childTnLst>
+                                </p:cTn>
+                              </p:par>
+                              <p:par>
+                                <p:cTn id="25" presetID="9" presetClass="entr" presetSubtype="0" fill="hold" grpId="0" nodeType="withEffect">
+                                  <p:stCondLst>
+                                    <p:cond delay="0"/>
+                                  </p:stCondLst>
+                                  <p:childTnLst>
+                                    <p:set>
+                                      <p:cBhvr>
+                                        <p:cTn id="26" dur="1" fill="hold">
+                                          <p:stCondLst>
+                                            <p:cond delay="0"/>
+                                          </p:stCondLst>
+                                        </p:cTn>
+                                        <p:tgtEl>
+                                          <p:spTgt spid="10"/>
+                                        </p:tgtEl>
+                                        <p:attrNameLst>
+                                          <p:attrName>style.visibility</p:attrName>
+                                        </p:attrNameLst>
+                                      </p:cBhvr>
+                                      <p:to>
+                                        <p:strVal val="visible"/>
+                                      </p:to>
+                                    </p:set>
+                                    <p:animEffect transition="in" filter="dissolve">
+                                      <p:cBhvr>
+                                        <p:cTn id="27" dur="500"/>
+                                        <p:tgtEl>
+                                          <p:spTgt spid="10"/>
+                                        </p:tgtEl>
+                                      </p:cBhvr>
+                                    </p:animEffect>
+                                  </p:childTnLst>
+                                </p:cTn>
+                              </p:par>
+                            </p:childTnLst>
+                          </p:cTn>
+                        </p:par>
+                      </p:childTnLst>
+                    </p:cTn>
+                  </p:par>
+                  <p:par>
+                    <p:cTn id="28" fill="hold">
+                      <p:stCondLst>
+                        <p:cond delay="indefinite"/>
+                      </p:stCondLst>
+                      <p:childTnLst>
+                        <p:par>
+                          <p:cTn id="29" fill="hold">
+                            <p:stCondLst>
+                              <p:cond delay="0"/>
+                            </p:stCondLst>
+                            <p:childTnLst>
+                              <p:par>
+                                <p:cTn id="30" presetID="9" presetClass="entr" presetSubtype="0" fill="hold" grpId="0" nodeType="clickEffect">
+                                  <p:stCondLst>
+                                    <p:cond delay="0"/>
+                                  </p:stCondLst>
+                                  <p:childTnLst>
+                                    <p:set>
+                                      <p:cBhvr>
+                                        <p:cTn id="31" dur="1" fill="hold">
+                                          <p:stCondLst>
+                                            <p:cond delay="0"/>
+                                          </p:stCondLst>
+                                        </p:cTn>
+                                        <p:tgtEl>
+                                          <p:spTgt spid="11"/>
+                                        </p:tgtEl>
+                                        <p:attrNameLst>
+                                          <p:attrName>style.visibility</p:attrName>
+                                        </p:attrNameLst>
+                                      </p:cBhvr>
+                                      <p:to>
+                                        <p:strVal val="visible"/>
+                                      </p:to>
+                                    </p:set>
+                                    <p:animEffect transition="in" filter="dissolve">
+                                      <p:cBhvr>
+                                        <p:cTn id="32" dur="500"/>
+                                        <p:tgtEl>
+                                          <p:spTgt spid="11"/>
+                                        </p:tgtEl>
+                                      </p:cBhvr>
+                                    </p:animEffect>
+                                  </p:childTnLst>
+                                </p:cTn>
+                              </p:par>
+                              <p:par>
+                                <p:cTn id="33" presetID="9" presetClass="entr" presetSubtype="0" fill="hold" grpId="0" nodeType="withEffect">
+                                  <p:stCondLst>
+                                    <p:cond delay="0"/>
+                                  </p:stCondLst>
+                                  <p:childTnLst>
+                                    <p:set>
+                                      <p:cBhvr>
+                                        <p:cTn id="34" dur="1" fill="hold">
+                                          <p:stCondLst>
+                                            <p:cond delay="0"/>
+                                          </p:stCondLst>
+                                        </p:cTn>
+                                        <p:tgtEl>
+                                          <p:spTgt spid="12"/>
+                                        </p:tgtEl>
+                                        <p:attrNameLst>
+                                          <p:attrName>style.visibility</p:attrName>
+                                        </p:attrNameLst>
+                                      </p:cBhvr>
+                                      <p:to>
+                                        <p:strVal val="visible"/>
+                                      </p:to>
+                                    </p:set>
+                                    <p:animEffect transition="in" filter="dissolve">
+                                      <p:cBhvr>
+                                        <p:cTn id="35" dur="500"/>
+                                        <p:tgtEl>
+                                          <p:spTgt spid="12"/>
+                                        </p:tgtEl>
+                                      </p:cBhvr>
+                                    </p:animEffect>
+                                  </p:childTnLst>
+                                </p:cTn>
+                              </p:par>
+                            </p:childTnLst>
+                          </p:cTn>
+                        </p:par>
+                      </p:childTnLst>
+                    </p:cTn>
+                  </p:par>
+                </p:childTnLst>
+              </p:cTn>
+              <p:prevCondLst>
+                <p:cond evt="onPrev" delay="0">
+                  <p:tgtEl>
+                    <p:sldTgt/>
+                  </p:tgtEl>
+                </p:cond>
+              </p:prevCondLst>
+              <p:nextCondLst>
+                <p:cond evt="onNext" delay="0">
+                  <p:tgtEl>
+                    <p:sldTgt/>
+                  </p:tgtEl>
+                </p:cond>
+              </p:nextCondLst>
+            </p:seq>
+          </p:childTnLst>
+        </p:cTn>
+      </p:par>
+    </p:tnLst>
+    <p:bldLst>
+      <p:bldP spid="9" grpId="0"/>
+      <p:bldP spid="10" grpId="0"/>
+      <p:bldP spid="11" grpId="0"/>
+      <p:bldP spid="12" grpId="0"/>
+    </p:bldLst>
+  </p:timing>
+</p:sld>
+</file>
+
+<file path=ppt/slides/slide5.xml><?xml version="1.0" encoding="utf-8"?>
+<p:sld xmlns:a="http://schemas.openxmlformats.org/drawingml/2006/main" xmlns:r="http://schemas.openxmlformats.org/officeDocument/2006/relationships" xmlns:p="http://schemas.openxmlformats.org/presentationml/2006/main">
+  <p:cSld>
+    <p:spTree>
+      <p:nvGrpSpPr>
+        <p:cNvPr id="1" name=""/>
+        <p:cNvGrpSpPr/>
+        <p:nvPr/>
+      </p:nvGrpSpPr>
+      <p:grpSpPr>
+        <a:xfrm>
+          <a:off x="0" y="0"/>
+          <a:ext cx="0" cy="0"/>
+          <a:chOff x="0" y="0"/>
+          <a:chExt cx="0" cy="0"/>
+        </a:xfrm>
+      </p:grpSpPr>
+      <p:sp>
+        <p:nvSpPr>
+          <p:cNvPr id="2" name="Title 1"/>
+          <p:cNvSpPr>
+            <a:spLocks noGrp="1"/>
+          </p:cNvSpPr>
+          <p:nvPr>
+            <p:ph type="title"/>
+          </p:nvPr>
+        </p:nvSpPr>
+        <p:spPr/>
+        <p:txBody>
+          <a:bodyPr/>
+          <a:lstStyle/>
+          <a:p>
+            <a:r>
+              <a:rPr lang="en-US" dirty="0" smtClean="0"/>
+              <a:t>Extra Uses of Version Control</a:t>
+            </a:r>
+            <a:endParaRPr lang="en-US" dirty="0"/>
+          </a:p>
+        </p:txBody>
+      </p:sp>
+      <p:sp>
+        <p:nvSpPr>
+          <p:cNvPr id="3" name="Content Placeholder 2"/>
+          <p:cNvSpPr>
+            <a:spLocks noGrp="1"/>
+          </p:cNvSpPr>
+          <p:nvPr>
+            <p:ph idx="1"/>
+          </p:nvPr>
+        </p:nvSpPr>
+        <p:spPr/>
+        <p:txBody>
+          <a:bodyPr/>
+          <a:lstStyle/>
+          <a:p>
+            <a:endParaRPr lang="en-US"/>
+          </a:p>
+        </p:txBody>
+      </p:sp>
+    </p:spTree>
+    <p:extLst>
+      <p:ext uri="{BB962C8B-B14F-4D97-AF65-F5344CB8AC3E}">
+        <p14:creationId xmlns:p14="http://schemas.microsoft.com/office/powerpoint/2010/main" val="1746747161"/>
+      </p:ext>
+    </p:extLst>
+  </p:cSld>
+  <p:clrMapOvr>
+    <a:masterClrMapping/>
+  </p:clrMapOvr>
+  <p:timing>
+    <p:tnLst>
+      <p:par>
+        <p:cTn xmlns:p14="http://schemas.microsoft.com/office/powerpoint/2010/main" id="1" dur="indefinite" restart="never" nodeType="tmRoot"/>
+      </p:par>
+    </p:tnLst>
+  </p:timing>
+</p:sld>
+</file>
+
+<file path=ppt/slides/slide6.xml><?xml version="1.0" encoding="utf-8"?>
+<p:sld xmlns:a="http://schemas.openxmlformats.org/drawingml/2006/main" xmlns:r="http://schemas.openxmlformats.org/officeDocument/2006/relationships" xmlns:p="http://schemas.openxmlformats.org/presentationml/2006/main">
+  <p:cSld>
+    <p:spTree>
+      <p:nvGrpSpPr>
+        <p:cNvPr id="1" name=""/>
+        <p:cNvGrpSpPr/>
+        <p:nvPr/>
+      </p:nvGrpSpPr>
+      <p:grpSpPr>
+        <a:xfrm>
+          <a:off x="0" y="0"/>
+          <a:ext cx="0" cy="0"/>
+          <a:chOff x="0" y="0"/>
+          <a:chExt cx="0" cy="0"/>
+        </a:xfrm>
+      </p:grpSpPr>
+      <p:sp>
+        <p:nvSpPr>
+          <p:cNvPr id="2" name="Title 1"/>
+          <p:cNvSpPr>
+            <a:spLocks noGrp="1"/>
+          </p:cNvSpPr>
+          <p:nvPr>
+            <p:ph type="title"/>
+          </p:nvPr>
+        </p:nvSpPr>
+        <p:spPr/>
+        <p:txBody>
+          <a:bodyPr/>
+          <a:lstStyle/>
+          <a:p>
+            <a:r>
+              <a:rPr lang="en-US" dirty="0" smtClean="0"/>
+              <a:t>Repository vs. File</a:t>
+            </a:r>
+            <a:endParaRPr lang="en-US" dirty="0"/>
+          </a:p>
+        </p:txBody>
+      </p:sp>
+      <p:sp>
+        <p:nvSpPr>
+          <p:cNvPr id="3" name="Content Placeholder 2"/>
+          <p:cNvSpPr>
+            <a:spLocks noGrp="1"/>
+          </p:cNvSpPr>
+          <p:nvPr>
+            <p:ph idx="1"/>
+          </p:nvPr>
+        </p:nvSpPr>
+        <p:spPr/>
+        <p:txBody>
+          <a:bodyPr/>
+          <a:lstStyle/>
+          <a:p>
+            <a:endParaRPr lang="en-US"/>
+          </a:p>
+        </p:txBody>
+      </p:sp>
+    </p:spTree>
+    <p:extLst>
+      <p:ext uri="{BB962C8B-B14F-4D97-AF65-F5344CB8AC3E}">
+        <p14:creationId xmlns:p14="http://schemas.microsoft.com/office/powerpoint/2010/main" val="1337674138"/>
+      </p:ext>
+    </p:extLst>
+  </p:cSld>
+  <p:clrMapOvr>
+    <a:masterClrMapping/>
+  </p:clrMapOvr>
+  <p:timing>
+    <p:tnLst>
+      <p:par>
+        <p:cTn xmlns:p14="http://schemas.microsoft.com/office/powerpoint/2010/main" id="1" dur="indefinite" restart="never" nodeType="tmRoot"/>
+      </p:par>
+    </p:tnLst>
+  </p:timing>
+</p:sld>
+</file>
+
+<file path=ppt/slides/slide7.xml><?xml version="1.0" encoding="utf-8"?>
+<p:sld xmlns:a="http://schemas.openxmlformats.org/drawingml/2006/main" xmlns:r="http://schemas.openxmlformats.org/officeDocument/2006/relationships" xmlns:p="http://schemas.openxmlformats.org/presentationml/2006/main">
+  <p:cSld>
+    <p:spTree>
+      <p:nvGrpSpPr>
+        <p:cNvPr id="1" name=""/>
+        <p:cNvGrpSpPr/>
+        <p:nvPr/>
+      </p:nvGrpSpPr>
+      <p:grpSpPr>
+        <a:xfrm>
+          <a:off x="0" y="0"/>
+          <a:ext cx="0" cy="0"/>
+          <a:chOff x="0" y="0"/>
+          <a:chExt cx="0" cy="0"/>
+        </a:xfrm>
+      </p:grpSpPr>
+      <p:sp>
+        <p:nvSpPr>
+          <p:cNvPr id="2" name="Title 1"/>
+          <p:cNvSpPr>
+            <a:spLocks noGrp="1"/>
+          </p:cNvSpPr>
+          <p:nvPr>
+            <p:ph type="title"/>
+          </p:nvPr>
+        </p:nvSpPr>
+        <p:spPr/>
+        <p:txBody>
+          <a:bodyPr/>
+          <a:lstStyle/>
+          <a:p>
+            <a:r>
+              <a:rPr lang="en-US" dirty="0" smtClean="0"/>
+              <a:t>Main Types of Version Control</a:t>
+            </a:r>
+            <a:endParaRPr lang="en-US" dirty="0"/>
+          </a:p>
+        </p:txBody>
+      </p:sp>
+      <p:sp>
+        <p:nvSpPr>
+          <p:cNvPr id="3" name="Content Placeholder 2"/>
+          <p:cNvSpPr>
+            <a:spLocks noGrp="1"/>
+          </p:cNvSpPr>
+          <p:nvPr>
+            <p:ph idx="1"/>
+          </p:nvPr>
+        </p:nvSpPr>
+        <p:spPr/>
+        <p:txBody>
+          <a:bodyPr/>
+          <a:lstStyle/>
+          <a:p>
+            <a:endParaRPr lang="en-US"/>
+          </a:p>
+        </p:txBody>
+      </p:sp>
+    </p:spTree>
+    <p:extLst>
+      <p:ext uri="{BB962C8B-B14F-4D97-AF65-F5344CB8AC3E}">
+        <p14:creationId xmlns:p14="http://schemas.microsoft.com/office/powerpoint/2010/main" val="3253705130"/>
+      </p:ext>
+    </p:extLst>
+  </p:cSld>
+  <p:clrMapOvr>
+    <a:masterClrMapping/>
+  </p:clrMapOvr>
+</p:sld>
+</file>
+
+<file path=ppt/slides/slide8.xml><?xml version="1.0" encoding="utf-8"?>
+<p:sld xmlns:a="http://schemas.openxmlformats.org/drawingml/2006/main" xmlns:r="http://schemas.openxmlformats.org/officeDocument/2006/relationships" xmlns:p="http://schemas.openxmlformats.org/presentationml/2006/main">
+  <p:cSld>
+    <p:spTree>
+      <p:nvGrpSpPr>
+        <p:cNvPr id="1" name=""/>
+        <p:cNvGrpSpPr/>
+        <p:nvPr/>
+      </p:nvGrpSpPr>
+      <p:grpSpPr>
+        <a:xfrm>
+          <a:off x="0" y="0"/>
+          <a:ext cx="0" cy="0"/>
+          <a:chOff x="0" y="0"/>
+          <a:chExt cx="0" cy="0"/>
+        </a:xfrm>
+      </p:grpSpPr>
+      <p:sp>
+        <p:nvSpPr>
+          <p:cNvPr id="2" name="Title 1"/>
+          <p:cNvSpPr>
+            <a:spLocks noGrp="1"/>
+          </p:cNvSpPr>
+          <p:nvPr>
+            <p:ph type="title"/>
+          </p:nvPr>
+        </p:nvSpPr>
+        <p:spPr/>
+        <p:txBody>
+          <a:bodyPr/>
+          <a:lstStyle/>
+          <a:p>
+            <a:r>
+              <a:rPr lang="en-US" dirty="0" smtClean="0"/>
+              <a:t>Centralized Version Control</a:t>
+            </a:r>
+            <a:endParaRPr lang="en-US" dirty="0"/>
+          </a:p>
+        </p:txBody>
+      </p:sp>
+      <p:sp>
+        <p:nvSpPr>
+          <p:cNvPr id="3" name="Content Placeholder 2"/>
+          <p:cNvSpPr>
+            <a:spLocks noGrp="1"/>
+          </p:cNvSpPr>
+          <p:nvPr>
+            <p:ph idx="1"/>
+          </p:nvPr>
+        </p:nvSpPr>
+        <p:spPr/>
+        <p:txBody>
+          <a:bodyPr/>
+          <a:lstStyle/>
+          <a:p>
+            <a:endParaRPr lang="en-US"/>
+          </a:p>
+        </p:txBody>
+      </p:sp>
+    </p:spTree>
+    <p:extLst>
+      <p:ext uri="{BB962C8B-B14F-4D97-AF65-F5344CB8AC3E}">
+        <p14:creationId xmlns:p14="http://schemas.microsoft.com/office/powerpoint/2010/main" val="791855548"/>
+      </p:ext>
+    </p:extLst>
+  </p:cSld>
+  <p:clrMapOvr>
+    <a:masterClrMapping/>
+  </p:clrMapOvr>
+</p:sld>
+</file>
+
+<file path=ppt/slides/slide9.xml><?xml version="1.0" encoding="utf-8"?>
+<p:sld xmlns:a="http://schemas.openxmlformats.org/drawingml/2006/main" xmlns:r="http://schemas.openxmlformats.org/officeDocument/2006/relationships" xmlns:p="http://schemas.openxmlformats.org/presentationml/2006/main">
+  <p:cSld>
+    <p:spTree>
+      <p:nvGrpSpPr>
+        <p:cNvPr id="1" name=""/>
+        <p:cNvGrpSpPr/>
+        <p:nvPr/>
+      </p:nvGrpSpPr>
+      <p:grpSpPr>
+        <a:xfrm>
+          <a:off x="0" y="0"/>
+          <a:ext cx="0" cy="0"/>
+          <a:chOff x="0" y="0"/>
+          <a:chExt cx="0" cy="0"/>
+        </a:xfrm>
+      </p:grpSpPr>
+      <p:sp>
+        <p:nvSpPr>
+          <p:cNvPr id="2" name="Title 1"/>
+          <p:cNvSpPr>
+            <a:spLocks noGrp="1"/>
+          </p:cNvSpPr>
+          <p:nvPr>
+            <p:ph type="title"/>
+          </p:nvPr>
+        </p:nvSpPr>
+        <p:spPr/>
+        <p:txBody>
+          <a:bodyPr/>
+          <a:lstStyle/>
+          <a:p>
+            <a:r>
+              <a:rPr lang="en-US" dirty="0" smtClean="0"/>
+              <a:t>Decentralized Version Control</a:t>
+            </a:r>
+            <a:endParaRPr lang="en-US" dirty="0"/>
+          </a:p>
+        </p:txBody>
+      </p:sp>
+      <p:sp>
+        <p:nvSpPr>
+          <p:cNvPr id="3" name="Content Placeholder 2"/>
+          <p:cNvSpPr>
+            <a:spLocks noGrp="1"/>
+          </p:cNvSpPr>
+          <p:nvPr>
+            <p:ph idx="1"/>
+          </p:nvPr>
+        </p:nvSpPr>
+        <p:spPr/>
+        <p:txBody>
+          <a:bodyPr/>
+          <a:lstStyle/>
+          <a:p>
+            <a:endParaRPr lang="en-US"/>
+          </a:p>
+        </p:txBody>
+      </p:sp>
+    </p:spTree>
+    <p:extLst>
+      <p:ext uri="{BB962C8B-B14F-4D97-AF65-F5344CB8AC3E}">
+        <p14:creationId xmlns:p14="http://schemas.microsoft.com/office/powerpoint/2010/main" val="4232224287"/>
       </p:ext>
     </p:extLst>
   </p:cSld>
@@ -3058,7 +5590,7 @@
     </a:clrScheme>
     <a:fontScheme name="Office">
       <a:majorFont>
-        <a:latin typeface="Calibri Light" panose="020F0302020204030204"/>
+        <a:latin typeface="Calibri Light"/>
         <a:ea typeface=""/>
         <a:cs typeface=""/>
         <a:font script="Jpan" typeface="ＭＳ Ｐゴシック"/>
@@ -3093,7 +5625,7 @@
         <a:font script="Geor" typeface="Sylfaen"/>
       </a:majorFont>
       <a:minorFont>
-        <a:latin typeface="Calibri" panose="020F0502020204030204"/>
+        <a:latin typeface="Calibri"/>
         <a:ea typeface=""/>
         <a:cs typeface=""/>
         <a:font script="Jpan" typeface="ＭＳ Ｐゴシック"/>
@@ -3270,7 +5802,7 @@
   <a:extraClrSchemeLst/>
   <a:extLst>
     <a:ext uri="{05A4C25C-085E-4340-85A3-A5531E510DB2}">
-      <thm15:themeFamily xmlns:thm15="http://schemas.microsoft.com/office/thememl/2012/main" name="Office Theme" id="{62F939B6-93AF-4DB8-9C6B-D6C7DFDC589F}" vid="{4A3C46E8-61CC-4603-A589-7422A47A8E4A}"/>
+      <thm15:themeFamily xmlns:thm15="http://schemas.microsoft.com/office/thememl/2012/main" xmlns="" name="Office Theme" id="{62F939B6-93AF-4DB8-9C6B-D6C7DFDC589F}" vid="{4A3C46E8-61CC-4603-A589-7422A47A8E4A}"/>
     </a:ext>
   </a:extLst>
 </a:theme>

</xml_diff>

<commit_message>
worked on git presentation
</commit_message>
<xml_diff>
--- a/git_presentation/git_presentation.pptx
+++ b/git_presentation/git_presentation.pptx
@@ -124,6 +124,22 @@
       </a:defRPr>
     </a:lvl9pPr>
   </p:defaultTextStyle>
+  <p:extLst>
+    <p:ext uri="{EFAFB233-063F-42B5-8137-9DF3F51BA10A}">
+      <p15:sldGuideLst xmlns:p15="http://schemas.microsoft.com/office/powerpoint/2012/main">
+        <p15:guide id="1" orient="horz" pos="2160">
+          <p15:clr>
+            <a:srgbClr val="A4A3A4"/>
+          </p15:clr>
+        </p15:guide>
+        <p15:guide id="2" pos="3840">
+          <p15:clr>
+            <a:srgbClr val="A4A3A4"/>
+          </p15:clr>
+        </p15:guide>
+      </p15:sldGuideLst>
+    </p:ext>
+  </p:extLst>
 </p:presentation>
 </file>
 
@@ -258,7 +274,7 @@
           <a:p>
             <a:fld id="{7E3245CE-4719-4FC9-B907-BD8BBC34E05C}" type="datetimeFigureOut">
               <a:rPr lang="en-US" smtClean="0"/>
-              <a:t>9/21/15</a:t>
+              <a:t>9/22/2015</a:t>
             </a:fld>
             <a:endParaRPr lang="en-US"/>
           </a:p>
@@ -428,7 +444,7 @@
           <a:p>
             <a:fld id="{7E3245CE-4719-4FC9-B907-BD8BBC34E05C}" type="datetimeFigureOut">
               <a:rPr lang="en-US" smtClean="0"/>
-              <a:t>9/21/15</a:t>
+              <a:t>9/22/2015</a:t>
             </a:fld>
             <a:endParaRPr lang="en-US"/>
           </a:p>
@@ -608,7 +624,7 @@
           <a:p>
             <a:fld id="{7E3245CE-4719-4FC9-B907-BD8BBC34E05C}" type="datetimeFigureOut">
               <a:rPr lang="en-US" smtClean="0"/>
-              <a:t>9/21/15</a:t>
+              <a:t>9/22/2015</a:t>
             </a:fld>
             <a:endParaRPr lang="en-US"/>
           </a:p>
@@ -778,7 +794,7 @@
           <a:p>
             <a:fld id="{7E3245CE-4719-4FC9-B907-BD8BBC34E05C}" type="datetimeFigureOut">
               <a:rPr lang="en-US" smtClean="0"/>
-              <a:t>9/21/15</a:t>
+              <a:t>9/22/2015</a:t>
             </a:fld>
             <a:endParaRPr lang="en-US"/>
           </a:p>
@@ -1024,7 +1040,7 @@
           <a:p>
             <a:fld id="{7E3245CE-4719-4FC9-B907-BD8BBC34E05C}" type="datetimeFigureOut">
               <a:rPr lang="en-US" smtClean="0"/>
-              <a:t>9/21/15</a:t>
+              <a:t>9/22/2015</a:t>
             </a:fld>
             <a:endParaRPr lang="en-US"/>
           </a:p>
@@ -1256,7 +1272,7 @@
           <a:p>
             <a:fld id="{7E3245CE-4719-4FC9-B907-BD8BBC34E05C}" type="datetimeFigureOut">
               <a:rPr lang="en-US" smtClean="0"/>
-              <a:t>9/21/15</a:t>
+              <a:t>9/22/2015</a:t>
             </a:fld>
             <a:endParaRPr lang="en-US"/>
           </a:p>
@@ -1623,7 +1639,7 @@
           <a:p>
             <a:fld id="{7E3245CE-4719-4FC9-B907-BD8BBC34E05C}" type="datetimeFigureOut">
               <a:rPr lang="en-US" smtClean="0"/>
-              <a:t>9/21/15</a:t>
+              <a:t>9/22/2015</a:t>
             </a:fld>
             <a:endParaRPr lang="en-US"/>
           </a:p>
@@ -1741,7 +1757,7 @@
           <a:p>
             <a:fld id="{7E3245CE-4719-4FC9-B907-BD8BBC34E05C}" type="datetimeFigureOut">
               <a:rPr lang="en-US" smtClean="0"/>
-              <a:t>9/21/15</a:t>
+              <a:t>9/22/2015</a:t>
             </a:fld>
             <a:endParaRPr lang="en-US"/>
           </a:p>
@@ -1836,7 +1852,7 @@
           <a:p>
             <a:fld id="{7E3245CE-4719-4FC9-B907-BD8BBC34E05C}" type="datetimeFigureOut">
               <a:rPr lang="en-US" smtClean="0"/>
-              <a:t>9/21/15</a:t>
+              <a:t>9/22/2015</a:t>
             </a:fld>
             <a:endParaRPr lang="en-US"/>
           </a:p>
@@ -2113,7 +2129,7 @@
           <a:p>
             <a:fld id="{7E3245CE-4719-4FC9-B907-BD8BBC34E05C}" type="datetimeFigureOut">
               <a:rPr lang="en-US" smtClean="0"/>
-              <a:t>9/21/15</a:t>
+              <a:t>9/22/2015</a:t>
             </a:fld>
             <a:endParaRPr lang="en-US"/>
           </a:p>
@@ -2366,7 +2382,7 @@
           <a:p>
             <a:fld id="{7E3245CE-4719-4FC9-B907-BD8BBC34E05C}" type="datetimeFigureOut">
               <a:rPr lang="en-US" smtClean="0"/>
-              <a:t>9/21/15</a:t>
+              <a:t>9/22/2015</a:t>
             </a:fld>
             <a:endParaRPr lang="en-US"/>
           </a:p>
@@ -2579,7 +2595,7 @@
           <a:p>
             <a:fld id="{7E3245CE-4719-4FC9-B907-BD8BBC34E05C}" type="datetimeFigureOut">
               <a:rPr lang="en-US" smtClean="0"/>
-              <a:t>9/21/15</a:t>
+              <a:t>9/22/2015</a:t>
             </a:fld>
             <a:endParaRPr lang="en-US"/>
           </a:p>
@@ -3068,7 +3084,7 @@
   <p:timing>
     <p:tnLst>
       <p:par>
-        <p:cTn xmlns:p14="http://schemas.microsoft.com/office/powerpoint/2010/main" id="1" dur="indefinite" restart="never" nodeType="tmRoot"/>
+        <p:cTn id="1" dur="indefinite" restart="never" nodeType="tmRoot"/>
       </p:par>
     </p:tnLst>
   </p:timing>
@@ -3148,6 +3164,13 @@
   <p:clrMapOvr>
     <a:masterClrMapping/>
   </p:clrMapOvr>
+  <p:timing>
+    <p:tnLst>
+      <p:par>
+        <p:cTn id="1" dur="indefinite" restart="never" nodeType="tmRoot"/>
+      </p:par>
+    </p:tnLst>
+  </p:timing>
 </p:sld>
 </file>
 
@@ -3224,6 +3247,13 @@
   <p:clrMapOvr>
     <a:masterClrMapping/>
   </p:clrMapOvr>
+  <p:timing>
+    <p:tnLst>
+      <p:par>
+        <p:cTn id="1" dur="indefinite" restart="never" nodeType="tmRoot"/>
+      </p:par>
+    </p:tnLst>
+  </p:timing>
 </p:sld>
 </file>
 
@@ -3300,6 +3330,13 @@
   <p:clrMapOvr>
     <a:masterClrMapping/>
   </p:clrMapOvr>
+  <p:timing>
+    <p:tnLst>
+      <p:par>
+        <p:cTn id="1" dur="indefinite" restart="never" nodeType="tmRoot"/>
+      </p:par>
+    </p:tnLst>
+  </p:timing>
 </p:sld>
 </file>
 
@@ -3384,6 +3421,13 @@
   <p:clrMapOvr>
     <a:masterClrMapping/>
   </p:clrMapOvr>
+  <p:timing>
+    <p:tnLst>
+      <p:par>
+        <p:cTn id="1" dur="indefinite" restart="never" nodeType="tmRoot"/>
+      </p:par>
+    </p:tnLst>
+  </p:timing>
 </p:sld>
 </file>
 
@@ -3460,6 +3504,13 @@
   <p:clrMapOvr>
     <a:masterClrMapping/>
   </p:clrMapOvr>
+  <p:timing>
+    <p:tnLst>
+      <p:par>
+        <p:cTn id="1" dur="indefinite" restart="never" nodeType="tmRoot"/>
+      </p:par>
+    </p:tnLst>
+  </p:timing>
 </p:sld>
 </file>
 
@@ -3536,6 +3587,13 @@
   <p:clrMapOvr>
     <a:masterClrMapping/>
   </p:clrMapOvr>
+  <p:timing>
+    <p:tnLst>
+      <p:par>
+        <p:cTn id="1" dur="indefinite" restart="never" nodeType="tmRoot"/>
+      </p:par>
+    </p:tnLst>
+  </p:timing>
 </p:sld>
 </file>
 
@@ -3612,6 +3670,13 @@
   <p:clrMapOvr>
     <a:masterClrMapping/>
   </p:clrMapOvr>
+  <p:timing>
+    <p:tnLst>
+      <p:par>
+        <p:cTn id="1" dur="indefinite" restart="never" nodeType="tmRoot"/>
+      </p:par>
+    </p:tnLst>
+  </p:timing>
 </p:sld>
 </file>
 
@@ -3696,6 +3761,13 @@
   <p:clrMapOvr>
     <a:masterClrMapping/>
   </p:clrMapOvr>
+  <p:timing>
+    <p:tnLst>
+      <p:par>
+        <p:cTn id="1" dur="indefinite" restart="never" nodeType="tmRoot"/>
+      </p:par>
+    </p:tnLst>
+  </p:timing>
 </p:sld>
 </file>
 
@@ -3772,6 +3844,13 @@
   <p:clrMapOvr>
     <a:masterClrMapping/>
   </p:clrMapOvr>
+  <p:timing>
+    <p:tnLst>
+      <p:par>
+        <p:cTn id="1" dur="indefinite" restart="never" nodeType="tmRoot"/>
+      </p:par>
+    </p:tnLst>
+  </p:timing>
 </p:sld>
 </file>
 
@@ -3848,6 +3927,13 @@
   <p:clrMapOvr>
     <a:masterClrMapping/>
   </p:clrMapOvr>
+  <p:timing>
+    <p:tnLst>
+      <p:par>
+        <p:cTn id="1" dur="indefinite" restart="never" nodeType="tmRoot"/>
+      </p:par>
+    </p:tnLst>
+  </p:timing>
 </p:sld>
 </file>
 
@@ -3968,7 +4054,7 @@
   <p:timing>
     <p:tnLst>
       <p:par>
-        <p:cTn xmlns:p14="http://schemas.microsoft.com/office/powerpoint/2010/main" id="1" dur="indefinite" restart="never" nodeType="tmRoot"/>
+        <p:cTn id="1" dur="indefinite" restart="never" nodeType="tmRoot"/>
       </p:par>
     </p:tnLst>
   </p:timing>
@@ -4044,6 +4130,13 @@
   <p:clrMapOvr>
     <a:masterClrMapping/>
   </p:clrMapOvr>
+  <p:timing>
+    <p:tnLst>
+      <p:par>
+        <p:cTn id="1" dur="indefinite" restart="never" nodeType="tmRoot"/>
+      </p:par>
+    </p:tnLst>
+  </p:timing>
 </p:sld>
 </file>
 
@@ -4116,6 +4209,13 @@
   <p:clrMapOvr>
     <a:masterClrMapping/>
   </p:clrMapOvr>
+  <p:timing>
+    <p:tnLst>
+      <p:par>
+        <p:cTn id="1" dur="indefinite" restart="never" nodeType="tmRoot"/>
+      </p:par>
+    </p:tnLst>
+  </p:timing>
 </p:sld>
 </file>
 
@@ -4244,7 +4344,7 @@
   <p:timing>
     <p:tnLst>
       <p:par>
-        <p:cTn xmlns:p14="http://schemas.microsoft.com/office/powerpoint/2010/main" id="1" dur="indefinite" restart="never" nodeType="tmRoot">
+        <p:cTn id="1" dur="indefinite" restart="never" nodeType="tmRoot">
           <p:childTnLst>
             <p:seq concurrent="1" nextAc="seek">
               <p:cTn id="2" dur="indefinite" nodeType="mainSeq">
@@ -4776,7 +4876,7 @@
   <p:timing>
     <p:tnLst>
       <p:par>
-        <p:cTn xmlns:p14="http://schemas.microsoft.com/office/powerpoint/2010/main" id="1" dur="indefinite" restart="never" nodeType="tmRoot">
+        <p:cTn id="1" dur="indefinite" restart="never" nodeType="tmRoot">
           <p:childTnLst>
             <p:seq concurrent="1" nextAc="seek">
               <p:cTn id="2" dur="indefinite" nodeType="mainSeq">
@@ -4828,24 +4928,15 @@
                                   </p:childTnLst>
                                 </p:cTn>
                               </p:par>
-                            </p:childTnLst>
-                          </p:cTn>
-                        </p:par>
-                        <p:par>
-                          <p:cTn id="8" fill="hold">
-                            <p:stCondLst>
-                              <p:cond delay="500"/>
-                            </p:stCondLst>
-                            <p:childTnLst>
                               <p:par>
-                                <p:cTn id="9" presetID="9" presetClass="entr" presetSubtype="0" fill="hold" nodeType="afterEffect">
+                                <p:cTn id="8" presetID="9" presetClass="entr" presetSubtype="0" fill="hold" nodeType="withEffect">
                                   <p:stCondLst>
                                     <p:cond delay="0"/>
                                   </p:stCondLst>
                                   <p:childTnLst>
                                     <p:set>
                                       <p:cBhvr>
-                                        <p:cTn id="10" dur="1" fill="hold">
+                                        <p:cTn id="9" dur="1" fill="hold">
                                           <p:stCondLst>
                                             <p:cond delay="0"/>
                                           </p:stCondLst>
@@ -4863,7 +4954,7 @@
                                     </p:set>
                                     <p:animEffect transition="in" filter="dissolve">
                                       <p:cBhvr>
-                                        <p:cTn id="11" dur="500"/>
+                                        <p:cTn id="10" dur="500"/>
                                         <p:tgtEl>
                                           <p:spTgt spid="5"/>
                                         </p:tgtEl>
@@ -4876,20 +4967,20 @@
                           </p:cTn>
                         </p:par>
                         <p:par>
-                          <p:cTn id="12" fill="hold">
+                          <p:cTn id="11" fill="hold">
                             <p:stCondLst>
-                              <p:cond delay="1000"/>
+                              <p:cond delay="500"/>
                             </p:stCondLst>
                             <p:childTnLst>
                               <p:par>
-                                <p:cTn id="13" presetID="9" presetClass="entr" presetSubtype="0" fill="hold" nodeType="afterEffect">
+                                <p:cTn id="12" presetID="9" presetClass="entr" presetSubtype="0" fill="hold" nodeType="afterEffect">
                                   <p:stCondLst>
                                     <p:cond delay="0"/>
                                   </p:stCondLst>
                                   <p:childTnLst>
                                     <p:set>
                                       <p:cBhvr>
-                                        <p:cTn id="14" dur="1" fill="hold">
+                                        <p:cTn id="13" dur="1" fill="hold">
                                           <p:stCondLst>
                                             <p:cond delay="0"/>
                                           </p:stCondLst>
@@ -4907,7 +4998,7 @@
                                     </p:set>
                                     <p:animEffect transition="in" filter="dissolve">
                                       <p:cBhvr>
-                                        <p:cTn id="15" dur="500"/>
+                                        <p:cTn id="14" dur="500"/>
                                         <p:tgtEl>
                                           <p:spTgt spid="7"/>
                                         </p:tgtEl>
@@ -4916,24 +5007,15 @@
                                   </p:childTnLst>
                                 </p:cTn>
                               </p:par>
-                            </p:childTnLst>
-                          </p:cTn>
-                        </p:par>
-                        <p:par>
-                          <p:cTn id="16" fill="hold">
-                            <p:stCondLst>
-                              <p:cond delay="1500"/>
-                            </p:stCondLst>
-                            <p:childTnLst>
                               <p:par>
-                                <p:cTn id="17" presetID="9" presetClass="entr" presetSubtype="0" fill="hold" nodeType="afterEffect">
+                                <p:cTn id="15" presetID="9" presetClass="entr" presetSubtype="0" fill="hold" nodeType="withEffect">
                                   <p:stCondLst>
                                     <p:cond delay="0"/>
                                   </p:stCondLst>
                                   <p:childTnLst>
                                     <p:set>
                                       <p:cBhvr>
-                                        <p:cTn id="18" dur="1" fill="hold">
+                                        <p:cTn id="16" dur="1" fill="hold">
                                           <p:stCondLst>
                                             <p:cond delay="0"/>
                                           </p:stCondLst>
@@ -4951,7 +5033,7 @@
                                     </p:set>
                                     <p:animEffect transition="in" filter="dissolve">
                                       <p:cBhvr>
-                                        <p:cTn id="19" dur="500"/>
+                                        <p:cTn id="17" dur="500"/>
                                         <p:tgtEl>
                                           <p:spTgt spid="8"/>
                                         </p:tgtEl>
@@ -4967,26 +5049,26 @@
                     </p:cTn>
                   </p:par>
                   <p:par>
-                    <p:cTn id="20" fill="hold">
+                    <p:cTn id="18" fill="hold">
                       <p:stCondLst>
                         <p:cond delay="indefinite"/>
                       </p:stCondLst>
                       <p:childTnLst>
                         <p:par>
-                          <p:cTn id="21" fill="hold">
+                          <p:cTn id="19" fill="hold">
                             <p:stCondLst>
                               <p:cond delay="0"/>
                             </p:stCondLst>
                             <p:childTnLst>
                               <p:par>
-                                <p:cTn id="22" presetID="9" presetClass="entr" presetSubtype="0" fill="hold" grpId="0" nodeType="clickEffect">
+                                <p:cTn id="20" presetID="9" presetClass="entr" presetSubtype="0" fill="hold" grpId="0" nodeType="clickEffect">
                                   <p:stCondLst>
                                     <p:cond delay="0"/>
                                   </p:stCondLst>
                                   <p:childTnLst>
                                     <p:set>
                                       <p:cBhvr>
-                                        <p:cTn id="23" dur="1" fill="hold">
+                                        <p:cTn id="21" dur="1" fill="hold">
                                           <p:stCondLst>
                                             <p:cond delay="0"/>
                                           </p:stCondLst>
@@ -5004,7 +5086,7 @@
                                     </p:set>
                                     <p:animEffect transition="in" filter="dissolve">
                                       <p:cBhvr>
-                                        <p:cTn id="24" dur="500"/>
+                                        <p:cTn id="22" dur="500"/>
                                         <p:tgtEl>
                                           <p:spTgt spid="9"/>
                                         </p:tgtEl>
@@ -5014,14 +5096,14 @@
                                 </p:cTn>
                               </p:par>
                               <p:par>
-                                <p:cTn id="25" presetID="9" presetClass="entr" presetSubtype="0" fill="hold" grpId="0" nodeType="withEffect">
+                                <p:cTn id="23" presetID="9" presetClass="entr" presetSubtype="0" fill="hold" grpId="0" nodeType="withEffect">
                                   <p:stCondLst>
                                     <p:cond delay="0"/>
                                   </p:stCondLst>
                                   <p:childTnLst>
                                     <p:set>
                                       <p:cBhvr>
-                                        <p:cTn id="26" dur="1" fill="hold">
+                                        <p:cTn id="24" dur="1" fill="hold">
                                           <p:stCondLst>
                                             <p:cond delay="0"/>
                                           </p:stCondLst>
@@ -5039,7 +5121,7 @@
                                     </p:set>
                                     <p:animEffect transition="in" filter="dissolve">
                                       <p:cBhvr>
-                                        <p:cTn id="27" dur="500"/>
+                                        <p:cTn id="25" dur="500"/>
                                         <p:tgtEl>
                                           <p:spTgt spid="10"/>
                                         </p:tgtEl>
@@ -5055,26 +5137,26 @@
                     </p:cTn>
                   </p:par>
                   <p:par>
-                    <p:cTn id="28" fill="hold">
+                    <p:cTn id="26" fill="hold">
                       <p:stCondLst>
                         <p:cond delay="indefinite"/>
                       </p:stCondLst>
                       <p:childTnLst>
                         <p:par>
-                          <p:cTn id="29" fill="hold">
+                          <p:cTn id="27" fill="hold">
                             <p:stCondLst>
                               <p:cond delay="0"/>
                             </p:stCondLst>
                             <p:childTnLst>
                               <p:par>
-                                <p:cTn id="30" presetID="9" presetClass="entr" presetSubtype="0" fill="hold" grpId="0" nodeType="clickEffect">
+                                <p:cTn id="28" presetID="9" presetClass="entr" presetSubtype="0" fill="hold" grpId="0" nodeType="clickEffect">
                                   <p:stCondLst>
                                     <p:cond delay="0"/>
                                   </p:stCondLst>
                                   <p:childTnLst>
                                     <p:set>
                                       <p:cBhvr>
-                                        <p:cTn id="31" dur="1" fill="hold">
+                                        <p:cTn id="29" dur="1" fill="hold">
                                           <p:stCondLst>
                                             <p:cond delay="0"/>
                                           </p:stCondLst>
@@ -5092,7 +5174,7 @@
                                     </p:set>
                                     <p:animEffect transition="in" filter="dissolve">
                                       <p:cBhvr>
-                                        <p:cTn id="32" dur="500"/>
+                                        <p:cTn id="30" dur="500"/>
                                         <p:tgtEl>
                                           <p:spTgt spid="11"/>
                                         </p:tgtEl>
@@ -5102,14 +5184,14 @@
                                 </p:cTn>
                               </p:par>
                               <p:par>
-                                <p:cTn id="33" presetID="9" presetClass="entr" presetSubtype="0" fill="hold" grpId="0" nodeType="withEffect">
+                                <p:cTn id="31" presetID="9" presetClass="entr" presetSubtype="0" fill="hold" grpId="0" nodeType="withEffect">
                                   <p:stCondLst>
                                     <p:cond delay="0"/>
                                   </p:stCondLst>
                                   <p:childTnLst>
                                     <p:set>
                                       <p:cBhvr>
-                                        <p:cTn id="34" dur="1" fill="hold">
+                                        <p:cTn id="32" dur="1" fill="hold">
                                           <p:stCondLst>
                                             <p:cond delay="0"/>
                                           </p:stCondLst>
@@ -5127,7 +5209,7 @@
                                     </p:set>
                                     <p:animEffect transition="in" filter="dissolve">
                                       <p:cBhvr>
-                                        <p:cTn id="35" dur="500"/>
+                                        <p:cTn id="33" dur="500"/>
                                         <p:tgtEl>
                                           <p:spTgt spid="12"/>
                                         </p:tgtEl>
@@ -5228,7 +5310,29 @@
           <a:bodyPr/>
           <a:lstStyle/>
           <a:p>
-            <a:endParaRPr lang="en-US"/>
+            <a:r>
+              <a:rPr lang="en-US" dirty="0" smtClean="0"/>
+              <a:t>Notes</a:t>
+            </a:r>
+          </a:p>
+          <a:p>
+            <a:r>
+              <a:rPr lang="en-US" dirty="0" smtClean="0"/>
+              <a:t>Group Planning</a:t>
+            </a:r>
+          </a:p>
+          <a:p>
+            <a:r>
+              <a:rPr lang="en-US" dirty="0" smtClean="0"/>
+              <a:t>Legal documents</a:t>
+            </a:r>
+          </a:p>
+          <a:p>
+            <a:r>
+              <a:rPr lang="en-US" dirty="0" smtClean="0"/>
+              <a:t>Creative Writing (Novels/Screenplays)</a:t>
+            </a:r>
+            <a:endParaRPr lang="en-US" dirty="0"/>
           </a:p>
         </p:txBody>
       </p:sp>
@@ -5245,7 +5349,7 @@
   <p:timing>
     <p:tnLst>
       <p:par>
-        <p:cTn xmlns:p14="http://schemas.microsoft.com/office/powerpoint/2010/main" id="1" dur="indefinite" restart="never" nodeType="tmRoot"/>
+        <p:cTn id="1" dur="indefinite" restart="never" nodeType="tmRoot"/>
       </p:par>
     </p:tnLst>
   </p:timing>
@@ -5279,38 +5383,91 @@
             <p:ph type="title"/>
           </p:nvPr>
         </p:nvSpPr>
-        <p:spPr/>
-        <p:txBody>
-          <a:bodyPr/>
-          <a:lstStyle/>
-          <a:p>
+        <p:spPr>
+          <a:xfrm>
+            <a:off x="256309" y="155864"/>
+            <a:ext cx="10515600" cy="1325563"/>
+          </a:xfrm>
+        </p:spPr>
+        <p:txBody>
+          <a:bodyPr/>
+          <a:lstStyle/>
+          <a:p>
+            <a:pPr algn="ctr"/>
             <a:r>
               <a:rPr lang="en-US" dirty="0" smtClean="0"/>
-              <a:t>Repository vs. File</a:t>
+              <a:t>Repository </a:t>
+            </a:r>
+            <a:r>
+              <a:rPr lang="en-US" dirty="0" smtClean="0"/>
+              <a:t>            vs</a:t>
+            </a:r>
+            <a:r>
+              <a:rPr lang="en-US" dirty="0" smtClean="0"/>
+              <a:t>. </a:t>
+            </a:r>
+            <a:r>
+              <a:rPr lang="en-US" dirty="0" smtClean="0"/>
+              <a:t>               File</a:t>
             </a:r>
             <a:endParaRPr lang="en-US" dirty="0"/>
           </a:p>
         </p:txBody>
       </p:sp>
-      <p:sp>
-        <p:nvSpPr>
-          <p:cNvPr id="3" name="Content Placeholder 2"/>
-          <p:cNvSpPr>
-            <a:spLocks noGrp="1"/>
-          </p:cNvSpPr>
-          <p:nvPr>
-            <p:ph idx="1"/>
-          </p:nvPr>
-        </p:nvSpPr>
-        <p:spPr/>
-        <p:txBody>
-          <a:bodyPr/>
-          <a:lstStyle/>
-          <a:p>
-            <a:endParaRPr lang="en-US"/>
-          </a:p>
-        </p:txBody>
-      </p:sp>
+      <p:pic>
+        <p:nvPicPr>
+          <p:cNvPr id="4" name="Picture 3"/>
+          <p:cNvPicPr>
+            <a:picLocks noChangeAspect="1"/>
+          </p:cNvPicPr>
+          <p:nvPr/>
+        </p:nvPicPr>
+        <p:blipFill>
+          <a:blip r:embed="rId2"/>
+          <a:stretch>
+            <a:fillRect/>
+          </a:stretch>
+        </p:blipFill>
+        <p:spPr>
+          <a:xfrm>
+            <a:off x="7401511" y="1837459"/>
+            <a:ext cx="3249450" cy="3249450"/>
+          </a:xfrm>
+          <a:prstGeom prst="rect">
+            <a:avLst/>
+          </a:prstGeom>
+        </p:spPr>
+      </p:pic>
+      <p:pic>
+        <p:nvPicPr>
+          <p:cNvPr id="5" name="Picture 4"/>
+          <p:cNvPicPr>
+            <a:picLocks noChangeAspect="1"/>
+          </p:cNvPicPr>
+          <p:nvPr/>
+        </p:nvPicPr>
+        <p:blipFill>
+          <a:blip r:embed="rId3">
+            <a:extLst>
+              <a:ext uri="{28A0092B-C50C-407E-A947-70E740481C1C}">
+                <a14:useLocalDpi xmlns:a14="http://schemas.microsoft.com/office/drawing/2010/main" val="0"/>
+              </a:ext>
+            </a:extLst>
+          </a:blip>
+          <a:stretch>
+            <a:fillRect/>
+          </a:stretch>
+        </p:blipFill>
+        <p:spPr>
+          <a:xfrm>
+            <a:off x="1409700" y="1714780"/>
+            <a:ext cx="3494809" cy="3494809"/>
+          </a:xfrm>
+          <a:prstGeom prst="rect">
+            <a:avLst/>
+          </a:prstGeom>
+        </p:spPr>
+      </p:pic>
     </p:spTree>
     <p:extLst>
       <p:ext uri="{BB962C8B-B14F-4D97-AF65-F5344CB8AC3E}">
@@ -5324,7 +5481,7 @@
   <p:timing>
     <p:tnLst>
       <p:par>
-        <p:cTn xmlns:p14="http://schemas.microsoft.com/office/powerpoint/2010/main" id="1" dur="indefinite" restart="never" nodeType="tmRoot"/>
+        <p:cTn id="1" dur="indefinite" restart="never" nodeType="tmRoot"/>
       </p:par>
     </p:tnLst>
   </p:timing>
@@ -5381,12 +5538,81 @@
             <p:ph idx="1"/>
           </p:nvPr>
         </p:nvSpPr>
-        <p:spPr/>
-        <p:txBody>
-          <a:bodyPr/>
-          <a:lstStyle/>
-          <a:p>
-            <a:endParaRPr lang="en-US"/>
+        <p:spPr>
+          <a:xfrm>
+            <a:off x="1073727" y="2982191"/>
+            <a:ext cx="4315691" cy="1392382"/>
+          </a:xfrm>
+        </p:spPr>
+        <p:txBody>
+          <a:bodyPr/>
+          <a:lstStyle/>
+          <a:p>
+            <a:pPr marL="0" indent="0">
+              <a:buNone/>
+            </a:pPr>
+            <a:r>
+              <a:rPr lang="en-US" dirty="0" smtClean="0"/>
+              <a:t>Centralized Version Control</a:t>
+            </a:r>
+          </a:p>
+          <a:p>
+            <a:r>
+              <a:rPr lang="en-US" dirty="0" smtClean="0"/>
+              <a:t>Ex. Subversion (SVN)</a:t>
+            </a:r>
+            <a:endParaRPr lang="en-US" dirty="0" smtClean="0"/>
+          </a:p>
+          <a:p>
+            <a:endParaRPr lang="en-US" dirty="0"/>
+          </a:p>
+        </p:txBody>
+      </p:sp>
+      <p:sp>
+        <p:nvSpPr>
+          <p:cNvPr id="4" name="TextBox 3"/>
+          <p:cNvSpPr txBox="1"/>
+          <p:nvPr/>
+        </p:nvSpPr>
+        <p:spPr>
+          <a:xfrm>
+            <a:off x="6553200" y="2982191"/>
+            <a:ext cx="4800600" cy="954107"/>
+          </a:xfrm>
+          <a:prstGeom prst="rect">
+            <a:avLst/>
+          </a:prstGeom>
+          <a:noFill/>
+        </p:spPr>
+        <p:txBody>
+          <a:bodyPr wrap="square" rtlCol="0">
+            <a:spAutoFit/>
+          </a:bodyPr>
+          <a:lstStyle/>
+          <a:p>
+            <a:r>
+              <a:rPr lang="en-US" sz="2800" dirty="0" smtClean="0"/>
+              <a:t>Distributed Version Control</a:t>
+            </a:r>
+          </a:p>
+          <a:p>
+            <a:pPr marL="457200" indent="-457200">
+              <a:buFont typeface="Arial" panose="020B0604020202020204" pitchFamily="34" charset="0"/>
+              <a:buChar char="•"/>
+            </a:pPr>
+            <a:r>
+              <a:rPr lang="en-US" sz="2800" dirty="0" smtClean="0"/>
+              <a:t>Ex. </a:t>
+            </a:r>
+            <a:r>
+              <a:rPr lang="en-US" sz="2800" dirty="0" err="1" smtClean="0"/>
+              <a:t>Git</a:t>
+            </a:r>
+            <a:r>
+              <a:rPr lang="en-US" sz="2800" dirty="0" smtClean="0"/>
+              <a:t>, Mercurial (hg)</a:t>
+            </a:r>
+            <a:endParaRPr lang="en-US" sz="2800" dirty="0"/>
           </a:p>
         </p:txBody>
       </p:sp>
@@ -5400,6 +5626,13 @@
   <p:clrMapOvr>
     <a:masterClrMapping/>
   </p:clrMapOvr>
+  <p:timing>
+    <p:tnLst>
+      <p:par>
+        <p:cTn id="1" dur="indefinite" restart="never" nodeType="tmRoot"/>
+      </p:par>
+    </p:tnLst>
+  </p:timing>
 </p:sld>
 </file>
 
@@ -5430,7 +5663,12 @@
             <p:ph type="title"/>
           </p:nvPr>
         </p:nvSpPr>
-        <p:spPr/>
+        <p:spPr>
+          <a:xfrm>
+            <a:off x="276874" y="186527"/>
+            <a:ext cx="6404481" cy="862955"/>
+          </a:xfrm>
+        </p:spPr>
         <p:txBody>
           <a:bodyPr/>
           <a:lstStyle/>
@@ -5443,22 +5681,660 @@
           </a:p>
         </p:txBody>
       </p:sp>
-      <p:sp>
-        <p:nvSpPr>
-          <p:cNvPr id="3" name="Content Placeholder 2"/>
-          <p:cNvSpPr>
-            <a:spLocks noGrp="1"/>
-          </p:cNvSpPr>
-          <p:nvPr>
-            <p:ph idx="1"/>
-          </p:nvPr>
-        </p:nvSpPr>
-        <p:spPr/>
-        <p:txBody>
-          <a:bodyPr/>
-          <a:lstStyle/>
-          <a:p>
+      <p:pic>
+        <p:nvPicPr>
+          <p:cNvPr id="4" name="Picture 3"/>
+          <p:cNvPicPr>
+            <a:picLocks noChangeAspect="1"/>
+          </p:cNvPicPr>
+          <p:nvPr/>
+        </p:nvPicPr>
+        <p:blipFill>
+          <a:blip r:embed="rId2"/>
+          <a:stretch>
+            <a:fillRect/>
+          </a:stretch>
+        </p:blipFill>
+        <p:spPr>
+          <a:xfrm>
+            <a:off x="5056192" y="1253746"/>
+            <a:ext cx="1822439" cy="1822439"/>
+          </a:xfrm>
+          <a:prstGeom prst="rect">
+            <a:avLst/>
+          </a:prstGeom>
+        </p:spPr>
+      </p:pic>
+      <p:pic>
+        <p:nvPicPr>
+          <p:cNvPr id="5" name="Picture 4"/>
+          <p:cNvPicPr>
+            <a:picLocks noChangeAspect="1"/>
+          </p:cNvPicPr>
+          <p:nvPr/>
+        </p:nvPicPr>
+        <p:blipFill>
+          <a:blip r:embed="rId3" cstate="print">
+            <a:extLst>
+              <a:ext uri="{28A0092B-C50C-407E-A947-70E740481C1C}">
+                <a14:useLocalDpi xmlns:a14="http://schemas.microsoft.com/office/drawing/2010/main" val="0"/>
+              </a:ext>
+            </a:extLst>
+          </a:blip>
+          <a:stretch>
+            <a:fillRect/>
+          </a:stretch>
+        </p:blipFill>
+        <p:spPr>
+          <a:xfrm>
+            <a:off x="1540452" y="4461685"/>
+            <a:ext cx="1774248" cy="1222141"/>
+          </a:xfrm>
+          <a:prstGeom prst="rect">
+            <a:avLst/>
+          </a:prstGeom>
+        </p:spPr>
+      </p:pic>
+      <p:pic>
+        <p:nvPicPr>
+          <p:cNvPr id="6" name="Picture 5"/>
+          <p:cNvPicPr>
+            <a:picLocks noChangeAspect="1"/>
+          </p:cNvPicPr>
+          <p:nvPr/>
+        </p:nvPicPr>
+        <p:blipFill>
+          <a:blip r:embed="rId3" cstate="print">
+            <a:extLst>
+              <a:ext uri="{28A0092B-C50C-407E-A947-70E740481C1C}">
+                <a14:useLocalDpi xmlns:a14="http://schemas.microsoft.com/office/drawing/2010/main" val="0"/>
+              </a:ext>
+            </a:extLst>
+          </a:blip>
+          <a:stretch>
+            <a:fillRect/>
+          </a:stretch>
+        </p:blipFill>
+        <p:spPr>
+          <a:xfrm>
+            <a:off x="5080288" y="4461685"/>
+            <a:ext cx="1774248" cy="1222141"/>
+          </a:xfrm>
+          <a:prstGeom prst="rect">
+            <a:avLst/>
+          </a:prstGeom>
+        </p:spPr>
+      </p:pic>
+      <p:pic>
+        <p:nvPicPr>
+          <p:cNvPr id="7" name="Picture 6"/>
+          <p:cNvPicPr>
+            <a:picLocks noChangeAspect="1"/>
+          </p:cNvPicPr>
+          <p:nvPr/>
+        </p:nvPicPr>
+        <p:blipFill>
+          <a:blip r:embed="rId3" cstate="print">
+            <a:extLst>
+              <a:ext uri="{28A0092B-C50C-407E-A947-70E740481C1C}">
+                <a14:useLocalDpi xmlns:a14="http://schemas.microsoft.com/office/drawing/2010/main" val="0"/>
+              </a:ext>
+            </a:extLst>
+          </a:blip>
+          <a:stretch>
+            <a:fillRect/>
+          </a:stretch>
+        </p:blipFill>
+        <p:spPr>
+          <a:xfrm>
+            <a:off x="8758670" y="4461684"/>
+            <a:ext cx="1774248" cy="1222141"/>
+          </a:xfrm>
+          <a:prstGeom prst="rect">
+            <a:avLst/>
+          </a:prstGeom>
+        </p:spPr>
+      </p:pic>
+      <p:sp>
+        <p:nvSpPr>
+          <p:cNvPr id="12" name="Rectangle 11"/>
+          <p:cNvSpPr/>
+          <p:nvPr/>
+        </p:nvSpPr>
+        <p:spPr>
+          <a:xfrm>
+            <a:off x="8354291" y="488373"/>
+            <a:ext cx="3200400" cy="1735282"/>
+          </a:xfrm>
+          <a:prstGeom prst="rect">
+            <a:avLst/>
+          </a:prstGeom>
+          <a:solidFill>
+            <a:schemeClr val="accent1">
+              <a:lumMod val="20000"/>
+              <a:lumOff val="80000"/>
+            </a:schemeClr>
+          </a:solidFill>
+          <a:ln>
+            <a:solidFill>
+              <a:schemeClr val="accent1"/>
+            </a:solidFill>
+          </a:ln>
+        </p:spPr>
+        <p:style>
+          <a:lnRef idx="2">
+            <a:schemeClr val="accent1">
+              <a:shade val="50000"/>
+            </a:schemeClr>
+          </a:lnRef>
+          <a:fillRef idx="1">
+            <a:schemeClr val="accent1"/>
+          </a:fillRef>
+          <a:effectRef idx="0">
+            <a:schemeClr val="accent1"/>
+          </a:effectRef>
+          <a:fontRef idx="minor">
+            <a:schemeClr val="lt1"/>
+          </a:fontRef>
+        </p:style>
+        <p:txBody>
+          <a:bodyPr rtlCol="0" anchor="ctr"/>
+          <a:lstStyle/>
+          <a:p>
+            <a:pPr algn="ctr"/>
             <a:endParaRPr lang="en-US"/>
+          </a:p>
+        </p:txBody>
+      </p:sp>
+      <p:pic>
+        <p:nvPicPr>
+          <p:cNvPr id="8" name="Picture 7"/>
+          <p:cNvPicPr>
+            <a:picLocks noChangeAspect="1"/>
+          </p:cNvPicPr>
+          <p:nvPr/>
+        </p:nvPicPr>
+        <p:blipFill>
+          <a:blip r:embed="rId4" cstate="print">
+            <a:extLst>
+              <a:ext uri="{28A0092B-C50C-407E-A947-70E740481C1C}">
+                <a14:useLocalDpi xmlns:a14="http://schemas.microsoft.com/office/drawing/2010/main" val="0"/>
+              </a:ext>
+            </a:extLst>
+          </a:blip>
+          <a:stretch>
+            <a:fillRect/>
+          </a:stretch>
+        </p:blipFill>
+        <p:spPr>
+          <a:xfrm>
+            <a:off x="8445802" y="1488786"/>
+            <a:ext cx="933922" cy="643306"/>
+          </a:xfrm>
+          <a:prstGeom prst="rect">
+            <a:avLst/>
+          </a:prstGeom>
+        </p:spPr>
+      </p:pic>
+      <p:pic>
+        <p:nvPicPr>
+          <p:cNvPr id="9" name="Picture 8"/>
+          <p:cNvPicPr>
+            <a:picLocks noChangeAspect="1"/>
+          </p:cNvPicPr>
+          <p:nvPr/>
+        </p:nvPicPr>
+        <p:blipFill>
+          <a:blip r:embed="rId2"/>
+          <a:stretch>
+            <a:fillRect/>
+          </a:stretch>
+        </p:blipFill>
+        <p:spPr>
+          <a:xfrm>
+            <a:off x="8541091" y="613063"/>
+            <a:ext cx="838633" cy="838633"/>
+          </a:xfrm>
+          <a:prstGeom prst="rect">
+            <a:avLst/>
+          </a:prstGeom>
+        </p:spPr>
+      </p:pic>
+      <p:sp>
+        <p:nvSpPr>
+          <p:cNvPr id="10" name="TextBox 9"/>
+          <p:cNvSpPr txBox="1"/>
+          <p:nvPr/>
+        </p:nvSpPr>
+        <p:spPr>
+          <a:xfrm>
+            <a:off x="9645794" y="815103"/>
+            <a:ext cx="2293361" cy="369332"/>
+          </a:xfrm>
+          <a:prstGeom prst="rect">
+            <a:avLst/>
+          </a:prstGeom>
+          <a:noFill/>
+        </p:spPr>
+        <p:txBody>
+          <a:bodyPr wrap="square" rtlCol="0">
+            <a:spAutoFit/>
+          </a:bodyPr>
+          <a:lstStyle/>
+          <a:p>
+            <a:r>
+              <a:rPr lang="en-US" dirty="0" smtClean="0"/>
+              <a:t>Full Repository</a:t>
+            </a:r>
+            <a:endParaRPr lang="en-US" dirty="0"/>
+          </a:p>
+        </p:txBody>
+      </p:sp>
+      <p:sp>
+        <p:nvSpPr>
+          <p:cNvPr id="11" name="TextBox 10"/>
+          <p:cNvSpPr txBox="1"/>
+          <p:nvPr/>
+        </p:nvSpPr>
+        <p:spPr>
+          <a:xfrm>
+            <a:off x="9645794" y="1542058"/>
+            <a:ext cx="1815379" cy="369332"/>
+          </a:xfrm>
+          <a:prstGeom prst="rect">
+            <a:avLst/>
+          </a:prstGeom>
+          <a:noFill/>
+        </p:spPr>
+        <p:txBody>
+          <a:bodyPr wrap="square" rtlCol="0">
+            <a:spAutoFit/>
+          </a:bodyPr>
+          <a:lstStyle/>
+          <a:p>
+            <a:r>
+              <a:rPr lang="en-US" dirty="0" smtClean="0"/>
+              <a:t>Copy</a:t>
+            </a:r>
+            <a:endParaRPr lang="en-US" dirty="0"/>
+          </a:p>
+        </p:txBody>
+      </p:sp>
+      <p:cxnSp>
+        <p:nvCxnSpPr>
+          <p:cNvPr id="14" name="Straight Connector 13"/>
+          <p:cNvCxnSpPr/>
+          <p:nvPr/>
+        </p:nvCxnSpPr>
+        <p:spPr>
+          <a:xfrm flipH="1" flipV="1">
+            <a:off x="2285999" y="3247635"/>
+            <a:ext cx="2" cy="1015756"/>
+          </a:xfrm>
+          <a:prstGeom prst="line">
+            <a:avLst/>
+          </a:prstGeom>
+          <a:ln w="63500"/>
+        </p:spPr>
+        <p:style>
+          <a:lnRef idx="1">
+            <a:schemeClr val="accent1"/>
+          </a:lnRef>
+          <a:fillRef idx="0">
+            <a:schemeClr val="accent1"/>
+          </a:fillRef>
+          <a:effectRef idx="0">
+            <a:schemeClr val="accent1"/>
+          </a:effectRef>
+          <a:fontRef idx="minor">
+            <a:schemeClr val="tx1"/>
+          </a:fontRef>
+        </p:style>
+      </p:cxnSp>
+      <p:cxnSp>
+        <p:nvCxnSpPr>
+          <p:cNvPr id="16" name="Straight Connector 15"/>
+          <p:cNvCxnSpPr/>
+          <p:nvPr/>
+        </p:nvCxnSpPr>
+        <p:spPr>
+          <a:xfrm>
+            <a:off x="2285999" y="3247635"/>
+            <a:ext cx="3681413" cy="0"/>
+          </a:xfrm>
+          <a:prstGeom prst="line">
+            <a:avLst/>
+          </a:prstGeom>
+          <a:ln w="63500"/>
+        </p:spPr>
+        <p:style>
+          <a:lnRef idx="1">
+            <a:schemeClr val="accent1"/>
+          </a:lnRef>
+          <a:fillRef idx="0">
+            <a:schemeClr val="accent1"/>
+          </a:fillRef>
+          <a:effectRef idx="0">
+            <a:schemeClr val="accent1"/>
+          </a:effectRef>
+          <a:fontRef idx="minor">
+            <a:schemeClr val="tx1"/>
+          </a:fontRef>
+        </p:style>
+      </p:cxnSp>
+      <p:cxnSp>
+        <p:nvCxnSpPr>
+          <p:cNvPr id="18" name="Straight Connector 17"/>
+          <p:cNvCxnSpPr>
+            <a:endCxn id="6" idx="0"/>
+          </p:cNvCxnSpPr>
+          <p:nvPr/>
+        </p:nvCxnSpPr>
+        <p:spPr>
+          <a:xfrm>
+            <a:off x="5967412" y="3247635"/>
+            <a:ext cx="0" cy="1214050"/>
+          </a:xfrm>
+          <a:prstGeom prst="line">
+            <a:avLst/>
+          </a:prstGeom>
+          <a:ln w="63500"/>
+        </p:spPr>
+        <p:style>
+          <a:lnRef idx="1">
+            <a:schemeClr val="accent1"/>
+          </a:lnRef>
+          <a:fillRef idx="0">
+            <a:schemeClr val="accent1"/>
+          </a:fillRef>
+          <a:effectRef idx="0">
+            <a:schemeClr val="accent1"/>
+          </a:effectRef>
+          <a:fontRef idx="minor">
+            <a:schemeClr val="tx1"/>
+          </a:fontRef>
+        </p:style>
+      </p:cxnSp>
+      <p:cxnSp>
+        <p:nvCxnSpPr>
+          <p:cNvPr id="20" name="Straight Connector 19"/>
+          <p:cNvCxnSpPr>
+            <a:stCxn id="7" idx="0"/>
+          </p:cNvCxnSpPr>
+          <p:nvPr/>
+        </p:nvCxnSpPr>
+        <p:spPr>
+          <a:xfrm flipV="1">
+            <a:off x="9645794" y="3247635"/>
+            <a:ext cx="0" cy="1214049"/>
+          </a:xfrm>
+          <a:prstGeom prst="line">
+            <a:avLst/>
+          </a:prstGeom>
+          <a:ln w="63500"/>
+        </p:spPr>
+        <p:style>
+          <a:lnRef idx="1">
+            <a:schemeClr val="accent1"/>
+          </a:lnRef>
+          <a:fillRef idx="0">
+            <a:schemeClr val="accent1"/>
+          </a:fillRef>
+          <a:effectRef idx="0">
+            <a:schemeClr val="accent1"/>
+          </a:effectRef>
+          <a:fontRef idx="minor">
+            <a:schemeClr val="tx1"/>
+          </a:fontRef>
+        </p:style>
+      </p:cxnSp>
+      <p:cxnSp>
+        <p:nvCxnSpPr>
+          <p:cNvPr id="22" name="Straight Connector 21"/>
+          <p:cNvCxnSpPr/>
+          <p:nvPr/>
+        </p:nvCxnSpPr>
+        <p:spPr>
+          <a:xfrm>
+            <a:off x="5967412" y="3247635"/>
+            <a:ext cx="3678382" cy="0"/>
+          </a:xfrm>
+          <a:prstGeom prst="line">
+            <a:avLst/>
+          </a:prstGeom>
+          <a:ln w="63500"/>
+        </p:spPr>
+        <p:style>
+          <a:lnRef idx="1">
+            <a:schemeClr val="accent1"/>
+          </a:lnRef>
+          <a:fillRef idx="0">
+            <a:schemeClr val="accent1"/>
+          </a:fillRef>
+          <a:effectRef idx="0">
+            <a:schemeClr val="accent1"/>
+          </a:effectRef>
+          <a:fontRef idx="minor">
+            <a:schemeClr val="tx1"/>
+          </a:fontRef>
+        </p:style>
+      </p:cxnSp>
+      <p:cxnSp>
+        <p:nvCxnSpPr>
+          <p:cNvPr id="33" name="Straight Connector 32"/>
+          <p:cNvCxnSpPr>
+            <a:stCxn id="4" idx="2"/>
+          </p:cNvCxnSpPr>
+          <p:nvPr/>
+        </p:nvCxnSpPr>
+        <p:spPr>
+          <a:xfrm flipH="1">
+            <a:off x="5967411" y="3076185"/>
+            <a:ext cx="1" cy="1278645"/>
+          </a:xfrm>
+          <a:prstGeom prst="line">
+            <a:avLst/>
+          </a:prstGeom>
+          <a:ln w="63500"/>
+        </p:spPr>
+        <p:style>
+          <a:lnRef idx="1">
+            <a:schemeClr val="accent1"/>
+          </a:lnRef>
+          <a:fillRef idx="0">
+            <a:schemeClr val="accent1"/>
+          </a:fillRef>
+          <a:effectRef idx="0">
+            <a:schemeClr val="accent1"/>
+          </a:effectRef>
+          <a:fontRef idx="minor">
+            <a:schemeClr val="tx1"/>
+          </a:fontRef>
+        </p:style>
+      </p:cxnSp>
+      <p:cxnSp>
+        <p:nvCxnSpPr>
+          <p:cNvPr id="35" name="Straight Connector 34"/>
+          <p:cNvCxnSpPr/>
+          <p:nvPr/>
+        </p:nvCxnSpPr>
+        <p:spPr>
+          <a:xfrm>
+            <a:off x="276874" y="3049341"/>
+            <a:ext cx="11662281" cy="374"/>
+          </a:xfrm>
+          <a:prstGeom prst="line">
+            <a:avLst/>
+          </a:prstGeom>
+          <a:ln w="31750">
+            <a:solidFill>
+              <a:schemeClr val="accent1"/>
+            </a:solidFill>
+            <a:prstDash val="dash"/>
+          </a:ln>
+        </p:spPr>
+        <p:style>
+          <a:lnRef idx="1">
+            <a:schemeClr val="accent1"/>
+          </a:lnRef>
+          <a:fillRef idx="0">
+            <a:schemeClr val="accent1"/>
+          </a:fillRef>
+          <a:effectRef idx="0">
+            <a:schemeClr val="accent1"/>
+          </a:effectRef>
+          <a:fontRef idx="minor">
+            <a:schemeClr val="tx1"/>
+          </a:fontRef>
+        </p:style>
+      </p:cxnSp>
+      <p:sp>
+        <p:nvSpPr>
+          <p:cNvPr id="40" name="TextBox 39"/>
+          <p:cNvSpPr txBox="1"/>
+          <p:nvPr/>
+        </p:nvSpPr>
+        <p:spPr>
+          <a:xfrm>
+            <a:off x="276874" y="2455991"/>
+            <a:ext cx="2731770" cy="461665"/>
+          </a:xfrm>
+          <a:prstGeom prst="rect">
+            <a:avLst/>
+          </a:prstGeom>
+          <a:noFill/>
+        </p:spPr>
+        <p:txBody>
+          <a:bodyPr wrap="square" rtlCol="0">
+            <a:spAutoFit/>
+          </a:bodyPr>
+          <a:lstStyle/>
+          <a:p>
+            <a:r>
+              <a:rPr lang="en-US" sz="2400" dirty="0" smtClean="0"/>
+              <a:t>Server</a:t>
+            </a:r>
+            <a:endParaRPr lang="en-US" sz="2800" dirty="0"/>
+          </a:p>
+        </p:txBody>
+      </p:sp>
+      <p:sp>
+        <p:nvSpPr>
+          <p:cNvPr id="41" name="TextBox 40"/>
+          <p:cNvSpPr txBox="1"/>
+          <p:nvPr/>
+        </p:nvSpPr>
+        <p:spPr>
+          <a:xfrm>
+            <a:off x="276874" y="3161910"/>
+            <a:ext cx="2457450" cy="830997"/>
+          </a:xfrm>
+          <a:prstGeom prst="rect">
+            <a:avLst/>
+          </a:prstGeom>
+          <a:noFill/>
+        </p:spPr>
+        <p:txBody>
+          <a:bodyPr wrap="square" rtlCol="0">
+            <a:spAutoFit/>
+          </a:bodyPr>
+          <a:lstStyle/>
+          <a:p>
+            <a:r>
+              <a:rPr lang="en-US" sz="2400" dirty="0" smtClean="0"/>
+              <a:t>Local Workstations</a:t>
+            </a:r>
+            <a:endParaRPr lang="en-US" sz="2400" dirty="0"/>
+          </a:p>
+        </p:txBody>
+      </p:sp>
+      <p:sp>
+        <p:nvSpPr>
+          <p:cNvPr id="42" name="TextBox 41"/>
+          <p:cNvSpPr txBox="1"/>
+          <p:nvPr/>
+        </p:nvSpPr>
+        <p:spPr>
+          <a:xfrm>
+            <a:off x="1950070" y="5817870"/>
+            <a:ext cx="2117148" cy="461665"/>
+          </a:xfrm>
+          <a:prstGeom prst="rect">
+            <a:avLst/>
+          </a:prstGeom>
+          <a:noFill/>
+        </p:spPr>
+        <p:txBody>
+          <a:bodyPr wrap="square" rtlCol="0">
+            <a:spAutoFit/>
+          </a:bodyPr>
+          <a:lstStyle/>
+          <a:p>
+            <a:r>
+              <a:rPr lang="en-US" sz="2400" dirty="0" smtClean="0"/>
+              <a:t>- John</a:t>
+            </a:r>
+            <a:endParaRPr lang="en-US" sz="2400" dirty="0"/>
+          </a:p>
+        </p:txBody>
+      </p:sp>
+      <p:sp>
+        <p:nvSpPr>
+          <p:cNvPr id="43" name="TextBox 42"/>
+          <p:cNvSpPr txBox="1"/>
+          <p:nvPr/>
+        </p:nvSpPr>
+        <p:spPr>
+          <a:xfrm>
+            <a:off x="5656919" y="5817870"/>
+            <a:ext cx="1794510" cy="461665"/>
+          </a:xfrm>
+          <a:prstGeom prst="rect">
+            <a:avLst/>
+          </a:prstGeom>
+          <a:noFill/>
+        </p:spPr>
+        <p:txBody>
+          <a:bodyPr wrap="square" rtlCol="0">
+            <a:spAutoFit/>
+          </a:bodyPr>
+          <a:lstStyle/>
+          <a:p>
+            <a:r>
+              <a:rPr lang="en-US" sz="2400" dirty="0" smtClean="0"/>
+              <a:t>- Steve</a:t>
+            </a:r>
+            <a:endParaRPr lang="en-US" sz="2400" dirty="0"/>
+          </a:p>
+        </p:txBody>
+      </p:sp>
+      <p:sp>
+        <p:nvSpPr>
+          <p:cNvPr id="44" name="TextBox 43"/>
+          <p:cNvSpPr txBox="1"/>
+          <p:nvPr/>
+        </p:nvSpPr>
+        <p:spPr>
+          <a:xfrm>
+            <a:off x="9235440" y="5817870"/>
+            <a:ext cx="1783080" cy="461665"/>
+          </a:xfrm>
+          <a:prstGeom prst="rect">
+            <a:avLst/>
+          </a:prstGeom>
+          <a:noFill/>
+        </p:spPr>
+        <p:txBody>
+          <a:bodyPr wrap="square" rtlCol="0">
+            <a:spAutoFit/>
+          </a:bodyPr>
+          <a:lstStyle/>
+          <a:p>
+            <a:r>
+              <a:rPr lang="en-US" sz="2400" dirty="0" smtClean="0"/>
+              <a:t>- Sally</a:t>
+            </a:r>
+            <a:endParaRPr lang="en-US" sz="2400" dirty="0"/>
           </a:p>
         </p:txBody>
       </p:sp>
@@ -5472,6 +6348,540 @@
   <p:clrMapOvr>
     <a:masterClrMapping/>
   </p:clrMapOvr>
+  <p:timing>
+    <p:tnLst>
+      <p:par>
+        <p:cTn id="1" dur="indefinite" restart="never" nodeType="tmRoot">
+          <p:childTnLst>
+            <p:seq concurrent="1" nextAc="seek">
+              <p:cTn id="2" dur="indefinite" nodeType="mainSeq">
+                <p:childTnLst>
+                  <p:par>
+                    <p:cTn id="3" fill="hold">
+                      <p:stCondLst>
+                        <p:cond delay="indefinite"/>
+                      </p:stCondLst>
+                      <p:childTnLst>
+                        <p:par>
+                          <p:cTn id="4" fill="hold">
+                            <p:stCondLst>
+                              <p:cond delay="0"/>
+                            </p:stCondLst>
+                            <p:childTnLst>
+                              <p:par>
+                                <p:cTn id="5" presetID="53" presetClass="exit" presetSubtype="32" fill="hold" nodeType="clickEffect">
+                                  <p:stCondLst>
+                                    <p:cond delay="0"/>
+                                  </p:stCondLst>
+                                  <p:childTnLst>
+                                    <p:anim calcmode="lin" valueType="num">
+                                      <p:cBhvr>
+                                        <p:cTn id="6" dur="500"/>
+                                        <p:tgtEl>
+                                          <p:spTgt spid="33"/>
+                                        </p:tgtEl>
+                                        <p:attrNameLst>
+                                          <p:attrName>ppt_w</p:attrName>
+                                        </p:attrNameLst>
+                                      </p:cBhvr>
+                                      <p:tavLst>
+                                        <p:tav tm="0">
+                                          <p:val>
+                                            <p:strVal val="ppt_w"/>
+                                          </p:val>
+                                        </p:tav>
+                                        <p:tav tm="100000">
+                                          <p:val>
+                                            <p:fltVal val="0"/>
+                                          </p:val>
+                                        </p:tav>
+                                      </p:tavLst>
+                                    </p:anim>
+                                    <p:anim calcmode="lin" valueType="num">
+                                      <p:cBhvr>
+                                        <p:cTn id="7" dur="500"/>
+                                        <p:tgtEl>
+                                          <p:spTgt spid="33"/>
+                                        </p:tgtEl>
+                                        <p:attrNameLst>
+                                          <p:attrName>ppt_h</p:attrName>
+                                        </p:attrNameLst>
+                                      </p:cBhvr>
+                                      <p:tavLst>
+                                        <p:tav tm="0">
+                                          <p:val>
+                                            <p:strVal val="ppt_h"/>
+                                          </p:val>
+                                        </p:tav>
+                                        <p:tav tm="100000">
+                                          <p:val>
+                                            <p:fltVal val="0"/>
+                                          </p:val>
+                                        </p:tav>
+                                      </p:tavLst>
+                                    </p:anim>
+                                    <p:animEffect transition="out" filter="fade">
+                                      <p:cBhvr>
+                                        <p:cTn id="8" dur="500"/>
+                                        <p:tgtEl>
+                                          <p:spTgt spid="33"/>
+                                        </p:tgtEl>
+                                      </p:cBhvr>
+                                    </p:animEffect>
+                                    <p:set>
+                                      <p:cBhvr>
+                                        <p:cTn id="9" dur="1" fill="hold">
+                                          <p:stCondLst>
+                                            <p:cond delay="499"/>
+                                          </p:stCondLst>
+                                        </p:cTn>
+                                        <p:tgtEl>
+                                          <p:spTgt spid="33"/>
+                                        </p:tgtEl>
+                                        <p:attrNameLst>
+                                          <p:attrName>style.visibility</p:attrName>
+                                        </p:attrNameLst>
+                                      </p:cBhvr>
+                                      <p:to>
+                                        <p:strVal val="hidden"/>
+                                      </p:to>
+                                    </p:set>
+                                  </p:childTnLst>
+                                </p:cTn>
+                              </p:par>
+                              <p:par>
+                                <p:cTn id="10" presetID="53" presetClass="exit" presetSubtype="32" fill="hold" nodeType="withEffect">
+                                  <p:stCondLst>
+                                    <p:cond delay="0"/>
+                                  </p:stCondLst>
+                                  <p:childTnLst>
+                                    <p:anim calcmode="lin" valueType="num">
+                                      <p:cBhvr>
+                                        <p:cTn id="11" dur="500"/>
+                                        <p:tgtEl>
+                                          <p:spTgt spid="18"/>
+                                        </p:tgtEl>
+                                        <p:attrNameLst>
+                                          <p:attrName>ppt_w</p:attrName>
+                                        </p:attrNameLst>
+                                      </p:cBhvr>
+                                      <p:tavLst>
+                                        <p:tav tm="0">
+                                          <p:val>
+                                            <p:strVal val="ppt_w"/>
+                                          </p:val>
+                                        </p:tav>
+                                        <p:tav tm="100000">
+                                          <p:val>
+                                            <p:fltVal val="0"/>
+                                          </p:val>
+                                        </p:tav>
+                                      </p:tavLst>
+                                    </p:anim>
+                                    <p:anim calcmode="lin" valueType="num">
+                                      <p:cBhvr>
+                                        <p:cTn id="12" dur="500"/>
+                                        <p:tgtEl>
+                                          <p:spTgt spid="18"/>
+                                        </p:tgtEl>
+                                        <p:attrNameLst>
+                                          <p:attrName>ppt_h</p:attrName>
+                                        </p:attrNameLst>
+                                      </p:cBhvr>
+                                      <p:tavLst>
+                                        <p:tav tm="0">
+                                          <p:val>
+                                            <p:strVal val="ppt_h"/>
+                                          </p:val>
+                                        </p:tav>
+                                        <p:tav tm="100000">
+                                          <p:val>
+                                            <p:fltVal val="0"/>
+                                          </p:val>
+                                        </p:tav>
+                                      </p:tavLst>
+                                    </p:anim>
+                                    <p:animEffect transition="out" filter="fade">
+                                      <p:cBhvr>
+                                        <p:cTn id="13" dur="500"/>
+                                        <p:tgtEl>
+                                          <p:spTgt spid="18"/>
+                                        </p:tgtEl>
+                                      </p:cBhvr>
+                                    </p:animEffect>
+                                    <p:set>
+                                      <p:cBhvr>
+                                        <p:cTn id="14" dur="1" fill="hold">
+                                          <p:stCondLst>
+                                            <p:cond delay="499"/>
+                                          </p:stCondLst>
+                                        </p:cTn>
+                                        <p:tgtEl>
+                                          <p:spTgt spid="18"/>
+                                        </p:tgtEl>
+                                        <p:attrNameLst>
+                                          <p:attrName>style.visibility</p:attrName>
+                                        </p:attrNameLst>
+                                      </p:cBhvr>
+                                      <p:to>
+                                        <p:strVal val="hidden"/>
+                                      </p:to>
+                                    </p:set>
+                                  </p:childTnLst>
+                                </p:cTn>
+                              </p:par>
+                              <p:par>
+                                <p:cTn id="15" presetID="53" presetClass="exit" presetSubtype="32" fill="hold" nodeType="withEffect">
+                                  <p:stCondLst>
+                                    <p:cond delay="0"/>
+                                  </p:stCondLst>
+                                  <p:childTnLst>
+                                    <p:anim calcmode="lin" valueType="num">
+                                      <p:cBhvr>
+                                        <p:cTn id="16" dur="500"/>
+                                        <p:tgtEl>
+                                          <p:spTgt spid="22"/>
+                                        </p:tgtEl>
+                                        <p:attrNameLst>
+                                          <p:attrName>ppt_w</p:attrName>
+                                        </p:attrNameLst>
+                                      </p:cBhvr>
+                                      <p:tavLst>
+                                        <p:tav tm="0">
+                                          <p:val>
+                                            <p:strVal val="ppt_w"/>
+                                          </p:val>
+                                        </p:tav>
+                                        <p:tav tm="100000">
+                                          <p:val>
+                                            <p:fltVal val="0"/>
+                                          </p:val>
+                                        </p:tav>
+                                      </p:tavLst>
+                                    </p:anim>
+                                    <p:anim calcmode="lin" valueType="num">
+                                      <p:cBhvr>
+                                        <p:cTn id="17" dur="500"/>
+                                        <p:tgtEl>
+                                          <p:spTgt spid="22"/>
+                                        </p:tgtEl>
+                                        <p:attrNameLst>
+                                          <p:attrName>ppt_h</p:attrName>
+                                        </p:attrNameLst>
+                                      </p:cBhvr>
+                                      <p:tavLst>
+                                        <p:tav tm="0">
+                                          <p:val>
+                                            <p:strVal val="ppt_h"/>
+                                          </p:val>
+                                        </p:tav>
+                                        <p:tav tm="100000">
+                                          <p:val>
+                                            <p:fltVal val="0"/>
+                                          </p:val>
+                                        </p:tav>
+                                      </p:tavLst>
+                                    </p:anim>
+                                    <p:animEffect transition="out" filter="fade">
+                                      <p:cBhvr>
+                                        <p:cTn id="18" dur="500"/>
+                                        <p:tgtEl>
+                                          <p:spTgt spid="22"/>
+                                        </p:tgtEl>
+                                      </p:cBhvr>
+                                    </p:animEffect>
+                                    <p:set>
+                                      <p:cBhvr>
+                                        <p:cTn id="19" dur="1" fill="hold">
+                                          <p:stCondLst>
+                                            <p:cond delay="499"/>
+                                          </p:stCondLst>
+                                        </p:cTn>
+                                        <p:tgtEl>
+                                          <p:spTgt spid="22"/>
+                                        </p:tgtEl>
+                                        <p:attrNameLst>
+                                          <p:attrName>style.visibility</p:attrName>
+                                        </p:attrNameLst>
+                                      </p:cBhvr>
+                                      <p:to>
+                                        <p:strVal val="hidden"/>
+                                      </p:to>
+                                    </p:set>
+                                  </p:childTnLst>
+                                </p:cTn>
+                              </p:par>
+                              <p:par>
+                                <p:cTn id="20" presetID="53" presetClass="exit" presetSubtype="32" fill="hold" nodeType="withEffect">
+                                  <p:stCondLst>
+                                    <p:cond delay="0"/>
+                                  </p:stCondLst>
+                                  <p:childTnLst>
+                                    <p:anim calcmode="lin" valueType="num">
+                                      <p:cBhvr>
+                                        <p:cTn id="21" dur="500"/>
+                                        <p:tgtEl>
+                                          <p:spTgt spid="16"/>
+                                        </p:tgtEl>
+                                        <p:attrNameLst>
+                                          <p:attrName>ppt_w</p:attrName>
+                                        </p:attrNameLst>
+                                      </p:cBhvr>
+                                      <p:tavLst>
+                                        <p:tav tm="0">
+                                          <p:val>
+                                            <p:strVal val="ppt_w"/>
+                                          </p:val>
+                                        </p:tav>
+                                        <p:tav tm="100000">
+                                          <p:val>
+                                            <p:fltVal val="0"/>
+                                          </p:val>
+                                        </p:tav>
+                                      </p:tavLst>
+                                    </p:anim>
+                                    <p:anim calcmode="lin" valueType="num">
+                                      <p:cBhvr>
+                                        <p:cTn id="22" dur="500"/>
+                                        <p:tgtEl>
+                                          <p:spTgt spid="16"/>
+                                        </p:tgtEl>
+                                        <p:attrNameLst>
+                                          <p:attrName>ppt_h</p:attrName>
+                                        </p:attrNameLst>
+                                      </p:cBhvr>
+                                      <p:tavLst>
+                                        <p:tav tm="0">
+                                          <p:val>
+                                            <p:strVal val="ppt_h"/>
+                                          </p:val>
+                                        </p:tav>
+                                        <p:tav tm="100000">
+                                          <p:val>
+                                            <p:fltVal val="0"/>
+                                          </p:val>
+                                        </p:tav>
+                                      </p:tavLst>
+                                    </p:anim>
+                                    <p:animEffect transition="out" filter="fade">
+                                      <p:cBhvr>
+                                        <p:cTn id="23" dur="500"/>
+                                        <p:tgtEl>
+                                          <p:spTgt spid="16"/>
+                                        </p:tgtEl>
+                                      </p:cBhvr>
+                                    </p:animEffect>
+                                    <p:set>
+                                      <p:cBhvr>
+                                        <p:cTn id="24" dur="1" fill="hold">
+                                          <p:stCondLst>
+                                            <p:cond delay="499"/>
+                                          </p:stCondLst>
+                                        </p:cTn>
+                                        <p:tgtEl>
+                                          <p:spTgt spid="16"/>
+                                        </p:tgtEl>
+                                        <p:attrNameLst>
+                                          <p:attrName>style.visibility</p:attrName>
+                                        </p:attrNameLst>
+                                      </p:cBhvr>
+                                      <p:to>
+                                        <p:strVal val="hidden"/>
+                                      </p:to>
+                                    </p:set>
+                                  </p:childTnLst>
+                                </p:cTn>
+                              </p:par>
+                              <p:par>
+                                <p:cTn id="25" presetID="53" presetClass="exit" presetSubtype="32" fill="hold" nodeType="withEffect">
+                                  <p:stCondLst>
+                                    <p:cond delay="0"/>
+                                  </p:stCondLst>
+                                  <p:childTnLst>
+                                    <p:anim calcmode="lin" valueType="num">
+                                      <p:cBhvr>
+                                        <p:cTn id="26" dur="500"/>
+                                        <p:tgtEl>
+                                          <p:spTgt spid="14"/>
+                                        </p:tgtEl>
+                                        <p:attrNameLst>
+                                          <p:attrName>ppt_w</p:attrName>
+                                        </p:attrNameLst>
+                                      </p:cBhvr>
+                                      <p:tavLst>
+                                        <p:tav tm="0">
+                                          <p:val>
+                                            <p:strVal val="ppt_w"/>
+                                          </p:val>
+                                        </p:tav>
+                                        <p:tav tm="100000">
+                                          <p:val>
+                                            <p:fltVal val="0"/>
+                                          </p:val>
+                                        </p:tav>
+                                      </p:tavLst>
+                                    </p:anim>
+                                    <p:anim calcmode="lin" valueType="num">
+                                      <p:cBhvr>
+                                        <p:cTn id="27" dur="500"/>
+                                        <p:tgtEl>
+                                          <p:spTgt spid="14"/>
+                                        </p:tgtEl>
+                                        <p:attrNameLst>
+                                          <p:attrName>ppt_h</p:attrName>
+                                        </p:attrNameLst>
+                                      </p:cBhvr>
+                                      <p:tavLst>
+                                        <p:tav tm="0">
+                                          <p:val>
+                                            <p:strVal val="ppt_h"/>
+                                          </p:val>
+                                        </p:tav>
+                                        <p:tav tm="100000">
+                                          <p:val>
+                                            <p:fltVal val="0"/>
+                                          </p:val>
+                                        </p:tav>
+                                      </p:tavLst>
+                                    </p:anim>
+                                    <p:animEffect transition="out" filter="fade">
+                                      <p:cBhvr>
+                                        <p:cTn id="28" dur="500"/>
+                                        <p:tgtEl>
+                                          <p:spTgt spid="14"/>
+                                        </p:tgtEl>
+                                      </p:cBhvr>
+                                    </p:animEffect>
+                                    <p:set>
+                                      <p:cBhvr>
+                                        <p:cTn id="29" dur="1" fill="hold">
+                                          <p:stCondLst>
+                                            <p:cond delay="499"/>
+                                          </p:stCondLst>
+                                        </p:cTn>
+                                        <p:tgtEl>
+                                          <p:spTgt spid="14"/>
+                                        </p:tgtEl>
+                                        <p:attrNameLst>
+                                          <p:attrName>style.visibility</p:attrName>
+                                        </p:attrNameLst>
+                                      </p:cBhvr>
+                                      <p:to>
+                                        <p:strVal val="hidden"/>
+                                      </p:to>
+                                    </p:set>
+                                  </p:childTnLst>
+                                </p:cTn>
+                              </p:par>
+                              <p:par>
+                                <p:cTn id="30" presetID="53" presetClass="exit" presetSubtype="32" fill="hold" nodeType="withEffect">
+                                  <p:stCondLst>
+                                    <p:cond delay="0"/>
+                                  </p:stCondLst>
+                                  <p:childTnLst>
+                                    <p:anim calcmode="lin" valueType="num">
+                                      <p:cBhvr>
+                                        <p:cTn id="31" dur="500"/>
+                                        <p:tgtEl>
+                                          <p:spTgt spid="20"/>
+                                        </p:tgtEl>
+                                        <p:attrNameLst>
+                                          <p:attrName>ppt_w</p:attrName>
+                                        </p:attrNameLst>
+                                      </p:cBhvr>
+                                      <p:tavLst>
+                                        <p:tav tm="0">
+                                          <p:val>
+                                            <p:strVal val="ppt_w"/>
+                                          </p:val>
+                                        </p:tav>
+                                        <p:tav tm="100000">
+                                          <p:val>
+                                            <p:fltVal val="0"/>
+                                          </p:val>
+                                        </p:tav>
+                                      </p:tavLst>
+                                    </p:anim>
+                                    <p:anim calcmode="lin" valueType="num">
+                                      <p:cBhvr>
+                                        <p:cTn id="32" dur="500"/>
+                                        <p:tgtEl>
+                                          <p:spTgt spid="20"/>
+                                        </p:tgtEl>
+                                        <p:attrNameLst>
+                                          <p:attrName>ppt_h</p:attrName>
+                                        </p:attrNameLst>
+                                      </p:cBhvr>
+                                      <p:tavLst>
+                                        <p:tav tm="0">
+                                          <p:val>
+                                            <p:strVal val="ppt_h"/>
+                                          </p:val>
+                                        </p:tav>
+                                        <p:tav tm="100000">
+                                          <p:val>
+                                            <p:fltVal val="0"/>
+                                          </p:val>
+                                        </p:tav>
+                                      </p:tavLst>
+                                    </p:anim>
+                                    <p:animEffect transition="out" filter="fade">
+                                      <p:cBhvr>
+                                        <p:cTn id="33" dur="500"/>
+                                        <p:tgtEl>
+                                          <p:spTgt spid="20"/>
+                                        </p:tgtEl>
+                                      </p:cBhvr>
+                                    </p:animEffect>
+                                    <p:set>
+                                      <p:cBhvr>
+                                        <p:cTn id="34" dur="1" fill="hold">
+                                          <p:stCondLst>
+                                            <p:cond delay="499"/>
+                                          </p:stCondLst>
+                                        </p:cTn>
+                                        <p:tgtEl>
+                                          <p:spTgt spid="20"/>
+                                        </p:tgtEl>
+                                        <p:attrNameLst>
+                                          <p:attrName>style.visibility</p:attrName>
+                                        </p:attrNameLst>
+                                      </p:cBhvr>
+                                      <p:to>
+                                        <p:strVal val="hidden"/>
+                                      </p:to>
+                                    </p:set>
+                                  </p:childTnLst>
+                                </p:cTn>
+                              </p:par>
+                            </p:childTnLst>
+                          </p:cTn>
+                        </p:par>
+                      </p:childTnLst>
+                    </p:cTn>
+                  </p:par>
+                </p:childTnLst>
+              </p:cTn>
+              <p:prevCondLst>
+                <p:cond evt="onPrev" delay="0">
+                  <p:tgtEl>
+                    <p:sldTgt/>
+                  </p:tgtEl>
+                </p:cond>
+              </p:prevCondLst>
+              <p:nextCondLst>
+                <p:cond evt="onNext" delay="0">
+                  <p:tgtEl>
+                    <p:sldTgt/>
+                  </p:tgtEl>
+                </p:cond>
+              </p:nextCondLst>
+            </p:seq>
+          </p:childTnLst>
+        </p:cTn>
+      </p:par>
+    </p:tnLst>
+  </p:timing>
 </p:sld>
 </file>
 
@@ -5544,6 +6954,13 @@
   <p:clrMapOvr>
     <a:masterClrMapping/>
   </p:clrMapOvr>
+  <p:timing>
+    <p:tnLst>
+      <p:par>
+        <p:cTn id="1" dur="indefinite" restart="never" nodeType="tmRoot"/>
+      </p:par>
+    </p:tnLst>
+  </p:timing>
 </p:sld>
 </file>
 
@@ -5802,7 +7219,7 @@
   <a:extraClrSchemeLst/>
   <a:extLst>
     <a:ext uri="{05A4C25C-085E-4340-85A3-A5531E510DB2}">
-      <thm15:themeFamily xmlns:thm15="http://schemas.microsoft.com/office/thememl/2012/main" xmlns="" name="Office Theme" id="{62F939B6-93AF-4DB8-9C6B-D6C7DFDC589F}" vid="{4A3C46E8-61CC-4603-A589-7422A47A8E4A}"/>
+      <thm15:themeFamily xmlns:thm15="http://schemas.microsoft.com/office/thememl/2012/main" name="Office Theme" id="{62F939B6-93AF-4DB8-9C6B-D6C7DFDC589F}" vid="{4A3C46E8-61CC-4603-A589-7422A47A8E4A}"/>
     </a:ext>
   </a:extLst>
 </a:theme>

</xml_diff>

<commit_message>
worked on the git presentation
</commit_message>
<xml_diff>
--- a/git_presentation/git_presentation.pptx
+++ b/git_presentation/git_presentation.pptx
@@ -126,7 +126,7 @@
   </p:defaultTextStyle>
   <p:extLst>
     <p:ext uri="{EFAFB233-063F-42B5-8137-9DF3F51BA10A}">
-      <p15:sldGuideLst xmlns:p15="http://schemas.microsoft.com/office/powerpoint/2012/main">
+      <p15:sldGuideLst xmlns:p15="http://schemas.microsoft.com/office/powerpoint/2012/main" xmlns="">
         <p15:guide id="1" orient="horz" pos="2160">
           <p15:clr>
             <a:srgbClr val="A4A3A4"/>
@@ -274,7 +274,7 @@
           <a:p>
             <a:fld id="{7E3245CE-4719-4FC9-B907-BD8BBC34E05C}" type="datetimeFigureOut">
               <a:rPr lang="en-US" smtClean="0"/>
-              <a:t>9/22/2015</a:t>
+              <a:t>9/23/15</a:t>
             </a:fld>
             <a:endParaRPr lang="en-US"/>
           </a:p>
@@ -444,7 +444,7 @@
           <a:p>
             <a:fld id="{7E3245CE-4719-4FC9-B907-BD8BBC34E05C}" type="datetimeFigureOut">
               <a:rPr lang="en-US" smtClean="0"/>
-              <a:t>9/22/2015</a:t>
+              <a:t>9/23/15</a:t>
             </a:fld>
             <a:endParaRPr lang="en-US"/>
           </a:p>
@@ -624,7 +624,7 @@
           <a:p>
             <a:fld id="{7E3245CE-4719-4FC9-B907-BD8BBC34E05C}" type="datetimeFigureOut">
               <a:rPr lang="en-US" smtClean="0"/>
-              <a:t>9/22/2015</a:t>
+              <a:t>9/23/15</a:t>
             </a:fld>
             <a:endParaRPr lang="en-US"/>
           </a:p>
@@ -794,7 +794,7 @@
           <a:p>
             <a:fld id="{7E3245CE-4719-4FC9-B907-BD8BBC34E05C}" type="datetimeFigureOut">
               <a:rPr lang="en-US" smtClean="0"/>
-              <a:t>9/22/2015</a:t>
+              <a:t>9/23/15</a:t>
             </a:fld>
             <a:endParaRPr lang="en-US"/>
           </a:p>
@@ -1040,7 +1040,7 @@
           <a:p>
             <a:fld id="{7E3245CE-4719-4FC9-B907-BD8BBC34E05C}" type="datetimeFigureOut">
               <a:rPr lang="en-US" smtClean="0"/>
-              <a:t>9/22/2015</a:t>
+              <a:t>9/23/15</a:t>
             </a:fld>
             <a:endParaRPr lang="en-US"/>
           </a:p>
@@ -1272,7 +1272,7 @@
           <a:p>
             <a:fld id="{7E3245CE-4719-4FC9-B907-BD8BBC34E05C}" type="datetimeFigureOut">
               <a:rPr lang="en-US" smtClean="0"/>
-              <a:t>9/22/2015</a:t>
+              <a:t>9/23/15</a:t>
             </a:fld>
             <a:endParaRPr lang="en-US"/>
           </a:p>
@@ -1639,7 +1639,7 @@
           <a:p>
             <a:fld id="{7E3245CE-4719-4FC9-B907-BD8BBC34E05C}" type="datetimeFigureOut">
               <a:rPr lang="en-US" smtClean="0"/>
-              <a:t>9/22/2015</a:t>
+              <a:t>9/23/15</a:t>
             </a:fld>
             <a:endParaRPr lang="en-US"/>
           </a:p>
@@ -1757,7 +1757,7 @@
           <a:p>
             <a:fld id="{7E3245CE-4719-4FC9-B907-BD8BBC34E05C}" type="datetimeFigureOut">
               <a:rPr lang="en-US" smtClean="0"/>
-              <a:t>9/22/2015</a:t>
+              <a:t>9/23/15</a:t>
             </a:fld>
             <a:endParaRPr lang="en-US"/>
           </a:p>
@@ -1852,7 +1852,7 @@
           <a:p>
             <a:fld id="{7E3245CE-4719-4FC9-B907-BD8BBC34E05C}" type="datetimeFigureOut">
               <a:rPr lang="en-US" smtClean="0"/>
-              <a:t>9/22/2015</a:t>
+              <a:t>9/23/15</a:t>
             </a:fld>
             <a:endParaRPr lang="en-US"/>
           </a:p>
@@ -2129,7 +2129,7 @@
           <a:p>
             <a:fld id="{7E3245CE-4719-4FC9-B907-BD8BBC34E05C}" type="datetimeFigureOut">
               <a:rPr lang="en-US" smtClean="0"/>
-              <a:t>9/22/2015</a:t>
+              <a:t>9/23/15</a:t>
             </a:fld>
             <a:endParaRPr lang="en-US"/>
           </a:p>
@@ -2382,7 +2382,7 @@
           <a:p>
             <a:fld id="{7E3245CE-4719-4FC9-B907-BD8BBC34E05C}" type="datetimeFigureOut">
               <a:rPr lang="en-US" smtClean="0"/>
-              <a:t>9/22/2015</a:t>
+              <a:t>9/23/15</a:t>
             </a:fld>
             <a:endParaRPr lang="en-US"/>
           </a:p>
@@ -2595,7 +2595,7 @@
           <a:p>
             <a:fld id="{7E3245CE-4719-4FC9-B907-BD8BBC34E05C}" type="datetimeFigureOut">
               <a:rPr lang="en-US" smtClean="0"/>
-              <a:t>9/22/2015</a:t>
+              <a:t>9/23/15</a:t>
             </a:fld>
             <a:endParaRPr lang="en-US"/>
           </a:p>
@@ -3084,7 +3084,7 @@
   <p:timing>
     <p:tnLst>
       <p:par>
-        <p:cTn id="1" dur="indefinite" restart="never" nodeType="tmRoot"/>
+        <p:cTn xmlns:p14="http://schemas.microsoft.com/office/powerpoint/2010/main" id="1" dur="indefinite" restart="never" nodeType="tmRoot"/>
       </p:par>
     </p:tnLst>
   </p:timing>
@@ -3135,25 +3135,85 @@
           </a:p>
         </p:txBody>
       </p:sp>
-      <p:sp>
-        <p:nvSpPr>
-          <p:cNvPr id="3" name="Content Placeholder 2"/>
-          <p:cNvSpPr>
-            <a:spLocks noGrp="1"/>
-          </p:cNvSpPr>
-          <p:nvPr>
-            <p:ph idx="1"/>
-          </p:nvPr>
-        </p:nvSpPr>
-        <p:spPr/>
-        <p:txBody>
-          <a:bodyPr/>
-          <a:lstStyle/>
-          <a:p>
-            <a:endParaRPr lang="en-US"/>
-          </a:p>
-        </p:txBody>
-      </p:sp>
+      <p:pic>
+        <p:nvPicPr>
+          <p:cNvPr id="5" name="Picture 4"/>
+          <p:cNvPicPr>
+            <a:picLocks noChangeAspect="1"/>
+          </p:cNvPicPr>
+          <p:nvPr/>
+        </p:nvPicPr>
+        <p:blipFill>
+          <a:blip r:embed="rId2"/>
+          <a:stretch>
+            <a:fillRect/>
+          </a:stretch>
+        </p:blipFill>
+        <p:spPr>
+          <a:xfrm>
+            <a:off x="7401511" y="1831607"/>
+            <a:ext cx="3249450" cy="3249450"/>
+          </a:xfrm>
+          <a:prstGeom prst="rect">
+            <a:avLst/>
+          </a:prstGeom>
+        </p:spPr>
+      </p:pic>
+      <p:pic>
+        <p:nvPicPr>
+          <p:cNvPr id="6" name="Picture 5"/>
+          <p:cNvPicPr>
+            <a:picLocks noChangeAspect="1"/>
+          </p:cNvPicPr>
+          <p:nvPr/>
+        </p:nvPicPr>
+        <p:blipFill>
+          <a:blip r:embed="rId3">
+            <a:extLst>
+              <a:ext uri="{28A0092B-C50C-407E-A947-70E740481C1C}">
+                <a14:useLocalDpi xmlns:a14="http://schemas.microsoft.com/office/drawing/2010/main" val="0"/>
+              </a:ext>
+            </a:extLst>
+          </a:blip>
+          <a:stretch>
+            <a:fillRect/>
+          </a:stretch>
+        </p:blipFill>
+        <p:spPr>
+          <a:xfrm>
+            <a:off x="1239980" y="1708928"/>
+            <a:ext cx="3494809" cy="3494809"/>
+          </a:xfrm>
+          <a:prstGeom prst="rect">
+            <a:avLst/>
+          </a:prstGeom>
+        </p:spPr>
+      </p:pic>
+      <p:pic>
+        <p:nvPicPr>
+          <p:cNvPr id="7" name="Content Placeholder 4"/>
+          <p:cNvPicPr>
+            <a:picLocks noChangeAspect="1"/>
+          </p:cNvPicPr>
+          <p:nvPr/>
+        </p:nvPicPr>
+        <p:blipFill>
+          <a:blip r:embed="rId4"/>
+          <a:srcRect t="14388" b="14388"/>
+          <a:stretch>
+            <a:fillRect/>
+          </a:stretch>
+        </p:blipFill>
+        <p:spPr>
+          <a:xfrm>
+            <a:off x="4604680" y="2839226"/>
+            <a:ext cx="2982640" cy="1234212"/>
+          </a:xfrm>
+          <a:prstGeom prst="rect">
+            <a:avLst/>
+          </a:prstGeom>
+        </p:spPr>
+      </p:pic>
     </p:spTree>
     <p:extLst>
       <p:ext uri="{BB962C8B-B14F-4D97-AF65-F5344CB8AC3E}">
@@ -3167,7 +3227,83 @@
   <p:timing>
     <p:tnLst>
       <p:par>
-        <p:cTn id="1" dur="indefinite" restart="never" nodeType="tmRoot"/>
+        <p:cTn xmlns:p14="http://schemas.microsoft.com/office/powerpoint/2010/main" id="1" dur="indefinite" restart="never" nodeType="tmRoot">
+          <p:childTnLst>
+            <p:seq concurrent="1" nextAc="seek">
+              <p:cTn id="2" dur="indefinite" nodeType="mainSeq">
+                <p:childTnLst>
+                  <p:par>
+                    <p:cTn id="3" fill="hold">
+                      <p:stCondLst>
+                        <p:cond delay="indefinite"/>
+                      </p:stCondLst>
+                      <p:childTnLst>
+                        <p:par>
+                          <p:cTn id="4" fill="hold">
+                            <p:stCondLst>
+                              <p:cond delay="0"/>
+                            </p:stCondLst>
+                            <p:childTnLst>
+                              <p:par>
+                                <p:cTn id="5" presetID="9" presetClass="entr" presetSubtype="0" fill="hold" nodeType="clickEffect">
+                                  <p:stCondLst>
+                                    <p:cond delay="0"/>
+                                  </p:stCondLst>
+                                  <p:childTnLst>
+                                    <p:set>
+                                      <p:cBhvr>
+                                        <p:cTn id="6" dur="1" fill="hold">
+                                          <p:stCondLst>
+                                            <p:cond delay="0"/>
+                                          </p:stCondLst>
+                                        </p:cTn>
+                                        <p:tgtEl>
+                                          <p:spTgt spid="7"/>
+                                        </p:tgtEl>
+                                        <p:attrNameLst>
+                                          <p:attrName>style.visibility</p:attrName>
+                                        </p:attrNameLst>
+                                      </p:cBhvr>
+                                      <p:to>
+                                        <p:strVal val="visible"/>
+                                      </p:to>
+                                    </p:set>
+                                    <p:animEffect transition="in" filter="dissolve">
+                                      <p:cBhvr>
+                                        <p:cTn id="7" dur="500"/>
+                                        <p:tgtEl>
+                                          <p:spTgt spid="7"/>
+                                        </p:tgtEl>
+                                      </p:cBhvr>
+                                    </p:animEffect>
+                                  </p:childTnLst>
+                                </p:cTn>
+                              </p:par>
+                            </p:childTnLst>
+                          </p:cTn>
+                        </p:par>
+                      </p:childTnLst>
+                    </p:cTn>
+                  </p:par>
+                </p:childTnLst>
+              </p:cTn>
+              <p:prevCondLst>
+                <p:cond evt="onPrev" delay="0">
+                  <p:tgtEl>
+                    <p:sldTgt/>
+                  </p:tgtEl>
+                </p:cond>
+              </p:prevCondLst>
+              <p:nextCondLst>
+                <p:cond evt="onNext" delay="0">
+                  <p:tgtEl>
+                    <p:sldTgt/>
+                  </p:tgtEl>
+                </p:cond>
+              </p:nextCondLst>
+            </p:seq>
+          </p:childTnLst>
+        </p:cTn>
       </p:par>
     </p:tnLst>
   </p:timing>
@@ -3218,25 +3354,426 @@
           </a:p>
         </p:txBody>
       </p:sp>
-      <p:sp>
-        <p:nvSpPr>
-          <p:cNvPr id="3" name="Content Placeholder 2"/>
-          <p:cNvSpPr>
-            <a:spLocks noGrp="1"/>
-          </p:cNvSpPr>
-          <p:nvPr>
-            <p:ph idx="1"/>
-          </p:nvPr>
-        </p:nvSpPr>
-        <p:spPr/>
-        <p:txBody>
-          <a:bodyPr/>
-          <a:lstStyle/>
-          <a:p>
-            <a:endParaRPr lang="en-US"/>
-          </a:p>
-        </p:txBody>
-      </p:sp>
+      <p:cxnSp>
+        <p:nvCxnSpPr>
+          <p:cNvPr id="4" name="Straight Connector 3"/>
+          <p:cNvCxnSpPr/>
+          <p:nvPr/>
+        </p:nvCxnSpPr>
+        <p:spPr>
+          <a:xfrm>
+            <a:off x="244686" y="4594476"/>
+            <a:ext cx="11662281" cy="374"/>
+          </a:xfrm>
+          <a:prstGeom prst="line">
+            <a:avLst/>
+          </a:prstGeom>
+          <a:ln w="31750">
+            <a:solidFill>
+              <a:schemeClr val="accent1"/>
+            </a:solidFill>
+            <a:prstDash val="dash"/>
+          </a:ln>
+        </p:spPr>
+        <p:style>
+          <a:lnRef idx="1">
+            <a:schemeClr val="accent1"/>
+          </a:lnRef>
+          <a:fillRef idx="0">
+            <a:schemeClr val="accent1"/>
+          </a:fillRef>
+          <a:effectRef idx="0">
+            <a:schemeClr val="accent1"/>
+          </a:effectRef>
+          <a:fontRef idx="minor">
+            <a:schemeClr val="tx1"/>
+          </a:fontRef>
+        </p:style>
+      </p:cxnSp>
+      <p:cxnSp>
+        <p:nvCxnSpPr>
+          <p:cNvPr id="5" name="Straight Connector 4"/>
+          <p:cNvCxnSpPr/>
+          <p:nvPr/>
+        </p:nvCxnSpPr>
+        <p:spPr>
+          <a:xfrm>
+            <a:off x="244686" y="2809377"/>
+            <a:ext cx="11662281" cy="374"/>
+          </a:xfrm>
+          <a:prstGeom prst="line">
+            <a:avLst/>
+          </a:prstGeom>
+          <a:ln w="31750">
+            <a:solidFill>
+              <a:schemeClr val="accent1"/>
+            </a:solidFill>
+            <a:prstDash val="dash"/>
+          </a:ln>
+        </p:spPr>
+        <p:style>
+          <a:lnRef idx="1">
+            <a:schemeClr val="accent1"/>
+          </a:lnRef>
+          <a:fillRef idx="0">
+            <a:schemeClr val="accent1"/>
+          </a:fillRef>
+          <a:effectRef idx="0">
+            <a:schemeClr val="accent1"/>
+          </a:effectRef>
+          <a:fontRef idx="minor">
+            <a:schemeClr val="tx1"/>
+          </a:fontRef>
+        </p:style>
+      </p:cxnSp>
+      <p:cxnSp>
+        <p:nvCxnSpPr>
+          <p:cNvPr id="7" name="Straight Arrow Connector 6"/>
+          <p:cNvCxnSpPr>
+            <a:cxnSpLocks noChangeAspect="1"/>
+          </p:cNvCxnSpPr>
+          <p:nvPr/>
+        </p:nvCxnSpPr>
+        <p:spPr>
+          <a:xfrm flipH="1">
+            <a:off x="5343478" y="2639606"/>
+            <a:ext cx="5109" cy="500418"/>
+          </a:xfrm>
+          <a:prstGeom prst="straightConnector1">
+            <a:avLst/>
+          </a:prstGeom>
+          <a:ln w="57150" cmpd="sng">
+            <a:solidFill>
+              <a:srgbClr val="5B9BD5"/>
+            </a:solidFill>
+            <a:tailEnd type="arrow"/>
+          </a:ln>
+        </p:spPr>
+        <p:style>
+          <a:lnRef idx="2">
+            <a:schemeClr val="accent1"/>
+          </a:lnRef>
+          <a:fillRef idx="0">
+            <a:schemeClr val="accent1"/>
+          </a:fillRef>
+          <a:effectRef idx="1">
+            <a:schemeClr val="accent1"/>
+          </a:effectRef>
+          <a:fontRef idx="minor">
+            <a:schemeClr val="tx1"/>
+          </a:fontRef>
+        </p:style>
+      </p:cxnSp>
+      <p:cxnSp>
+        <p:nvCxnSpPr>
+          <p:cNvPr id="8" name="Straight Arrow Connector 7"/>
+          <p:cNvCxnSpPr>
+            <a:cxnSpLocks noChangeAspect="1"/>
+          </p:cNvCxnSpPr>
+          <p:nvPr/>
+        </p:nvCxnSpPr>
+        <p:spPr>
+          <a:xfrm flipH="1">
+            <a:off x="5343478" y="4442491"/>
+            <a:ext cx="5109" cy="500418"/>
+          </a:xfrm>
+          <a:prstGeom prst="straightConnector1">
+            <a:avLst/>
+          </a:prstGeom>
+          <a:ln w="57150" cmpd="sng">
+            <a:solidFill>
+              <a:srgbClr val="5B9BD5"/>
+            </a:solidFill>
+            <a:tailEnd type="arrow"/>
+          </a:ln>
+        </p:spPr>
+        <p:style>
+          <a:lnRef idx="2">
+            <a:schemeClr val="accent1"/>
+          </a:lnRef>
+          <a:fillRef idx="0">
+            <a:schemeClr val="accent1"/>
+          </a:fillRef>
+          <a:effectRef idx="1">
+            <a:schemeClr val="accent1"/>
+          </a:effectRef>
+          <a:fontRef idx="minor">
+            <a:schemeClr val="tx1"/>
+          </a:fontRef>
+        </p:style>
+      </p:cxnSp>
+      <p:cxnSp>
+        <p:nvCxnSpPr>
+          <p:cNvPr id="9" name="Straight Arrow Connector 8"/>
+          <p:cNvCxnSpPr>
+            <a:cxnSpLocks noChangeAspect="1"/>
+          </p:cNvCxnSpPr>
+          <p:nvPr/>
+        </p:nvCxnSpPr>
+        <p:spPr>
+          <a:xfrm flipH="1" flipV="1">
+            <a:off x="5343478" y="2487661"/>
+            <a:ext cx="5109" cy="500418"/>
+          </a:xfrm>
+          <a:prstGeom prst="straightConnector1">
+            <a:avLst/>
+          </a:prstGeom>
+          <a:ln w="57150" cmpd="sng">
+            <a:solidFill>
+              <a:srgbClr val="5B9BD5"/>
+            </a:solidFill>
+            <a:tailEnd type="arrow"/>
+          </a:ln>
+        </p:spPr>
+        <p:style>
+          <a:lnRef idx="2">
+            <a:schemeClr val="accent1"/>
+          </a:lnRef>
+          <a:fillRef idx="0">
+            <a:schemeClr val="accent1"/>
+          </a:fillRef>
+          <a:effectRef idx="1">
+            <a:schemeClr val="accent1"/>
+          </a:effectRef>
+          <a:fontRef idx="minor">
+            <a:schemeClr val="tx1"/>
+          </a:fontRef>
+        </p:style>
+      </p:cxnSp>
+      <p:sp>
+        <p:nvSpPr>
+          <p:cNvPr id="10" name="TextBox 9"/>
+          <p:cNvSpPr txBox="1"/>
+          <p:nvPr/>
+        </p:nvSpPr>
+        <p:spPr>
+          <a:xfrm>
+            <a:off x="1808390" y="1878744"/>
+            <a:ext cx="1287527" cy="369332"/>
+          </a:xfrm>
+          <a:prstGeom prst="rect">
+            <a:avLst/>
+          </a:prstGeom>
+          <a:noFill/>
+        </p:spPr>
+        <p:txBody>
+          <a:bodyPr wrap="square" rtlCol="0">
+            <a:spAutoFit/>
+          </a:bodyPr>
+          <a:lstStyle/>
+          <a:p>
+            <a:r>
+              <a:rPr lang="en-US" dirty="0" err="1" smtClean="0">
+                <a:solidFill>
+                  <a:srgbClr val="FF0000"/>
+                </a:solidFill>
+              </a:rPr>
+              <a:t>File_A.txt</a:t>
+            </a:r>
+            <a:endParaRPr lang="en-US" dirty="0">
+              <a:solidFill>
+                <a:srgbClr val="FF0000"/>
+              </a:solidFill>
+            </a:endParaRPr>
+          </a:p>
+        </p:txBody>
+      </p:sp>
+      <p:sp>
+        <p:nvSpPr>
+          <p:cNvPr id="11" name="TextBox 10"/>
+          <p:cNvSpPr txBox="1"/>
+          <p:nvPr/>
+        </p:nvSpPr>
+        <p:spPr>
+          <a:xfrm>
+            <a:off x="4699710" y="1890678"/>
+            <a:ext cx="1287527" cy="369332"/>
+          </a:xfrm>
+          <a:prstGeom prst="rect">
+            <a:avLst/>
+          </a:prstGeom>
+          <a:noFill/>
+        </p:spPr>
+        <p:txBody>
+          <a:bodyPr wrap="square" rtlCol="0">
+            <a:spAutoFit/>
+          </a:bodyPr>
+          <a:lstStyle/>
+          <a:p>
+            <a:r>
+              <a:rPr lang="en-US" dirty="0" err="1" smtClean="0">
+                <a:solidFill>
+                  <a:srgbClr val="FF0000"/>
+                </a:solidFill>
+              </a:rPr>
+              <a:t>File_B.txt</a:t>
+            </a:r>
+            <a:endParaRPr lang="en-US" dirty="0">
+              <a:solidFill>
+                <a:srgbClr val="FF0000"/>
+              </a:solidFill>
+            </a:endParaRPr>
+          </a:p>
+        </p:txBody>
+      </p:sp>
+      <p:sp>
+        <p:nvSpPr>
+          <p:cNvPr id="12" name="TextBox 11"/>
+          <p:cNvSpPr txBox="1"/>
+          <p:nvPr/>
+        </p:nvSpPr>
+        <p:spPr>
+          <a:xfrm>
+            <a:off x="8468652" y="1949205"/>
+            <a:ext cx="1287527" cy="369332"/>
+          </a:xfrm>
+          <a:prstGeom prst="rect">
+            <a:avLst/>
+          </a:prstGeom>
+          <a:noFill/>
+        </p:spPr>
+        <p:txBody>
+          <a:bodyPr wrap="square" rtlCol="0">
+            <a:spAutoFit/>
+          </a:bodyPr>
+          <a:lstStyle/>
+          <a:p>
+            <a:r>
+              <a:rPr lang="en-US" dirty="0" err="1" smtClean="0">
+                <a:solidFill>
+                  <a:srgbClr val="FF0000"/>
+                </a:solidFill>
+              </a:rPr>
+              <a:t>File_C.txt</a:t>
+            </a:r>
+            <a:endParaRPr lang="en-US" dirty="0">
+              <a:solidFill>
+                <a:srgbClr val="FF0000"/>
+              </a:solidFill>
+            </a:endParaRPr>
+          </a:p>
+        </p:txBody>
+      </p:sp>
+      <p:sp>
+        <p:nvSpPr>
+          <p:cNvPr id="13" name="TextBox 12"/>
+          <p:cNvSpPr txBox="1"/>
+          <p:nvPr/>
+        </p:nvSpPr>
+        <p:spPr>
+          <a:xfrm>
+            <a:off x="169719" y="2382083"/>
+            <a:ext cx="1896176" cy="369332"/>
+          </a:xfrm>
+          <a:prstGeom prst="rect">
+            <a:avLst/>
+          </a:prstGeom>
+          <a:noFill/>
+        </p:spPr>
+        <p:txBody>
+          <a:bodyPr wrap="square" rtlCol="0">
+            <a:spAutoFit/>
+          </a:bodyPr>
+          <a:lstStyle/>
+          <a:p>
+            <a:r>
+              <a:rPr lang="en-US" dirty="0" smtClean="0"/>
+              <a:t>Altered Files</a:t>
+            </a:r>
+            <a:endParaRPr lang="en-US" dirty="0"/>
+          </a:p>
+        </p:txBody>
+      </p:sp>
+      <p:sp>
+        <p:nvSpPr>
+          <p:cNvPr id="14" name="TextBox 13"/>
+          <p:cNvSpPr txBox="1"/>
+          <p:nvPr/>
+        </p:nvSpPr>
+        <p:spPr>
+          <a:xfrm>
+            <a:off x="158015" y="4219857"/>
+            <a:ext cx="1784980" cy="369332"/>
+          </a:xfrm>
+          <a:prstGeom prst="rect">
+            <a:avLst/>
+          </a:prstGeom>
+          <a:noFill/>
+        </p:spPr>
+        <p:txBody>
+          <a:bodyPr wrap="square" rtlCol="0">
+            <a:spAutoFit/>
+          </a:bodyPr>
+          <a:lstStyle/>
+          <a:p>
+            <a:r>
+              <a:rPr lang="en-US" dirty="0" smtClean="0"/>
+              <a:t>Staged Files</a:t>
+            </a:r>
+            <a:endParaRPr lang="en-US" dirty="0"/>
+          </a:p>
+        </p:txBody>
+      </p:sp>
+      <p:sp>
+        <p:nvSpPr>
+          <p:cNvPr id="15" name="TextBox 14"/>
+          <p:cNvSpPr txBox="1"/>
+          <p:nvPr/>
+        </p:nvSpPr>
+        <p:spPr>
+          <a:xfrm>
+            <a:off x="263357" y="5858636"/>
+            <a:ext cx="1666254" cy="369332"/>
+          </a:xfrm>
+          <a:prstGeom prst="rect">
+            <a:avLst/>
+          </a:prstGeom>
+          <a:noFill/>
+        </p:spPr>
+        <p:txBody>
+          <a:bodyPr wrap="none" rtlCol="0">
+            <a:spAutoFit/>
+          </a:bodyPr>
+          <a:lstStyle/>
+          <a:p>
+            <a:r>
+              <a:rPr lang="en-US" dirty="0" smtClean="0"/>
+              <a:t>Committed files</a:t>
+            </a:r>
+            <a:endParaRPr lang="en-US" dirty="0"/>
+          </a:p>
+        </p:txBody>
+      </p:sp>
+      <p:cxnSp>
+        <p:nvCxnSpPr>
+          <p:cNvPr id="17" name="Straight Connector 16"/>
+          <p:cNvCxnSpPr/>
+          <p:nvPr/>
+        </p:nvCxnSpPr>
+        <p:spPr>
+          <a:xfrm>
+            <a:off x="1076841" y="3690408"/>
+            <a:ext cx="10534309" cy="23411"/>
+          </a:xfrm>
+          <a:prstGeom prst="line">
+            <a:avLst/>
+          </a:prstGeom>
+        </p:spPr>
+        <p:style>
+          <a:lnRef idx="2">
+            <a:schemeClr val="accent1"/>
+          </a:lnRef>
+          <a:fillRef idx="0">
+            <a:schemeClr val="accent1"/>
+          </a:fillRef>
+          <a:effectRef idx="1">
+            <a:schemeClr val="accent1"/>
+          </a:effectRef>
+          <a:fontRef idx="minor">
+            <a:schemeClr val="tx1"/>
+          </a:fontRef>
+        </p:style>
+      </p:cxnSp>
     </p:spTree>
     <p:extLst>
       <p:ext uri="{BB962C8B-B14F-4D97-AF65-F5344CB8AC3E}">
@@ -3250,9 +3787,298 @@
   <p:timing>
     <p:tnLst>
       <p:par>
-        <p:cTn id="1" dur="indefinite" restart="never" nodeType="tmRoot"/>
+        <p:cTn xmlns:p14="http://schemas.microsoft.com/office/powerpoint/2010/main" id="1" dur="indefinite" restart="never" nodeType="tmRoot">
+          <p:childTnLst>
+            <p:seq concurrent="1" nextAc="seek">
+              <p:cTn id="2" dur="indefinite" nodeType="mainSeq">
+                <p:childTnLst>
+                  <p:par>
+                    <p:cTn id="3" fill="hold">
+                      <p:stCondLst>
+                        <p:cond delay="indefinite"/>
+                      </p:stCondLst>
+                      <p:childTnLst>
+                        <p:par>
+                          <p:cTn id="4" fill="hold">
+                            <p:stCondLst>
+                              <p:cond delay="0"/>
+                            </p:stCondLst>
+                            <p:childTnLst>
+                              <p:par>
+                                <p:cTn id="5" presetID="0" presetClass="path" presetSubtype="0" accel="50000" decel="50000" fill="hold" grpId="0" nodeType="clickEffect">
+                                  <p:stCondLst>
+                                    <p:cond delay="0"/>
+                                  </p:stCondLst>
+                                  <p:childTnLst>
+                                    <p:animMotion origin="layout" path="M 2.15262E-6 -0.00254 L 0.00039 0.22472 " pathEditMode="relative" rAng="0" ptsTypes="AA">
+                                      <p:cBhvr>
+                                        <p:cTn id="6" dur="2000" fill="hold"/>
+                                        <p:tgtEl>
+                                          <p:spTgt spid="10"/>
+                                        </p:tgtEl>
+                                        <p:attrNameLst>
+                                          <p:attrName>ppt_x</p:attrName>
+                                          <p:attrName>ppt_y</p:attrName>
+                                        </p:attrNameLst>
+                                      </p:cBhvr>
+                                      <p:rCtr x="13" y="11363"/>
+                                    </p:animMotion>
+                                  </p:childTnLst>
+                                  <p:subTnLst>
+                                    <p:animClr clrSpc="rgb" dir="cw">
+                                      <p:cBhvr override="childStyle">
+                                        <p:cTn dur="1" fill="hold" display="0" masterRel="nextClick" afterEffect="1"/>
+                                        <p:tgtEl>
+                                          <p:spTgt spid="10"/>
+                                        </p:tgtEl>
+                                        <p:attrNameLst>
+                                          <p:attrName>ppt_c</p:attrName>
+                                        </p:attrNameLst>
+                                      </p:cBhvr>
+                                      <p:to>
+                                        <a:srgbClr val="00FF00"/>
+                                      </p:to>
+                                    </p:animClr>
+                                  </p:subTnLst>
+                                </p:cTn>
+                              </p:par>
+                            </p:childTnLst>
+                          </p:cTn>
+                        </p:par>
+                      </p:childTnLst>
+                    </p:cTn>
+                  </p:par>
+                  <p:par>
+                    <p:cTn id="7" fill="hold">
+                      <p:stCondLst>
+                        <p:cond delay="indefinite"/>
+                      </p:stCondLst>
+                      <p:childTnLst>
+                        <p:par>
+                          <p:cTn id="8" fill="hold">
+                            <p:stCondLst>
+                              <p:cond delay="0"/>
+                            </p:stCondLst>
+                            <p:childTnLst>
+                              <p:par>
+                                <p:cTn id="9" presetID="0" presetClass="path" presetSubtype="0" accel="50000" decel="50000" fill="hold" grpId="0" nodeType="clickEffect">
+                                  <p:stCondLst>
+                                    <p:cond delay="0"/>
+                                  </p:stCondLst>
+                                  <p:childTnLst>
+                                    <p:animMotion origin="layout" path="M 0.00052 -0.01366 L 0.00052 0.22356 " pathEditMode="relative" rAng="0" ptsTypes="AA">
+                                      <p:cBhvr>
+                                        <p:cTn id="10" dur="2000" fill="hold"/>
+                                        <p:tgtEl>
+                                          <p:spTgt spid="11"/>
+                                        </p:tgtEl>
+                                        <p:attrNameLst>
+                                          <p:attrName>ppt_x</p:attrName>
+                                          <p:attrName>ppt_y</p:attrName>
+                                        </p:attrNameLst>
+                                      </p:cBhvr>
+                                      <p:rCtr x="0" y="11849"/>
+                                    </p:animMotion>
+                                  </p:childTnLst>
+                                  <p:subTnLst>
+                                    <p:animClr clrSpc="rgb" dir="cw">
+                                      <p:cBhvr override="childStyle">
+                                        <p:cTn dur="1" fill="hold" display="0" masterRel="nextClick" afterEffect="1"/>
+                                        <p:tgtEl>
+                                          <p:spTgt spid="11"/>
+                                        </p:tgtEl>
+                                        <p:attrNameLst>
+                                          <p:attrName>ppt_c</p:attrName>
+                                        </p:attrNameLst>
+                                      </p:cBhvr>
+                                      <p:to>
+                                        <a:srgbClr val="00FF00"/>
+                                      </p:to>
+                                    </p:animClr>
+                                  </p:subTnLst>
+                                </p:cTn>
+                              </p:par>
+                            </p:childTnLst>
+                          </p:cTn>
+                        </p:par>
+                      </p:childTnLst>
+                    </p:cTn>
+                  </p:par>
+                  <p:par>
+                    <p:cTn id="11" fill="hold">
+                      <p:stCondLst>
+                        <p:cond delay="indefinite"/>
+                      </p:stCondLst>
+                      <p:childTnLst>
+                        <p:par>
+                          <p:cTn id="12" fill="hold">
+                            <p:stCondLst>
+                              <p:cond delay="0"/>
+                            </p:stCondLst>
+                            <p:childTnLst>
+                              <p:par>
+                                <p:cTn id="13" presetID="1" presetClass="entr" presetSubtype="0" fill="hold" nodeType="clickEffect">
+                                  <p:stCondLst>
+                                    <p:cond delay="0"/>
+                                  </p:stCondLst>
+                                  <p:childTnLst>
+                                    <p:set>
+                                      <p:cBhvr>
+                                        <p:cTn id="14" dur="1" fill="hold">
+                                          <p:stCondLst>
+                                            <p:cond delay="0"/>
+                                          </p:stCondLst>
+                                        </p:cTn>
+                                        <p:tgtEl>
+                                          <p:spTgt spid="9"/>
+                                        </p:tgtEl>
+                                        <p:attrNameLst>
+                                          <p:attrName>style.visibility</p:attrName>
+                                        </p:attrNameLst>
+                                      </p:cBhvr>
+                                      <p:to>
+                                        <p:strVal val="visible"/>
+                                      </p:to>
+                                    </p:set>
+                                  </p:childTnLst>
+                                </p:cTn>
+                              </p:par>
+                              <p:par>
+                                <p:cTn id="15" presetID="42" presetClass="path" presetSubtype="0" accel="50000" decel="50000" fill="hold" grpId="1" nodeType="withEffect">
+                                  <p:stCondLst>
+                                    <p:cond delay="500"/>
+                                  </p:stCondLst>
+                                  <p:childTnLst>
+                                    <p:animMotion origin="layout" path="M 0.00039 0.22472 L -0.00039 -0.00162 " pathEditMode="relative" rAng="0" ptsTypes="AA">
+                                      <p:cBhvr>
+                                        <p:cTn id="16" dur="500" fill="hold"/>
+                                        <p:tgtEl>
+                                          <p:spTgt spid="10"/>
+                                        </p:tgtEl>
+                                        <p:attrNameLst>
+                                          <p:attrName>ppt_x</p:attrName>
+                                          <p:attrName>ppt_y</p:attrName>
+                                        </p:attrNameLst>
+                                      </p:cBhvr>
+                                      <p:rCtr x="-39" y="-11317"/>
+                                    </p:animMotion>
+                                  </p:childTnLst>
+                                  <p:subTnLst>
+                                    <p:animClr clrSpc="rgb" dir="cw">
+                                      <p:cBhvr override="childStyle">
+                                        <p:cTn dur="1" fill="hold" display="0" masterRel="nextClick" afterEffect="1"/>
+                                        <p:tgtEl>
+                                          <p:spTgt spid="10"/>
+                                        </p:tgtEl>
+                                        <p:attrNameLst>
+                                          <p:attrName>ppt_c</p:attrName>
+                                        </p:attrNameLst>
+                                      </p:cBhvr>
+                                      <p:to>
+                                        <a:srgbClr val="FF0000"/>
+                                      </p:to>
+                                    </p:animClr>
+                                  </p:subTnLst>
+                                </p:cTn>
+                              </p:par>
+                              <p:par>
+                                <p:cTn id="17" presetID="42" presetClass="path" presetSubtype="0" accel="50000" decel="50000" fill="hold" grpId="1" nodeType="withEffect">
+                                  <p:stCondLst>
+                                    <p:cond delay="0"/>
+                                  </p:stCondLst>
+                                  <p:childTnLst>
+                                    <p:animMotion origin="layout" path="M 0.00052 0.22356 L 0.00013 -0.00533 " pathEditMode="relative" rAng="0" ptsTypes="AA">
+                                      <p:cBhvr>
+                                        <p:cTn id="18" dur="500" fill="hold"/>
+                                        <p:tgtEl>
+                                          <p:spTgt spid="11"/>
+                                        </p:tgtEl>
+                                        <p:attrNameLst>
+                                          <p:attrName>ppt_x</p:attrName>
+                                          <p:attrName>ppt_y</p:attrName>
+                                        </p:attrNameLst>
+                                      </p:cBhvr>
+                                      <p:rCtr x="-26" y="-11456"/>
+                                    </p:animMotion>
+                                  </p:childTnLst>
+                                  <p:subTnLst>
+                                    <p:animClr clrSpc="rgb" dir="cw">
+                                      <p:cBhvr override="childStyle">
+                                        <p:cTn dur="1" fill="hold" display="0" masterRel="nextClick" afterEffect="1"/>
+                                        <p:tgtEl>
+                                          <p:spTgt spid="11"/>
+                                        </p:tgtEl>
+                                        <p:attrNameLst>
+                                          <p:attrName>ppt_c</p:attrName>
+                                        </p:attrNameLst>
+                                      </p:cBhvr>
+                                      <p:to>
+                                        <a:srgbClr val="FF0000"/>
+                                      </p:to>
+                                    </p:animClr>
+                                  </p:subTnLst>
+                                </p:cTn>
+                              </p:par>
+                              <p:par>
+                                <p:cTn id="19" presetID="1" presetClass="exit" presetSubtype="0" fill="hold" nodeType="withEffect">
+                                  <p:stCondLst>
+                                    <p:cond delay="0"/>
+                                  </p:stCondLst>
+                                  <p:childTnLst>
+                                    <p:set>
+                                      <p:cBhvr>
+                                        <p:cTn id="20" dur="1" fill="hold">
+                                          <p:stCondLst>
+                                            <p:cond delay="0"/>
+                                          </p:stCondLst>
+                                        </p:cTn>
+                                        <p:tgtEl>
+                                          <p:spTgt spid="7"/>
+                                        </p:tgtEl>
+                                        <p:attrNameLst>
+                                          <p:attrName>style.visibility</p:attrName>
+                                        </p:attrNameLst>
+                                      </p:cBhvr>
+                                      <p:to>
+                                        <p:strVal val="hidden"/>
+                                      </p:to>
+                                    </p:set>
+                                  </p:childTnLst>
+                                </p:cTn>
+                              </p:par>
+                            </p:childTnLst>
+                          </p:cTn>
+                        </p:par>
+                      </p:childTnLst>
+                    </p:cTn>
+                  </p:par>
+                </p:childTnLst>
+              </p:cTn>
+              <p:prevCondLst>
+                <p:cond evt="onPrev" delay="0">
+                  <p:tgtEl>
+                    <p:sldTgt/>
+                  </p:tgtEl>
+                </p:cond>
+              </p:prevCondLst>
+              <p:nextCondLst>
+                <p:cond evt="onNext" delay="0">
+                  <p:tgtEl>
+                    <p:sldTgt/>
+                  </p:tgtEl>
+                </p:cond>
+              </p:nextCondLst>
+            </p:seq>
+          </p:childTnLst>
+        </p:cTn>
       </p:par>
     </p:tnLst>
+    <p:bldLst>
+      <p:bldP spid="10" grpId="0"/>
+      <p:bldP spid="10" grpId="1"/>
+      <p:bldP spid="11" grpId="0"/>
+      <p:bldP spid="11" grpId="1"/>
+    </p:bldLst>
   </p:timing>
 </p:sld>
 </file>
@@ -3333,7 +4159,7 @@
   <p:timing>
     <p:tnLst>
       <p:par>
-        <p:cTn id="1" dur="indefinite" restart="never" nodeType="tmRoot"/>
+        <p:cTn xmlns:p14="http://schemas.microsoft.com/office/powerpoint/2010/main" id="1" dur="indefinite" restart="never" nodeType="tmRoot"/>
       </p:par>
     </p:tnLst>
   </p:timing>
@@ -3424,7 +4250,7 @@
   <p:timing>
     <p:tnLst>
       <p:par>
-        <p:cTn id="1" dur="indefinite" restart="never" nodeType="tmRoot"/>
+        <p:cTn xmlns:p14="http://schemas.microsoft.com/office/powerpoint/2010/main" id="1" dur="indefinite" restart="never" nodeType="tmRoot"/>
       </p:par>
     </p:tnLst>
   </p:timing>
@@ -3507,7 +4333,7 @@
   <p:timing>
     <p:tnLst>
       <p:par>
-        <p:cTn id="1" dur="indefinite" restart="never" nodeType="tmRoot"/>
+        <p:cTn xmlns:p14="http://schemas.microsoft.com/office/powerpoint/2010/main" id="1" dur="indefinite" restart="never" nodeType="tmRoot"/>
       </p:par>
     </p:tnLst>
   </p:timing>
@@ -3590,7 +4416,7 @@
   <p:timing>
     <p:tnLst>
       <p:par>
-        <p:cTn id="1" dur="indefinite" restart="never" nodeType="tmRoot"/>
+        <p:cTn xmlns:p14="http://schemas.microsoft.com/office/powerpoint/2010/main" id="1" dur="indefinite" restart="never" nodeType="tmRoot"/>
       </p:par>
     </p:tnLst>
   </p:timing>
@@ -3673,7 +4499,7 @@
   <p:timing>
     <p:tnLst>
       <p:par>
-        <p:cTn id="1" dur="indefinite" restart="never" nodeType="tmRoot"/>
+        <p:cTn xmlns:p14="http://schemas.microsoft.com/office/powerpoint/2010/main" id="1" dur="indefinite" restart="never" nodeType="tmRoot"/>
       </p:par>
     </p:tnLst>
   </p:timing>
@@ -3764,7 +4590,7 @@
   <p:timing>
     <p:tnLst>
       <p:par>
-        <p:cTn id="1" dur="indefinite" restart="never" nodeType="tmRoot"/>
+        <p:cTn xmlns:p14="http://schemas.microsoft.com/office/powerpoint/2010/main" id="1" dur="indefinite" restart="never" nodeType="tmRoot"/>
       </p:par>
     </p:tnLst>
   </p:timing>
@@ -3847,7 +4673,7 @@
   <p:timing>
     <p:tnLst>
       <p:par>
-        <p:cTn id="1" dur="indefinite" restart="never" nodeType="tmRoot"/>
+        <p:cTn xmlns:p14="http://schemas.microsoft.com/office/powerpoint/2010/main" id="1" dur="indefinite" restart="never" nodeType="tmRoot"/>
       </p:par>
     </p:tnLst>
   </p:timing>
@@ -3930,7 +4756,7 @@
   <p:timing>
     <p:tnLst>
       <p:par>
-        <p:cTn id="1" dur="indefinite" restart="never" nodeType="tmRoot"/>
+        <p:cTn xmlns:p14="http://schemas.microsoft.com/office/powerpoint/2010/main" id="1" dur="indefinite" restart="never" nodeType="tmRoot"/>
       </p:par>
     </p:tnLst>
   </p:timing>
@@ -4054,7 +4880,7 @@
   <p:timing>
     <p:tnLst>
       <p:par>
-        <p:cTn id="1" dur="indefinite" restart="never" nodeType="tmRoot"/>
+        <p:cTn xmlns:p14="http://schemas.microsoft.com/office/powerpoint/2010/main" id="1" dur="indefinite" restart="never" nodeType="tmRoot"/>
       </p:par>
     </p:tnLst>
   </p:timing>
@@ -4133,7 +4959,7 @@
   <p:timing>
     <p:tnLst>
       <p:par>
-        <p:cTn id="1" dur="indefinite" restart="never" nodeType="tmRoot"/>
+        <p:cTn xmlns:p14="http://schemas.microsoft.com/office/powerpoint/2010/main" id="1" dur="indefinite" restart="never" nodeType="tmRoot"/>
       </p:par>
     </p:tnLst>
   </p:timing>
@@ -4212,7 +5038,7 @@
   <p:timing>
     <p:tnLst>
       <p:par>
-        <p:cTn id="1" dur="indefinite" restart="never" nodeType="tmRoot"/>
+        <p:cTn xmlns:p14="http://schemas.microsoft.com/office/powerpoint/2010/main" id="1" dur="indefinite" restart="never" nodeType="tmRoot"/>
       </p:par>
     </p:tnLst>
   </p:timing>
@@ -4344,7 +5170,7 @@
   <p:timing>
     <p:tnLst>
       <p:par>
-        <p:cTn id="1" dur="indefinite" restart="never" nodeType="tmRoot">
+        <p:cTn xmlns:p14="http://schemas.microsoft.com/office/powerpoint/2010/main" id="1" dur="indefinite" restart="never" nodeType="tmRoot">
           <p:childTnLst>
             <p:seq concurrent="1" nextAc="seek">
               <p:cTn id="2" dur="indefinite" nodeType="mainSeq">
@@ -4876,7 +5702,7 @@
   <p:timing>
     <p:tnLst>
       <p:par>
-        <p:cTn id="1" dur="indefinite" restart="never" nodeType="tmRoot">
+        <p:cTn xmlns:p14="http://schemas.microsoft.com/office/powerpoint/2010/main" id="1" dur="indefinite" restart="never" nodeType="tmRoot">
           <p:childTnLst>
             <p:seq concurrent="1" nextAc="seek">
               <p:cTn id="2" dur="indefinite" nodeType="mainSeq">
@@ -5349,7 +6175,7 @@
   <p:timing>
     <p:tnLst>
       <p:par>
-        <p:cTn id="1" dur="indefinite" restart="never" nodeType="tmRoot"/>
+        <p:cTn xmlns:p14="http://schemas.microsoft.com/office/powerpoint/2010/main" id="1" dur="indefinite" restart="never" nodeType="tmRoot"/>
       </p:par>
     </p:tnLst>
   </p:timing>
@@ -5396,19 +6222,7 @@
             <a:pPr algn="ctr"/>
             <a:r>
               <a:rPr lang="en-US" dirty="0" smtClean="0"/>
-              <a:t>Repository </a:t>
-            </a:r>
-            <a:r>
-              <a:rPr lang="en-US" dirty="0" smtClean="0"/>
-              <a:t>            vs</a:t>
-            </a:r>
-            <a:r>
-              <a:rPr lang="en-US" dirty="0" smtClean="0"/>
-              <a:t>. </a:t>
-            </a:r>
-            <a:r>
-              <a:rPr lang="en-US" dirty="0" smtClean="0"/>
-              <a:t>               File</a:t>
+              <a:t>Repository             vs.                File</a:t>
             </a:r>
             <a:endParaRPr lang="en-US" dirty="0"/>
           </a:p>
@@ -5481,7 +6295,7 @@
   <p:timing>
     <p:tnLst>
       <p:par>
-        <p:cTn id="1" dur="indefinite" restart="never" nodeType="tmRoot"/>
+        <p:cTn xmlns:p14="http://schemas.microsoft.com/office/powerpoint/2010/main" id="1" dur="indefinite" restart="never" nodeType="tmRoot"/>
       </p:par>
     </p:tnLst>
   </p:timing>
@@ -5561,7 +6375,6 @@
               <a:rPr lang="en-US" dirty="0" smtClean="0"/>
               <a:t>Ex. Subversion (SVN)</a:t>
             </a:r>
-            <a:endParaRPr lang="en-US" dirty="0" smtClean="0"/>
           </a:p>
           <a:p>
             <a:endParaRPr lang="en-US" dirty="0"/>
@@ -5629,7 +6442,7 @@
   <p:timing>
     <p:tnLst>
       <p:par>
-        <p:cTn id="1" dur="indefinite" restart="never" nodeType="tmRoot"/>
+        <p:cTn xmlns:p14="http://schemas.microsoft.com/office/powerpoint/2010/main" id="1" dur="indefinite" restart="never" nodeType="tmRoot"/>
       </p:par>
     </p:tnLst>
   </p:timing>
@@ -6351,7 +7164,7 @@
   <p:timing>
     <p:tnLst>
       <p:par>
-        <p:cTn id="1" dur="indefinite" restart="never" nodeType="tmRoot">
+        <p:cTn xmlns:p14="http://schemas.microsoft.com/office/powerpoint/2010/main" id="1" dur="indefinite" restart="never" nodeType="tmRoot">
           <p:childTnLst>
             <p:seq concurrent="1" nextAc="seek">
               <p:cTn id="2" dur="indefinite" nodeType="mainSeq">
@@ -6842,6 +7655,239 @@
                                         </p:cTn>
                                         <p:tgtEl>
                                           <p:spTgt spid="20"/>
+                                        </p:tgtEl>
+                                        <p:attrNameLst>
+                                          <p:attrName>style.visibility</p:attrName>
+                                        </p:attrNameLst>
+                                      </p:cBhvr>
+                                      <p:to>
+                                        <p:strVal val="hidden"/>
+                                      </p:to>
+                                    </p:set>
+                                  </p:childTnLst>
+                                </p:cTn>
+                              </p:par>
+                            </p:childTnLst>
+                          </p:cTn>
+                        </p:par>
+                      </p:childTnLst>
+                    </p:cTn>
+                  </p:par>
+                  <p:par>
+                    <p:cTn id="35" fill="hold">
+                      <p:stCondLst>
+                        <p:cond delay="indefinite"/>
+                      </p:stCondLst>
+                      <p:childTnLst>
+                        <p:par>
+                          <p:cTn id="36" fill="hold">
+                            <p:stCondLst>
+                              <p:cond delay="0"/>
+                            </p:stCondLst>
+                            <p:childTnLst>
+                              <p:par>
+                                <p:cTn id="37" presetID="1" presetClass="entr" presetSubtype="0" fill="hold" nodeType="clickEffect">
+                                  <p:stCondLst>
+                                    <p:cond delay="0"/>
+                                  </p:stCondLst>
+                                  <p:childTnLst>
+                                    <p:set>
+                                      <p:cBhvr>
+                                        <p:cTn id="38" dur="1" fill="hold">
+                                          <p:stCondLst>
+                                            <p:cond delay="0"/>
+                                          </p:stCondLst>
+                                        </p:cTn>
+                                        <p:tgtEl>
+                                          <p:spTgt spid="33"/>
+                                        </p:tgtEl>
+                                        <p:attrNameLst>
+                                          <p:attrName>style.visibility</p:attrName>
+                                        </p:attrNameLst>
+                                      </p:cBhvr>
+                                      <p:to>
+                                        <p:strVal val="visible"/>
+                                      </p:to>
+                                    </p:set>
+                                  </p:childTnLst>
+                                </p:cTn>
+                              </p:par>
+                              <p:par>
+                                <p:cTn id="39" presetID="1" presetClass="entr" presetSubtype="0" fill="hold" nodeType="withEffect">
+                                  <p:stCondLst>
+                                    <p:cond delay="0"/>
+                                  </p:stCondLst>
+                                  <p:childTnLst>
+                                    <p:set>
+                                      <p:cBhvr>
+                                        <p:cTn id="40" dur="1" fill="hold">
+                                          <p:stCondLst>
+                                            <p:cond delay="0"/>
+                                          </p:stCondLst>
+                                        </p:cTn>
+                                        <p:tgtEl>
+                                          <p:spTgt spid="18"/>
+                                        </p:tgtEl>
+                                        <p:attrNameLst>
+                                          <p:attrName>style.visibility</p:attrName>
+                                        </p:attrNameLst>
+                                      </p:cBhvr>
+                                      <p:to>
+                                        <p:strVal val="visible"/>
+                                      </p:to>
+                                    </p:set>
+                                  </p:childTnLst>
+                                </p:cTn>
+                              </p:par>
+                              <p:par>
+                                <p:cTn id="41" presetID="1" presetClass="entr" presetSubtype="0" fill="hold" nodeType="withEffect">
+                                  <p:stCondLst>
+                                    <p:cond delay="0"/>
+                                  </p:stCondLst>
+                                  <p:childTnLst>
+                                    <p:set>
+                                      <p:cBhvr>
+                                        <p:cTn id="42" dur="1" fill="hold">
+                                          <p:stCondLst>
+                                            <p:cond delay="0"/>
+                                          </p:stCondLst>
+                                        </p:cTn>
+                                        <p:tgtEl>
+                                          <p:spTgt spid="16"/>
+                                        </p:tgtEl>
+                                        <p:attrNameLst>
+                                          <p:attrName>style.visibility</p:attrName>
+                                        </p:attrNameLst>
+                                      </p:cBhvr>
+                                      <p:to>
+                                        <p:strVal val="visible"/>
+                                      </p:to>
+                                    </p:set>
+                                  </p:childTnLst>
+                                </p:cTn>
+                              </p:par>
+                              <p:par>
+                                <p:cTn id="43" presetID="1" presetClass="entr" presetSubtype="0" fill="hold" nodeType="withEffect">
+                                  <p:stCondLst>
+                                    <p:cond delay="0"/>
+                                  </p:stCondLst>
+                                  <p:childTnLst>
+                                    <p:set>
+                                      <p:cBhvr>
+                                        <p:cTn id="44" dur="1" fill="hold">
+                                          <p:stCondLst>
+                                            <p:cond delay="0"/>
+                                          </p:stCondLst>
+                                        </p:cTn>
+                                        <p:tgtEl>
+                                          <p:spTgt spid="22"/>
+                                        </p:tgtEl>
+                                        <p:attrNameLst>
+                                          <p:attrName>style.visibility</p:attrName>
+                                        </p:attrNameLst>
+                                      </p:cBhvr>
+                                      <p:to>
+                                        <p:strVal val="visible"/>
+                                      </p:to>
+                                    </p:set>
+                                  </p:childTnLst>
+                                </p:cTn>
+                              </p:par>
+                              <p:par>
+                                <p:cTn id="45" presetID="1" presetClass="entr" presetSubtype="0" fill="hold" nodeType="withEffect">
+                                  <p:stCondLst>
+                                    <p:cond delay="0"/>
+                                  </p:stCondLst>
+                                  <p:childTnLst>
+                                    <p:set>
+                                      <p:cBhvr>
+                                        <p:cTn id="46" dur="1" fill="hold">
+                                          <p:stCondLst>
+                                            <p:cond delay="0"/>
+                                          </p:stCondLst>
+                                        </p:cTn>
+                                        <p:tgtEl>
+                                          <p:spTgt spid="20"/>
+                                        </p:tgtEl>
+                                        <p:attrNameLst>
+                                          <p:attrName>style.visibility</p:attrName>
+                                        </p:attrNameLst>
+                                      </p:cBhvr>
+                                      <p:to>
+                                        <p:strVal val="visible"/>
+                                      </p:to>
+                                    </p:set>
+                                  </p:childTnLst>
+                                </p:cTn>
+                              </p:par>
+                              <p:par>
+                                <p:cTn id="47" presetID="1" presetClass="entr" presetSubtype="0" fill="hold" nodeType="withEffect">
+                                  <p:stCondLst>
+                                    <p:cond delay="0"/>
+                                  </p:stCondLst>
+                                  <p:childTnLst>
+                                    <p:set>
+                                      <p:cBhvr>
+                                        <p:cTn id="48" dur="1" fill="hold">
+                                          <p:stCondLst>
+                                            <p:cond delay="0"/>
+                                          </p:stCondLst>
+                                        </p:cTn>
+                                        <p:tgtEl>
+                                          <p:spTgt spid="14"/>
+                                        </p:tgtEl>
+                                        <p:attrNameLst>
+                                          <p:attrName>style.visibility</p:attrName>
+                                        </p:attrNameLst>
+                                      </p:cBhvr>
+                                      <p:to>
+                                        <p:strVal val="visible"/>
+                                      </p:to>
+                                    </p:set>
+                                  </p:childTnLst>
+                                </p:cTn>
+                              </p:par>
+                            </p:childTnLst>
+                          </p:cTn>
+                        </p:par>
+                      </p:childTnLst>
+                    </p:cTn>
+                  </p:par>
+                  <p:par>
+                    <p:cTn id="49" fill="hold">
+                      <p:stCondLst>
+                        <p:cond delay="indefinite"/>
+                      </p:stCondLst>
+                      <p:childTnLst>
+                        <p:par>
+                          <p:cTn id="50" fill="hold">
+                            <p:stCondLst>
+                              <p:cond delay="0"/>
+                            </p:stCondLst>
+                            <p:childTnLst>
+                              <p:par>
+                                <p:cTn id="51" presetID="6" presetClass="exit" presetSubtype="32" fill="hold" nodeType="clickEffect">
+                                  <p:stCondLst>
+                                    <p:cond delay="0"/>
+                                  </p:stCondLst>
+                                  <p:childTnLst>
+                                    <p:animEffect transition="out" filter="circle(out)">
+                                      <p:cBhvr>
+                                        <p:cTn id="52" dur="500"/>
+                                        <p:tgtEl>
+                                          <p:spTgt spid="4"/>
+                                        </p:tgtEl>
+                                      </p:cBhvr>
+                                    </p:animEffect>
+                                    <p:set>
+                                      <p:cBhvr>
+                                        <p:cTn id="53" dur="1" fill="hold">
+                                          <p:stCondLst>
+                                            <p:cond delay="499"/>
+                                          </p:stCondLst>
+                                        </p:cTn>
+                                        <p:tgtEl>
+                                          <p:spTgt spid="4"/>
                                         </p:tgtEl>
                                         <p:attrNameLst>
                                           <p:attrName>style.visibility</p:attrName>
@@ -6912,7 +7958,12 @@
             <p:ph type="title"/>
           </p:nvPr>
         </p:nvSpPr>
-        <p:spPr/>
+        <p:spPr>
+          <a:xfrm>
+            <a:off x="159322" y="49075"/>
+            <a:ext cx="7004008" cy="1325563"/>
+          </a:xfrm>
+        </p:spPr>
         <p:txBody>
           <a:bodyPr/>
           <a:lstStyle/>
@@ -6925,25 +7976,665 @@
           </a:p>
         </p:txBody>
       </p:sp>
-      <p:sp>
-        <p:nvSpPr>
-          <p:cNvPr id="3" name="Content Placeholder 2"/>
-          <p:cNvSpPr>
-            <a:spLocks noGrp="1"/>
-          </p:cNvSpPr>
-          <p:nvPr>
-            <p:ph idx="1"/>
-          </p:nvPr>
-        </p:nvSpPr>
-        <p:spPr/>
-        <p:txBody>
-          <a:bodyPr/>
-          <a:lstStyle/>
-          <a:p>
+      <p:pic>
+        <p:nvPicPr>
+          <p:cNvPr id="5" name="Picture 4"/>
+          <p:cNvPicPr>
+            <a:picLocks noChangeAspect="1"/>
+          </p:cNvPicPr>
+          <p:nvPr/>
+        </p:nvPicPr>
+        <p:blipFill>
+          <a:blip r:embed="rId2"/>
+          <a:stretch>
+            <a:fillRect/>
+          </a:stretch>
+        </p:blipFill>
+        <p:spPr>
+          <a:xfrm>
+            <a:off x="5056192" y="1253746"/>
+            <a:ext cx="1822439" cy="1822439"/>
+          </a:xfrm>
+          <a:prstGeom prst="rect">
+            <a:avLst/>
+          </a:prstGeom>
+        </p:spPr>
+      </p:pic>
+      <p:sp>
+        <p:nvSpPr>
+          <p:cNvPr id="9" name="Rectangle 8"/>
+          <p:cNvSpPr/>
+          <p:nvPr/>
+        </p:nvSpPr>
+        <p:spPr>
+          <a:xfrm>
+            <a:off x="8354291" y="488373"/>
+            <a:ext cx="3200400" cy="1735282"/>
+          </a:xfrm>
+          <a:prstGeom prst="rect">
+            <a:avLst/>
+          </a:prstGeom>
+          <a:solidFill>
+            <a:schemeClr val="accent1">
+              <a:lumMod val="20000"/>
+              <a:lumOff val="80000"/>
+            </a:schemeClr>
+          </a:solidFill>
+          <a:ln>
+            <a:solidFill>
+              <a:schemeClr val="accent1"/>
+            </a:solidFill>
+          </a:ln>
+        </p:spPr>
+        <p:style>
+          <a:lnRef idx="2">
+            <a:schemeClr val="accent1">
+              <a:shade val="50000"/>
+            </a:schemeClr>
+          </a:lnRef>
+          <a:fillRef idx="1">
+            <a:schemeClr val="accent1"/>
+          </a:fillRef>
+          <a:effectRef idx="0">
+            <a:schemeClr val="accent1"/>
+          </a:effectRef>
+          <a:fontRef idx="minor">
+            <a:schemeClr val="lt1"/>
+          </a:fontRef>
+        </p:style>
+        <p:txBody>
+          <a:bodyPr rtlCol="0" anchor="ctr"/>
+          <a:lstStyle/>
+          <a:p>
+            <a:pPr algn="ctr"/>
             <a:endParaRPr lang="en-US"/>
           </a:p>
         </p:txBody>
       </p:sp>
+      <p:pic>
+        <p:nvPicPr>
+          <p:cNvPr id="10" name="Picture 9"/>
+          <p:cNvPicPr>
+            <a:picLocks noChangeAspect="1"/>
+          </p:cNvPicPr>
+          <p:nvPr/>
+        </p:nvPicPr>
+        <p:blipFill>
+          <a:blip r:embed="rId3" cstate="print">
+            <a:extLst>
+              <a:ext uri="{28A0092B-C50C-407E-A947-70E740481C1C}">
+                <a14:useLocalDpi xmlns:a14="http://schemas.microsoft.com/office/drawing/2010/main" val="0"/>
+              </a:ext>
+            </a:extLst>
+          </a:blip>
+          <a:stretch>
+            <a:fillRect/>
+          </a:stretch>
+        </p:blipFill>
+        <p:spPr>
+          <a:xfrm>
+            <a:off x="8445802" y="1488786"/>
+            <a:ext cx="933922" cy="643306"/>
+          </a:xfrm>
+          <a:prstGeom prst="rect">
+            <a:avLst/>
+          </a:prstGeom>
+        </p:spPr>
+      </p:pic>
+      <p:pic>
+        <p:nvPicPr>
+          <p:cNvPr id="11" name="Picture 10"/>
+          <p:cNvPicPr>
+            <a:picLocks noChangeAspect="1"/>
+          </p:cNvPicPr>
+          <p:nvPr/>
+        </p:nvPicPr>
+        <p:blipFill>
+          <a:blip r:embed="rId2"/>
+          <a:stretch>
+            <a:fillRect/>
+          </a:stretch>
+        </p:blipFill>
+        <p:spPr>
+          <a:xfrm>
+            <a:off x="8541091" y="613063"/>
+            <a:ext cx="838633" cy="838633"/>
+          </a:xfrm>
+          <a:prstGeom prst="rect">
+            <a:avLst/>
+          </a:prstGeom>
+        </p:spPr>
+      </p:pic>
+      <p:sp>
+        <p:nvSpPr>
+          <p:cNvPr id="12" name="TextBox 11"/>
+          <p:cNvSpPr txBox="1"/>
+          <p:nvPr/>
+        </p:nvSpPr>
+        <p:spPr>
+          <a:xfrm>
+            <a:off x="9645794" y="815103"/>
+            <a:ext cx="2293361" cy="369332"/>
+          </a:xfrm>
+          <a:prstGeom prst="rect">
+            <a:avLst/>
+          </a:prstGeom>
+          <a:noFill/>
+        </p:spPr>
+        <p:txBody>
+          <a:bodyPr wrap="square" rtlCol="0">
+            <a:spAutoFit/>
+          </a:bodyPr>
+          <a:lstStyle/>
+          <a:p>
+            <a:r>
+              <a:rPr lang="en-US" dirty="0" smtClean="0"/>
+              <a:t>Full Repository</a:t>
+            </a:r>
+            <a:endParaRPr lang="en-US" dirty="0"/>
+          </a:p>
+        </p:txBody>
+      </p:sp>
+      <p:sp>
+        <p:nvSpPr>
+          <p:cNvPr id="13" name="TextBox 12"/>
+          <p:cNvSpPr txBox="1"/>
+          <p:nvPr/>
+        </p:nvSpPr>
+        <p:spPr>
+          <a:xfrm>
+            <a:off x="9645794" y="1542058"/>
+            <a:ext cx="1815379" cy="369332"/>
+          </a:xfrm>
+          <a:prstGeom prst="rect">
+            <a:avLst/>
+          </a:prstGeom>
+          <a:noFill/>
+        </p:spPr>
+        <p:txBody>
+          <a:bodyPr wrap="square" rtlCol="0">
+            <a:spAutoFit/>
+          </a:bodyPr>
+          <a:lstStyle/>
+          <a:p>
+            <a:r>
+              <a:rPr lang="en-US" dirty="0" smtClean="0"/>
+              <a:t>Copy</a:t>
+            </a:r>
+            <a:endParaRPr lang="en-US" dirty="0"/>
+          </a:p>
+        </p:txBody>
+      </p:sp>
+      <p:cxnSp>
+        <p:nvCxnSpPr>
+          <p:cNvPr id="14" name="Straight Connector 13"/>
+          <p:cNvCxnSpPr/>
+          <p:nvPr/>
+        </p:nvCxnSpPr>
+        <p:spPr>
+          <a:xfrm flipH="1" flipV="1">
+            <a:off x="2285999" y="3247635"/>
+            <a:ext cx="2" cy="1015756"/>
+          </a:xfrm>
+          <a:prstGeom prst="line">
+            <a:avLst/>
+          </a:prstGeom>
+          <a:ln w="63500"/>
+        </p:spPr>
+        <p:style>
+          <a:lnRef idx="1">
+            <a:schemeClr val="accent1"/>
+          </a:lnRef>
+          <a:fillRef idx="0">
+            <a:schemeClr val="accent1"/>
+          </a:fillRef>
+          <a:effectRef idx="0">
+            <a:schemeClr val="accent1"/>
+          </a:effectRef>
+          <a:fontRef idx="minor">
+            <a:schemeClr val="tx1"/>
+          </a:fontRef>
+        </p:style>
+      </p:cxnSp>
+      <p:cxnSp>
+        <p:nvCxnSpPr>
+          <p:cNvPr id="15" name="Straight Connector 14"/>
+          <p:cNvCxnSpPr/>
+          <p:nvPr/>
+        </p:nvCxnSpPr>
+        <p:spPr>
+          <a:xfrm>
+            <a:off x="2285999" y="3247635"/>
+            <a:ext cx="3681413" cy="0"/>
+          </a:xfrm>
+          <a:prstGeom prst="line">
+            <a:avLst/>
+          </a:prstGeom>
+          <a:ln w="63500"/>
+        </p:spPr>
+        <p:style>
+          <a:lnRef idx="1">
+            <a:schemeClr val="accent1"/>
+          </a:lnRef>
+          <a:fillRef idx="0">
+            <a:schemeClr val="accent1"/>
+          </a:fillRef>
+          <a:effectRef idx="0">
+            <a:schemeClr val="accent1"/>
+          </a:effectRef>
+          <a:fontRef idx="minor">
+            <a:schemeClr val="tx1"/>
+          </a:fontRef>
+        </p:style>
+      </p:cxnSp>
+      <p:cxnSp>
+        <p:nvCxnSpPr>
+          <p:cNvPr id="16" name="Straight Connector 15"/>
+          <p:cNvCxnSpPr/>
+          <p:nvPr/>
+        </p:nvCxnSpPr>
+        <p:spPr>
+          <a:xfrm>
+            <a:off x="5967412" y="3247635"/>
+            <a:ext cx="0" cy="1214050"/>
+          </a:xfrm>
+          <a:prstGeom prst="line">
+            <a:avLst/>
+          </a:prstGeom>
+          <a:ln w="63500"/>
+        </p:spPr>
+        <p:style>
+          <a:lnRef idx="1">
+            <a:schemeClr val="accent1"/>
+          </a:lnRef>
+          <a:fillRef idx="0">
+            <a:schemeClr val="accent1"/>
+          </a:fillRef>
+          <a:effectRef idx="0">
+            <a:schemeClr val="accent1"/>
+          </a:effectRef>
+          <a:fontRef idx="minor">
+            <a:schemeClr val="tx1"/>
+          </a:fontRef>
+        </p:style>
+      </p:cxnSp>
+      <p:cxnSp>
+        <p:nvCxnSpPr>
+          <p:cNvPr id="17" name="Straight Connector 16"/>
+          <p:cNvCxnSpPr/>
+          <p:nvPr/>
+        </p:nvCxnSpPr>
+        <p:spPr>
+          <a:xfrm flipV="1">
+            <a:off x="9645794" y="3247635"/>
+            <a:ext cx="0" cy="1214049"/>
+          </a:xfrm>
+          <a:prstGeom prst="line">
+            <a:avLst/>
+          </a:prstGeom>
+          <a:ln w="63500"/>
+        </p:spPr>
+        <p:style>
+          <a:lnRef idx="1">
+            <a:schemeClr val="accent1"/>
+          </a:lnRef>
+          <a:fillRef idx="0">
+            <a:schemeClr val="accent1"/>
+          </a:fillRef>
+          <a:effectRef idx="0">
+            <a:schemeClr val="accent1"/>
+          </a:effectRef>
+          <a:fontRef idx="minor">
+            <a:schemeClr val="tx1"/>
+          </a:fontRef>
+        </p:style>
+      </p:cxnSp>
+      <p:cxnSp>
+        <p:nvCxnSpPr>
+          <p:cNvPr id="18" name="Straight Connector 17"/>
+          <p:cNvCxnSpPr/>
+          <p:nvPr/>
+        </p:nvCxnSpPr>
+        <p:spPr>
+          <a:xfrm>
+            <a:off x="5967412" y="3247635"/>
+            <a:ext cx="3678382" cy="0"/>
+          </a:xfrm>
+          <a:prstGeom prst="line">
+            <a:avLst/>
+          </a:prstGeom>
+          <a:ln w="63500"/>
+        </p:spPr>
+        <p:style>
+          <a:lnRef idx="1">
+            <a:schemeClr val="accent1"/>
+          </a:lnRef>
+          <a:fillRef idx="0">
+            <a:schemeClr val="accent1"/>
+          </a:fillRef>
+          <a:effectRef idx="0">
+            <a:schemeClr val="accent1"/>
+          </a:effectRef>
+          <a:fontRef idx="minor">
+            <a:schemeClr val="tx1"/>
+          </a:fontRef>
+        </p:style>
+      </p:cxnSp>
+      <p:cxnSp>
+        <p:nvCxnSpPr>
+          <p:cNvPr id="19" name="Straight Connector 18"/>
+          <p:cNvCxnSpPr>
+            <a:stCxn id="5" idx="2"/>
+          </p:cNvCxnSpPr>
+          <p:nvPr/>
+        </p:nvCxnSpPr>
+        <p:spPr>
+          <a:xfrm flipH="1">
+            <a:off x="5967411" y="3076185"/>
+            <a:ext cx="1" cy="1278645"/>
+          </a:xfrm>
+          <a:prstGeom prst="line">
+            <a:avLst/>
+          </a:prstGeom>
+          <a:ln w="63500"/>
+        </p:spPr>
+        <p:style>
+          <a:lnRef idx="1">
+            <a:schemeClr val="accent1"/>
+          </a:lnRef>
+          <a:fillRef idx="0">
+            <a:schemeClr val="accent1"/>
+          </a:fillRef>
+          <a:effectRef idx="0">
+            <a:schemeClr val="accent1"/>
+          </a:effectRef>
+          <a:fontRef idx="minor">
+            <a:schemeClr val="tx1"/>
+          </a:fontRef>
+        </p:style>
+      </p:cxnSp>
+      <p:cxnSp>
+        <p:nvCxnSpPr>
+          <p:cNvPr id="20" name="Straight Connector 19"/>
+          <p:cNvCxnSpPr/>
+          <p:nvPr/>
+        </p:nvCxnSpPr>
+        <p:spPr>
+          <a:xfrm>
+            <a:off x="276874" y="3049341"/>
+            <a:ext cx="11662281" cy="374"/>
+          </a:xfrm>
+          <a:prstGeom prst="line">
+            <a:avLst/>
+          </a:prstGeom>
+          <a:ln w="31750">
+            <a:solidFill>
+              <a:schemeClr val="accent1"/>
+            </a:solidFill>
+            <a:prstDash val="dash"/>
+          </a:ln>
+        </p:spPr>
+        <p:style>
+          <a:lnRef idx="1">
+            <a:schemeClr val="accent1"/>
+          </a:lnRef>
+          <a:fillRef idx="0">
+            <a:schemeClr val="accent1"/>
+          </a:fillRef>
+          <a:effectRef idx="0">
+            <a:schemeClr val="accent1"/>
+          </a:effectRef>
+          <a:fontRef idx="minor">
+            <a:schemeClr val="tx1"/>
+          </a:fontRef>
+        </p:style>
+      </p:cxnSp>
+      <p:sp>
+        <p:nvSpPr>
+          <p:cNvPr id="21" name="TextBox 20"/>
+          <p:cNvSpPr txBox="1"/>
+          <p:nvPr/>
+        </p:nvSpPr>
+        <p:spPr>
+          <a:xfrm>
+            <a:off x="276874" y="2455991"/>
+            <a:ext cx="2731770" cy="461665"/>
+          </a:xfrm>
+          <a:prstGeom prst="rect">
+            <a:avLst/>
+          </a:prstGeom>
+          <a:noFill/>
+        </p:spPr>
+        <p:txBody>
+          <a:bodyPr wrap="square" rtlCol="0">
+            <a:spAutoFit/>
+          </a:bodyPr>
+          <a:lstStyle/>
+          <a:p>
+            <a:r>
+              <a:rPr lang="en-US" sz="2400" dirty="0" smtClean="0"/>
+              <a:t>Server</a:t>
+            </a:r>
+            <a:endParaRPr lang="en-US" sz="2800" dirty="0"/>
+          </a:p>
+        </p:txBody>
+      </p:sp>
+      <p:sp>
+        <p:nvSpPr>
+          <p:cNvPr id="22" name="TextBox 21"/>
+          <p:cNvSpPr txBox="1"/>
+          <p:nvPr/>
+        </p:nvSpPr>
+        <p:spPr>
+          <a:xfrm>
+            <a:off x="276874" y="3161910"/>
+            <a:ext cx="2457450" cy="830997"/>
+          </a:xfrm>
+          <a:prstGeom prst="rect">
+            <a:avLst/>
+          </a:prstGeom>
+          <a:noFill/>
+        </p:spPr>
+        <p:txBody>
+          <a:bodyPr wrap="square" rtlCol="0">
+            <a:spAutoFit/>
+          </a:bodyPr>
+          <a:lstStyle/>
+          <a:p>
+            <a:r>
+              <a:rPr lang="en-US" sz="2400" dirty="0" smtClean="0"/>
+              <a:t>Local Workstations</a:t>
+            </a:r>
+            <a:endParaRPr lang="en-US" sz="2400" dirty="0"/>
+          </a:p>
+        </p:txBody>
+      </p:sp>
+      <p:sp>
+        <p:nvSpPr>
+          <p:cNvPr id="23" name="TextBox 22"/>
+          <p:cNvSpPr txBox="1"/>
+          <p:nvPr/>
+        </p:nvSpPr>
+        <p:spPr>
+          <a:xfrm>
+            <a:off x="1950070" y="5817870"/>
+            <a:ext cx="2117148" cy="461665"/>
+          </a:xfrm>
+          <a:prstGeom prst="rect">
+            <a:avLst/>
+          </a:prstGeom>
+          <a:noFill/>
+        </p:spPr>
+        <p:txBody>
+          <a:bodyPr wrap="square" rtlCol="0">
+            <a:spAutoFit/>
+          </a:bodyPr>
+          <a:lstStyle/>
+          <a:p>
+            <a:r>
+              <a:rPr lang="en-US" sz="2400" dirty="0" smtClean="0"/>
+              <a:t>- John</a:t>
+            </a:r>
+            <a:endParaRPr lang="en-US" sz="2400" dirty="0"/>
+          </a:p>
+        </p:txBody>
+      </p:sp>
+      <p:sp>
+        <p:nvSpPr>
+          <p:cNvPr id="24" name="TextBox 23"/>
+          <p:cNvSpPr txBox="1"/>
+          <p:nvPr/>
+        </p:nvSpPr>
+        <p:spPr>
+          <a:xfrm>
+            <a:off x="5656919" y="5817870"/>
+            <a:ext cx="1794510" cy="461665"/>
+          </a:xfrm>
+          <a:prstGeom prst="rect">
+            <a:avLst/>
+          </a:prstGeom>
+          <a:noFill/>
+        </p:spPr>
+        <p:txBody>
+          <a:bodyPr wrap="square" rtlCol="0">
+            <a:spAutoFit/>
+          </a:bodyPr>
+          <a:lstStyle/>
+          <a:p>
+            <a:r>
+              <a:rPr lang="en-US" sz="2400" dirty="0" smtClean="0"/>
+              <a:t>- Steve</a:t>
+            </a:r>
+            <a:endParaRPr lang="en-US" sz="2400" dirty="0"/>
+          </a:p>
+        </p:txBody>
+      </p:sp>
+      <p:sp>
+        <p:nvSpPr>
+          <p:cNvPr id="25" name="TextBox 24"/>
+          <p:cNvSpPr txBox="1"/>
+          <p:nvPr/>
+        </p:nvSpPr>
+        <p:spPr>
+          <a:xfrm>
+            <a:off x="9235440" y="5817870"/>
+            <a:ext cx="1783080" cy="461665"/>
+          </a:xfrm>
+          <a:prstGeom prst="rect">
+            <a:avLst/>
+          </a:prstGeom>
+          <a:noFill/>
+        </p:spPr>
+        <p:txBody>
+          <a:bodyPr wrap="square" rtlCol="0">
+            <a:spAutoFit/>
+          </a:bodyPr>
+          <a:lstStyle/>
+          <a:p>
+            <a:r>
+              <a:rPr lang="en-US" sz="2400" dirty="0" smtClean="0"/>
+              <a:t>- Sally</a:t>
+            </a:r>
+            <a:endParaRPr lang="en-US" sz="2400" dirty="0"/>
+          </a:p>
+        </p:txBody>
+      </p:sp>
+      <p:pic>
+        <p:nvPicPr>
+          <p:cNvPr id="26" name="Picture 25"/>
+          <p:cNvPicPr>
+            <a:picLocks noChangeAspect="1"/>
+          </p:cNvPicPr>
+          <p:nvPr/>
+        </p:nvPicPr>
+        <p:blipFill>
+          <a:blip r:embed="rId2"/>
+          <a:stretch>
+            <a:fillRect/>
+          </a:stretch>
+        </p:blipFill>
+        <p:spPr>
+          <a:xfrm>
+            <a:off x="1515731" y="4156955"/>
+            <a:ext cx="1822439" cy="1822439"/>
+          </a:xfrm>
+          <a:prstGeom prst="rect">
+            <a:avLst/>
+          </a:prstGeom>
+        </p:spPr>
+      </p:pic>
+      <p:pic>
+        <p:nvPicPr>
+          <p:cNvPr id="27" name="Picture 26"/>
+          <p:cNvPicPr>
+            <a:picLocks noChangeAspect="1"/>
+          </p:cNvPicPr>
+          <p:nvPr/>
+        </p:nvPicPr>
+        <p:blipFill>
+          <a:blip r:embed="rId2"/>
+          <a:stretch>
+            <a:fillRect/>
+          </a:stretch>
+        </p:blipFill>
+        <p:spPr>
+          <a:xfrm>
+            <a:off x="5109101" y="4233041"/>
+            <a:ext cx="1822439" cy="1822439"/>
+          </a:xfrm>
+          <a:prstGeom prst="rect">
+            <a:avLst/>
+          </a:prstGeom>
+        </p:spPr>
+      </p:pic>
+      <p:pic>
+        <p:nvPicPr>
+          <p:cNvPr id="28" name="Picture 27"/>
+          <p:cNvPicPr>
+            <a:picLocks noChangeAspect="1"/>
+          </p:cNvPicPr>
+          <p:nvPr/>
+        </p:nvPicPr>
+        <p:blipFill>
+          <a:blip r:embed="rId2"/>
+          <a:stretch>
+            <a:fillRect/>
+          </a:stretch>
+        </p:blipFill>
+        <p:spPr>
+          <a:xfrm>
+            <a:off x="8778552" y="4233041"/>
+            <a:ext cx="1822439" cy="1822439"/>
+          </a:xfrm>
+          <a:prstGeom prst="rect">
+            <a:avLst/>
+          </a:prstGeom>
+        </p:spPr>
+      </p:pic>
+      <p:pic>
+        <p:nvPicPr>
+          <p:cNvPr id="29" name="Picture 28"/>
+          <p:cNvPicPr>
+            <a:picLocks noChangeAspect="1"/>
+          </p:cNvPicPr>
+          <p:nvPr/>
+        </p:nvPicPr>
+        <p:blipFill>
+          <a:blip r:embed="rId2"/>
+          <a:stretch>
+            <a:fillRect/>
+          </a:stretch>
+        </p:blipFill>
+        <p:spPr>
+          <a:xfrm>
+            <a:off x="8778552" y="4227188"/>
+            <a:ext cx="1822439" cy="1822439"/>
+          </a:xfrm>
+          <a:prstGeom prst="rect">
+            <a:avLst/>
+          </a:prstGeom>
+        </p:spPr>
+      </p:pic>
     </p:spTree>
     <p:extLst>
       <p:ext uri="{BB962C8B-B14F-4D97-AF65-F5344CB8AC3E}">
@@ -6957,7 +8648,807 @@
   <p:timing>
     <p:tnLst>
       <p:par>
-        <p:cTn id="1" dur="indefinite" restart="never" nodeType="tmRoot"/>
+        <p:cTn xmlns:p14="http://schemas.microsoft.com/office/powerpoint/2010/main" id="1" dur="indefinite" restart="never" nodeType="tmRoot">
+          <p:childTnLst>
+            <p:seq concurrent="1" nextAc="seek">
+              <p:cTn id="2" dur="indefinite" nodeType="mainSeq">
+                <p:childTnLst>
+                  <p:par>
+                    <p:cTn id="3" fill="hold">
+                      <p:stCondLst>
+                        <p:cond delay="indefinite"/>
+                      </p:stCondLst>
+                      <p:childTnLst>
+                        <p:par>
+                          <p:cTn id="4" fill="hold">
+                            <p:stCondLst>
+                              <p:cond delay="0"/>
+                            </p:stCondLst>
+                            <p:childTnLst>
+                              <p:par>
+                                <p:cTn id="5" presetID="53" presetClass="exit" presetSubtype="32" fill="hold" nodeType="clickEffect">
+                                  <p:stCondLst>
+                                    <p:cond delay="0"/>
+                                  </p:stCondLst>
+                                  <p:childTnLst>
+                                    <p:anim calcmode="lin" valueType="num">
+                                      <p:cBhvr>
+                                        <p:cTn id="6" dur="500"/>
+                                        <p:tgtEl>
+                                          <p:spTgt spid="19"/>
+                                        </p:tgtEl>
+                                        <p:attrNameLst>
+                                          <p:attrName>ppt_w</p:attrName>
+                                        </p:attrNameLst>
+                                      </p:cBhvr>
+                                      <p:tavLst>
+                                        <p:tav tm="0">
+                                          <p:val>
+                                            <p:strVal val="ppt_w"/>
+                                          </p:val>
+                                        </p:tav>
+                                        <p:tav tm="100000">
+                                          <p:val>
+                                            <p:fltVal val="0"/>
+                                          </p:val>
+                                        </p:tav>
+                                      </p:tavLst>
+                                    </p:anim>
+                                    <p:anim calcmode="lin" valueType="num">
+                                      <p:cBhvr>
+                                        <p:cTn id="7" dur="500"/>
+                                        <p:tgtEl>
+                                          <p:spTgt spid="19"/>
+                                        </p:tgtEl>
+                                        <p:attrNameLst>
+                                          <p:attrName>ppt_h</p:attrName>
+                                        </p:attrNameLst>
+                                      </p:cBhvr>
+                                      <p:tavLst>
+                                        <p:tav tm="0">
+                                          <p:val>
+                                            <p:strVal val="ppt_h"/>
+                                          </p:val>
+                                        </p:tav>
+                                        <p:tav tm="100000">
+                                          <p:val>
+                                            <p:fltVal val="0"/>
+                                          </p:val>
+                                        </p:tav>
+                                      </p:tavLst>
+                                    </p:anim>
+                                    <p:animEffect transition="out" filter="fade">
+                                      <p:cBhvr>
+                                        <p:cTn id="8" dur="500"/>
+                                        <p:tgtEl>
+                                          <p:spTgt spid="19"/>
+                                        </p:tgtEl>
+                                      </p:cBhvr>
+                                    </p:animEffect>
+                                    <p:set>
+                                      <p:cBhvr>
+                                        <p:cTn id="9" dur="1" fill="hold">
+                                          <p:stCondLst>
+                                            <p:cond delay="499"/>
+                                          </p:stCondLst>
+                                        </p:cTn>
+                                        <p:tgtEl>
+                                          <p:spTgt spid="19"/>
+                                        </p:tgtEl>
+                                        <p:attrNameLst>
+                                          <p:attrName>style.visibility</p:attrName>
+                                        </p:attrNameLst>
+                                      </p:cBhvr>
+                                      <p:to>
+                                        <p:strVal val="hidden"/>
+                                      </p:to>
+                                    </p:set>
+                                  </p:childTnLst>
+                                </p:cTn>
+                              </p:par>
+                              <p:par>
+                                <p:cTn id="10" presetID="53" presetClass="exit" presetSubtype="32" fill="hold" nodeType="withEffect">
+                                  <p:stCondLst>
+                                    <p:cond delay="0"/>
+                                  </p:stCondLst>
+                                  <p:childTnLst>
+                                    <p:anim calcmode="lin" valueType="num">
+                                      <p:cBhvr>
+                                        <p:cTn id="11" dur="500"/>
+                                        <p:tgtEl>
+                                          <p:spTgt spid="16"/>
+                                        </p:tgtEl>
+                                        <p:attrNameLst>
+                                          <p:attrName>ppt_w</p:attrName>
+                                        </p:attrNameLst>
+                                      </p:cBhvr>
+                                      <p:tavLst>
+                                        <p:tav tm="0">
+                                          <p:val>
+                                            <p:strVal val="ppt_w"/>
+                                          </p:val>
+                                        </p:tav>
+                                        <p:tav tm="100000">
+                                          <p:val>
+                                            <p:fltVal val="0"/>
+                                          </p:val>
+                                        </p:tav>
+                                      </p:tavLst>
+                                    </p:anim>
+                                    <p:anim calcmode="lin" valueType="num">
+                                      <p:cBhvr>
+                                        <p:cTn id="12" dur="500"/>
+                                        <p:tgtEl>
+                                          <p:spTgt spid="16"/>
+                                        </p:tgtEl>
+                                        <p:attrNameLst>
+                                          <p:attrName>ppt_h</p:attrName>
+                                        </p:attrNameLst>
+                                      </p:cBhvr>
+                                      <p:tavLst>
+                                        <p:tav tm="0">
+                                          <p:val>
+                                            <p:strVal val="ppt_h"/>
+                                          </p:val>
+                                        </p:tav>
+                                        <p:tav tm="100000">
+                                          <p:val>
+                                            <p:fltVal val="0"/>
+                                          </p:val>
+                                        </p:tav>
+                                      </p:tavLst>
+                                    </p:anim>
+                                    <p:animEffect transition="out" filter="fade">
+                                      <p:cBhvr>
+                                        <p:cTn id="13" dur="500"/>
+                                        <p:tgtEl>
+                                          <p:spTgt spid="16"/>
+                                        </p:tgtEl>
+                                      </p:cBhvr>
+                                    </p:animEffect>
+                                    <p:set>
+                                      <p:cBhvr>
+                                        <p:cTn id="14" dur="1" fill="hold">
+                                          <p:stCondLst>
+                                            <p:cond delay="499"/>
+                                          </p:stCondLst>
+                                        </p:cTn>
+                                        <p:tgtEl>
+                                          <p:spTgt spid="16"/>
+                                        </p:tgtEl>
+                                        <p:attrNameLst>
+                                          <p:attrName>style.visibility</p:attrName>
+                                        </p:attrNameLst>
+                                      </p:cBhvr>
+                                      <p:to>
+                                        <p:strVal val="hidden"/>
+                                      </p:to>
+                                    </p:set>
+                                  </p:childTnLst>
+                                </p:cTn>
+                              </p:par>
+                              <p:par>
+                                <p:cTn id="15" presetID="53" presetClass="exit" presetSubtype="32" fill="hold" nodeType="withEffect">
+                                  <p:stCondLst>
+                                    <p:cond delay="0"/>
+                                  </p:stCondLst>
+                                  <p:childTnLst>
+                                    <p:anim calcmode="lin" valueType="num">
+                                      <p:cBhvr>
+                                        <p:cTn id="16" dur="500"/>
+                                        <p:tgtEl>
+                                          <p:spTgt spid="18"/>
+                                        </p:tgtEl>
+                                        <p:attrNameLst>
+                                          <p:attrName>ppt_w</p:attrName>
+                                        </p:attrNameLst>
+                                      </p:cBhvr>
+                                      <p:tavLst>
+                                        <p:tav tm="0">
+                                          <p:val>
+                                            <p:strVal val="ppt_w"/>
+                                          </p:val>
+                                        </p:tav>
+                                        <p:tav tm="100000">
+                                          <p:val>
+                                            <p:fltVal val="0"/>
+                                          </p:val>
+                                        </p:tav>
+                                      </p:tavLst>
+                                    </p:anim>
+                                    <p:anim calcmode="lin" valueType="num">
+                                      <p:cBhvr>
+                                        <p:cTn id="17" dur="500"/>
+                                        <p:tgtEl>
+                                          <p:spTgt spid="18"/>
+                                        </p:tgtEl>
+                                        <p:attrNameLst>
+                                          <p:attrName>ppt_h</p:attrName>
+                                        </p:attrNameLst>
+                                      </p:cBhvr>
+                                      <p:tavLst>
+                                        <p:tav tm="0">
+                                          <p:val>
+                                            <p:strVal val="ppt_h"/>
+                                          </p:val>
+                                        </p:tav>
+                                        <p:tav tm="100000">
+                                          <p:val>
+                                            <p:fltVal val="0"/>
+                                          </p:val>
+                                        </p:tav>
+                                      </p:tavLst>
+                                    </p:anim>
+                                    <p:animEffect transition="out" filter="fade">
+                                      <p:cBhvr>
+                                        <p:cTn id="18" dur="500"/>
+                                        <p:tgtEl>
+                                          <p:spTgt spid="18"/>
+                                        </p:tgtEl>
+                                      </p:cBhvr>
+                                    </p:animEffect>
+                                    <p:set>
+                                      <p:cBhvr>
+                                        <p:cTn id="19" dur="1" fill="hold">
+                                          <p:stCondLst>
+                                            <p:cond delay="499"/>
+                                          </p:stCondLst>
+                                        </p:cTn>
+                                        <p:tgtEl>
+                                          <p:spTgt spid="18"/>
+                                        </p:tgtEl>
+                                        <p:attrNameLst>
+                                          <p:attrName>style.visibility</p:attrName>
+                                        </p:attrNameLst>
+                                      </p:cBhvr>
+                                      <p:to>
+                                        <p:strVal val="hidden"/>
+                                      </p:to>
+                                    </p:set>
+                                  </p:childTnLst>
+                                </p:cTn>
+                              </p:par>
+                              <p:par>
+                                <p:cTn id="20" presetID="53" presetClass="exit" presetSubtype="32" fill="hold" nodeType="withEffect">
+                                  <p:stCondLst>
+                                    <p:cond delay="0"/>
+                                  </p:stCondLst>
+                                  <p:childTnLst>
+                                    <p:anim calcmode="lin" valueType="num">
+                                      <p:cBhvr>
+                                        <p:cTn id="21" dur="500"/>
+                                        <p:tgtEl>
+                                          <p:spTgt spid="15"/>
+                                        </p:tgtEl>
+                                        <p:attrNameLst>
+                                          <p:attrName>ppt_w</p:attrName>
+                                        </p:attrNameLst>
+                                      </p:cBhvr>
+                                      <p:tavLst>
+                                        <p:tav tm="0">
+                                          <p:val>
+                                            <p:strVal val="ppt_w"/>
+                                          </p:val>
+                                        </p:tav>
+                                        <p:tav tm="100000">
+                                          <p:val>
+                                            <p:fltVal val="0"/>
+                                          </p:val>
+                                        </p:tav>
+                                      </p:tavLst>
+                                    </p:anim>
+                                    <p:anim calcmode="lin" valueType="num">
+                                      <p:cBhvr>
+                                        <p:cTn id="22" dur="500"/>
+                                        <p:tgtEl>
+                                          <p:spTgt spid="15"/>
+                                        </p:tgtEl>
+                                        <p:attrNameLst>
+                                          <p:attrName>ppt_h</p:attrName>
+                                        </p:attrNameLst>
+                                      </p:cBhvr>
+                                      <p:tavLst>
+                                        <p:tav tm="0">
+                                          <p:val>
+                                            <p:strVal val="ppt_h"/>
+                                          </p:val>
+                                        </p:tav>
+                                        <p:tav tm="100000">
+                                          <p:val>
+                                            <p:fltVal val="0"/>
+                                          </p:val>
+                                        </p:tav>
+                                      </p:tavLst>
+                                    </p:anim>
+                                    <p:animEffect transition="out" filter="fade">
+                                      <p:cBhvr>
+                                        <p:cTn id="23" dur="500"/>
+                                        <p:tgtEl>
+                                          <p:spTgt spid="15"/>
+                                        </p:tgtEl>
+                                      </p:cBhvr>
+                                    </p:animEffect>
+                                    <p:set>
+                                      <p:cBhvr>
+                                        <p:cTn id="24" dur="1" fill="hold">
+                                          <p:stCondLst>
+                                            <p:cond delay="499"/>
+                                          </p:stCondLst>
+                                        </p:cTn>
+                                        <p:tgtEl>
+                                          <p:spTgt spid="15"/>
+                                        </p:tgtEl>
+                                        <p:attrNameLst>
+                                          <p:attrName>style.visibility</p:attrName>
+                                        </p:attrNameLst>
+                                      </p:cBhvr>
+                                      <p:to>
+                                        <p:strVal val="hidden"/>
+                                      </p:to>
+                                    </p:set>
+                                  </p:childTnLst>
+                                </p:cTn>
+                              </p:par>
+                              <p:par>
+                                <p:cTn id="25" presetID="53" presetClass="exit" presetSubtype="32" fill="hold" nodeType="withEffect">
+                                  <p:stCondLst>
+                                    <p:cond delay="0"/>
+                                  </p:stCondLst>
+                                  <p:childTnLst>
+                                    <p:anim calcmode="lin" valueType="num">
+                                      <p:cBhvr>
+                                        <p:cTn id="26" dur="500"/>
+                                        <p:tgtEl>
+                                          <p:spTgt spid="14"/>
+                                        </p:tgtEl>
+                                        <p:attrNameLst>
+                                          <p:attrName>ppt_w</p:attrName>
+                                        </p:attrNameLst>
+                                      </p:cBhvr>
+                                      <p:tavLst>
+                                        <p:tav tm="0">
+                                          <p:val>
+                                            <p:strVal val="ppt_w"/>
+                                          </p:val>
+                                        </p:tav>
+                                        <p:tav tm="100000">
+                                          <p:val>
+                                            <p:fltVal val="0"/>
+                                          </p:val>
+                                        </p:tav>
+                                      </p:tavLst>
+                                    </p:anim>
+                                    <p:anim calcmode="lin" valueType="num">
+                                      <p:cBhvr>
+                                        <p:cTn id="27" dur="500"/>
+                                        <p:tgtEl>
+                                          <p:spTgt spid="14"/>
+                                        </p:tgtEl>
+                                        <p:attrNameLst>
+                                          <p:attrName>ppt_h</p:attrName>
+                                        </p:attrNameLst>
+                                      </p:cBhvr>
+                                      <p:tavLst>
+                                        <p:tav tm="0">
+                                          <p:val>
+                                            <p:strVal val="ppt_h"/>
+                                          </p:val>
+                                        </p:tav>
+                                        <p:tav tm="100000">
+                                          <p:val>
+                                            <p:fltVal val="0"/>
+                                          </p:val>
+                                        </p:tav>
+                                      </p:tavLst>
+                                    </p:anim>
+                                    <p:animEffect transition="out" filter="fade">
+                                      <p:cBhvr>
+                                        <p:cTn id="28" dur="500"/>
+                                        <p:tgtEl>
+                                          <p:spTgt spid="14"/>
+                                        </p:tgtEl>
+                                      </p:cBhvr>
+                                    </p:animEffect>
+                                    <p:set>
+                                      <p:cBhvr>
+                                        <p:cTn id="29" dur="1" fill="hold">
+                                          <p:stCondLst>
+                                            <p:cond delay="499"/>
+                                          </p:stCondLst>
+                                        </p:cTn>
+                                        <p:tgtEl>
+                                          <p:spTgt spid="14"/>
+                                        </p:tgtEl>
+                                        <p:attrNameLst>
+                                          <p:attrName>style.visibility</p:attrName>
+                                        </p:attrNameLst>
+                                      </p:cBhvr>
+                                      <p:to>
+                                        <p:strVal val="hidden"/>
+                                      </p:to>
+                                    </p:set>
+                                  </p:childTnLst>
+                                </p:cTn>
+                              </p:par>
+                              <p:par>
+                                <p:cTn id="30" presetID="53" presetClass="exit" presetSubtype="32" fill="hold" nodeType="withEffect">
+                                  <p:stCondLst>
+                                    <p:cond delay="0"/>
+                                  </p:stCondLst>
+                                  <p:childTnLst>
+                                    <p:anim calcmode="lin" valueType="num">
+                                      <p:cBhvr>
+                                        <p:cTn id="31" dur="500"/>
+                                        <p:tgtEl>
+                                          <p:spTgt spid="17"/>
+                                        </p:tgtEl>
+                                        <p:attrNameLst>
+                                          <p:attrName>ppt_w</p:attrName>
+                                        </p:attrNameLst>
+                                      </p:cBhvr>
+                                      <p:tavLst>
+                                        <p:tav tm="0">
+                                          <p:val>
+                                            <p:strVal val="ppt_w"/>
+                                          </p:val>
+                                        </p:tav>
+                                        <p:tav tm="100000">
+                                          <p:val>
+                                            <p:fltVal val="0"/>
+                                          </p:val>
+                                        </p:tav>
+                                      </p:tavLst>
+                                    </p:anim>
+                                    <p:anim calcmode="lin" valueType="num">
+                                      <p:cBhvr>
+                                        <p:cTn id="32" dur="500"/>
+                                        <p:tgtEl>
+                                          <p:spTgt spid="17"/>
+                                        </p:tgtEl>
+                                        <p:attrNameLst>
+                                          <p:attrName>ppt_h</p:attrName>
+                                        </p:attrNameLst>
+                                      </p:cBhvr>
+                                      <p:tavLst>
+                                        <p:tav tm="0">
+                                          <p:val>
+                                            <p:strVal val="ppt_h"/>
+                                          </p:val>
+                                        </p:tav>
+                                        <p:tav tm="100000">
+                                          <p:val>
+                                            <p:fltVal val="0"/>
+                                          </p:val>
+                                        </p:tav>
+                                      </p:tavLst>
+                                    </p:anim>
+                                    <p:animEffect transition="out" filter="fade">
+                                      <p:cBhvr>
+                                        <p:cTn id="33" dur="500"/>
+                                        <p:tgtEl>
+                                          <p:spTgt spid="17"/>
+                                        </p:tgtEl>
+                                      </p:cBhvr>
+                                    </p:animEffect>
+                                    <p:set>
+                                      <p:cBhvr>
+                                        <p:cTn id="34" dur="1" fill="hold">
+                                          <p:stCondLst>
+                                            <p:cond delay="499"/>
+                                          </p:stCondLst>
+                                        </p:cTn>
+                                        <p:tgtEl>
+                                          <p:spTgt spid="17"/>
+                                        </p:tgtEl>
+                                        <p:attrNameLst>
+                                          <p:attrName>style.visibility</p:attrName>
+                                        </p:attrNameLst>
+                                      </p:cBhvr>
+                                      <p:to>
+                                        <p:strVal val="hidden"/>
+                                      </p:to>
+                                    </p:set>
+                                  </p:childTnLst>
+                                </p:cTn>
+                              </p:par>
+                            </p:childTnLst>
+                          </p:cTn>
+                        </p:par>
+                      </p:childTnLst>
+                    </p:cTn>
+                  </p:par>
+                  <p:par>
+                    <p:cTn id="35" fill="hold">
+                      <p:stCondLst>
+                        <p:cond delay="indefinite"/>
+                      </p:stCondLst>
+                      <p:childTnLst>
+                        <p:par>
+                          <p:cTn id="36" fill="hold">
+                            <p:stCondLst>
+                              <p:cond delay="0"/>
+                            </p:stCondLst>
+                            <p:childTnLst>
+                              <p:par>
+                                <p:cTn id="37" presetID="1" presetClass="entr" presetSubtype="0" fill="hold" nodeType="clickEffect">
+                                  <p:stCondLst>
+                                    <p:cond delay="0"/>
+                                  </p:stCondLst>
+                                  <p:childTnLst>
+                                    <p:set>
+                                      <p:cBhvr>
+                                        <p:cTn id="38" dur="1" fill="hold">
+                                          <p:stCondLst>
+                                            <p:cond delay="0"/>
+                                          </p:stCondLst>
+                                        </p:cTn>
+                                        <p:tgtEl>
+                                          <p:spTgt spid="19"/>
+                                        </p:tgtEl>
+                                        <p:attrNameLst>
+                                          <p:attrName>style.visibility</p:attrName>
+                                        </p:attrNameLst>
+                                      </p:cBhvr>
+                                      <p:to>
+                                        <p:strVal val="visible"/>
+                                      </p:to>
+                                    </p:set>
+                                  </p:childTnLst>
+                                </p:cTn>
+                              </p:par>
+                              <p:par>
+                                <p:cTn id="39" presetID="1" presetClass="entr" presetSubtype="0" fill="hold" nodeType="withEffect">
+                                  <p:stCondLst>
+                                    <p:cond delay="0"/>
+                                  </p:stCondLst>
+                                  <p:childTnLst>
+                                    <p:set>
+                                      <p:cBhvr>
+                                        <p:cTn id="40" dur="1" fill="hold">
+                                          <p:stCondLst>
+                                            <p:cond delay="0"/>
+                                          </p:stCondLst>
+                                        </p:cTn>
+                                        <p:tgtEl>
+                                          <p:spTgt spid="16"/>
+                                        </p:tgtEl>
+                                        <p:attrNameLst>
+                                          <p:attrName>style.visibility</p:attrName>
+                                        </p:attrNameLst>
+                                      </p:cBhvr>
+                                      <p:to>
+                                        <p:strVal val="visible"/>
+                                      </p:to>
+                                    </p:set>
+                                  </p:childTnLst>
+                                </p:cTn>
+                              </p:par>
+                              <p:par>
+                                <p:cTn id="41" presetID="1" presetClass="entr" presetSubtype="0" fill="hold" nodeType="withEffect">
+                                  <p:stCondLst>
+                                    <p:cond delay="0"/>
+                                  </p:stCondLst>
+                                  <p:childTnLst>
+                                    <p:set>
+                                      <p:cBhvr>
+                                        <p:cTn id="42" dur="1" fill="hold">
+                                          <p:stCondLst>
+                                            <p:cond delay="0"/>
+                                          </p:stCondLst>
+                                        </p:cTn>
+                                        <p:tgtEl>
+                                          <p:spTgt spid="15"/>
+                                        </p:tgtEl>
+                                        <p:attrNameLst>
+                                          <p:attrName>style.visibility</p:attrName>
+                                        </p:attrNameLst>
+                                      </p:cBhvr>
+                                      <p:to>
+                                        <p:strVal val="visible"/>
+                                      </p:to>
+                                    </p:set>
+                                  </p:childTnLst>
+                                </p:cTn>
+                              </p:par>
+                              <p:par>
+                                <p:cTn id="43" presetID="1" presetClass="entr" presetSubtype="0" fill="hold" nodeType="withEffect">
+                                  <p:stCondLst>
+                                    <p:cond delay="0"/>
+                                  </p:stCondLst>
+                                  <p:childTnLst>
+                                    <p:set>
+                                      <p:cBhvr>
+                                        <p:cTn id="44" dur="1" fill="hold">
+                                          <p:stCondLst>
+                                            <p:cond delay="0"/>
+                                          </p:stCondLst>
+                                        </p:cTn>
+                                        <p:tgtEl>
+                                          <p:spTgt spid="18"/>
+                                        </p:tgtEl>
+                                        <p:attrNameLst>
+                                          <p:attrName>style.visibility</p:attrName>
+                                        </p:attrNameLst>
+                                      </p:cBhvr>
+                                      <p:to>
+                                        <p:strVal val="visible"/>
+                                      </p:to>
+                                    </p:set>
+                                  </p:childTnLst>
+                                </p:cTn>
+                              </p:par>
+                              <p:par>
+                                <p:cTn id="45" presetID="1" presetClass="entr" presetSubtype="0" fill="hold" nodeType="withEffect">
+                                  <p:stCondLst>
+                                    <p:cond delay="0"/>
+                                  </p:stCondLst>
+                                  <p:childTnLst>
+                                    <p:set>
+                                      <p:cBhvr>
+                                        <p:cTn id="46" dur="1" fill="hold">
+                                          <p:stCondLst>
+                                            <p:cond delay="0"/>
+                                          </p:stCondLst>
+                                        </p:cTn>
+                                        <p:tgtEl>
+                                          <p:spTgt spid="17"/>
+                                        </p:tgtEl>
+                                        <p:attrNameLst>
+                                          <p:attrName>style.visibility</p:attrName>
+                                        </p:attrNameLst>
+                                      </p:cBhvr>
+                                      <p:to>
+                                        <p:strVal val="visible"/>
+                                      </p:to>
+                                    </p:set>
+                                  </p:childTnLst>
+                                </p:cTn>
+                              </p:par>
+                              <p:par>
+                                <p:cTn id="47" presetID="1" presetClass="entr" presetSubtype="0" fill="hold" nodeType="withEffect">
+                                  <p:stCondLst>
+                                    <p:cond delay="0"/>
+                                  </p:stCondLst>
+                                  <p:childTnLst>
+                                    <p:set>
+                                      <p:cBhvr>
+                                        <p:cTn id="48" dur="1" fill="hold">
+                                          <p:stCondLst>
+                                            <p:cond delay="0"/>
+                                          </p:stCondLst>
+                                        </p:cTn>
+                                        <p:tgtEl>
+                                          <p:spTgt spid="14"/>
+                                        </p:tgtEl>
+                                        <p:attrNameLst>
+                                          <p:attrName>style.visibility</p:attrName>
+                                        </p:attrNameLst>
+                                      </p:cBhvr>
+                                      <p:to>
+                                        <p:strVal val="visible"/>
+                                      </p:to>
+                                    </p:set>
+                                  </p:childTnLst>
+                                </p:cTn>
+                              </p:par>
+                            </p:childTnLst>
+                          </p:cTn>
+                        </p:par>
+                      </p:childTnLst>
+                    </p:cTn>
+                  </p:par>
+                  <p:par>
+                    <p:cTn id="49" fill="hold">
+                      <p:stCondLst>
+                        <p:cond delay="indefinite"/>
+                      </p:stCondLst>
+                      <p:childTnLst>
+                        <p:par>
+                          <p:cTn id="50" fill="hold">
+                            <p:stCondLst>
+                              <p:cond delay="0"/>
+                            </p:stCondLst>
+                            <p:childTnLst>
+                              <p:par>
+                                <p:cTn id="51" presetID="6" presetClass="exit" presetSubtype="32" fill="hold" nodeType="clickEffect">
+                                  <p:stCondLst>
+                                    <p:cond delay="0"/>
+                                  </p:stCondLst>
+                                  <p:childTnLst>
+                                    <p:animEffect transition="out" filter="circle(out)">
+                                      <p:cBhvr>
+                                        <p:cTn id="52" dur="500"/>
+                                        <p:tgtEl>
+                                          <p:spTgt spid="5"/>
+                                        </p:tgtEl>
+                                      </p:cBhvr>
+                                    </p:animEffect>
+                                    <p:set>
+                                      <p:cBhvr>
+                                        <p:cTn id="53" dur="1" fill="hold">
+                                          <p:stCondLst>
+                                            <p:cond delay="499"/>
+                                          </p:stCondLst>
+                                        </p:cTn>
+                                        <p:tgtEl>
+                                          <p:spTgt spid="5"/>
+                                        </p:tgtEl>
+                                        <p:attrNameLst>
+                                          <p:attrName>style.visibility</p:attrName>
+                                        </p:attrNameLst>
+                                      </p:cBhvr>
+                                      <p:to>
+                                        <p:strVal val="hidden"/>
+                                      </p:to>
+                                    </p:set>
+                                  </p:childTnLst>
+                                </p:cTn>
+                              </p:par>
+                            </p:childTnLst>
+                          </p:cTn>
+                        </p:par>
+                      </p:childTnLst>
+                    </p:cTn>
+                  </p:par>
+                  <p:par>
+                    <p:cTn id="54" fill="hold">
+                      <p:stCondLst>
+                        <p:cond delay="indefinite"/>
+                      </p:stCondLst>
+                      <p:childTnLst>
+                        <p:par>
+                          <p:cTn id="55" fill="hold">
+                            <p:stCondLst>
+                              <p:cond delay="0"/>
+                            </p:stCondLst>
+                            <p:childTnLst>
+                              <p:par>
+                                <p:cTn id="56" presetID="0" presetClass="path" presetSubtype="0" accel="50000" decel="50000" fill="hold" nodeType="clickEffect">
+                                  <p:stCondLst>
+                                    <p:cond delay="0"/>
+                                  </p:stCondLst>
+                                  <p:childTnLst>
+                                    <p:animMotion origin="layout" path="M 4.83136E-6 -2.14534E-6 L -0.31489 -0.43601 " pathEditMode="relative" rAng="0" ptsTypes="AA">
+                                      <p:cBhvr>
+                                        <p:cTn id="57" dur="2000" fill="hold"/>
+                                        <p:tgtEl>
+                                          <p:spTgt spid="29"/>
+                                        </p:tgtEl>
+                                        <p:attrNameLst>
+                                          <p:attrName>ppt_x</p:attrName>
+                                          <p:attrName>ppt_y</p:attrName>
+                                        </p:attrNameLst>
+                                      </p:cBhvr>
+                                      <p:rCtr x="-15744" y="-21801"/>
+                                    </p:animMotion>
+                                  </p:childTnLst>
+                                </p:cTn>
+                              </p:par>
+                            </p:childTnLst>
+                          </p:cTn>
+                        </p:par>
+                      </p:childTnLst>
+                    </p:cTn>
+                  </p:par>
+                </p:childTnLst>
+              </p:cTn>
+              <p:prevCondLst>
+                <p:cond evt="onPrev" delay="0">
+                  <p:tgtEl>
+                    <p:sldTgt/>
+                  </p:tgtEl>
+                </p:cond>
+              </p:prevCondLst>
+              <p:nextCondLst>
+                <p:cond evt="onNext" delay="0">
+                  <p:tgtEl>
+                    <p:sldTgt/>
+                  </p:tgtEl>
+                </p:cond>
+              </p:nextCondLst>
+            </p:seq>
+          </p:childTnLst>
+        </p:cTn>
       </p:par>
     </p:tnLst>
   </p:timing>
@@ -7219,7 +9710,7 @@
   <a:extraClrSchemeLst/>
   <a:extLst>
     <a:ext uri="{05A4C25C-085E-4340-85A3-A5531E510DB2}">
-      <thm15:themeFamily xmlns:thm15="http://schemas.microsoft.com/office/thememl/2012/main" name="Office Theme" id="{62F939B6-93AF-4DB8-9C6B-D6C7DFDC589F}" vid="{4A3C46E8-61CC-4603-A589-7422A47A8E4A}"/>
+      <thm15:themeFamily xmlns:thm15="http://schemas.microsoft.com/office/thememl/2012/main" xmlns="" name="Office Theme" id="{62F939B6-93AF-4DB8-9C6B-D6C7DFDC589F}" vid="{4A3C46E8-61CC-4603-A589-7422A47A8E4A}"/>
     </a:ext>
   </a:extLst>
 </a:theme>

</xml_diff>

<commit_message>
Finished the git presentation slides
</commit_message>
<xml_diff>
--- a/git_presentation/git_presentation.pptx
+++ b/git_presentation/git_presentation.pptx
@@ -129,7 +129,7 @@
   </p:defaultTextStyle>
   <p:extLst>
     <p:ext uri="{EFAFB233-063F-42B5-8137-9DF3F51BA10A}">
-      <p15:sldGuideLst xmlns:p15="http://schemas.microsoft.com/office/powerpoint/2012/main">
+      <p15:sldGuideLst xmlns:p15="http://schemas.microsoft.com/office/powerpoint/2012/main" xmlns="">
         <p15:guide id="1" orient="horz" pos="2160">
           <p15:clr>
             <a:srgbClr val="A4A3A4"/>
@@ -228,7 +228,7 @@
           <a:p>
             <a:fld id="{7E008CDE-197E-4D9B-BFB8-197A606DC483}" type="datetimeFigureOut">
               <a:rPr lang="en-US" smtClean="0"/>
-              <a:t>10/3/2015</a:t>
+              <a:t>10/7/15</a:t>
             </a:fld>
             <a:endParaRPr lang="en-US"/>
           </a:p>
@@ -711,7 +711,7 @@
           <a:p>
             <a:fld id="{7E3245CE-4719-4FC9-B907-BD8BBC34E05C}" type="datetimeFigureOut">
               <a:rPr lang="en-US" smtClean="0"/>
-              <a:t>10/3/2015</a:t>
+              <a:t>10/7/15</a:t>
             </a:fld>
             <a:endParaRPr lang="en-US"/>
           </a:p>
@@ -881,7 +881,7 @@
           <a:p>
             <a:fld id="{7E3245CE-4719-4FC9-B907-BD8BBC34E05C}" type="datetimeFigureOut">
               <a:rPr lang="en-US" smtClean="0"/>
-              <a:t>10/3/2015</a:t>
+              <a:t>10/7/15</a:t>
             </a:fld>
             <a:endParaRPr lang="en-US"/>
           </a:p>
@@ -1061,7 +1061,7 @@
           <a:p>
             <a:fld id="{7E3245CE-4719-4FC9-B907-BD8BBC34E05C}" type="datetimeFigureOut">
               <a:rPr lang="en-US" smtClean="0"/>
-              <a:t>10/3/2015</a:t>
+              <a:t>10/7/15</a:t>
             </a:fld>
             <a:endParaRPr lang="en-US"/>
           </a:p>
@@ -1231,7 +1231,7 @@
           <a:p>
             <a:fld id="{7E3245CE-4719-4FC9-B907-BD8BBC34E05C}" type="datetimeFigureOut">
               <a:rPr lang="en-US" smtClean="0"/>
-              <a:t>10/3/2015</a:t>
+              <a:t>10/7/15</a:t>
             </a:fld>
             <a:endParaRPr lang="en-US"/>
           </a:p>
@@ -1477,7 +1477,7 @@
           <a:p>
             <a:fld id="{7E3245CE-4719-4FC9-B907-BD8BBC34E05C}" type="datetimeFigureOut">
               <a:rPr lang="en-US" smtClean="0"/>
-              <a:t>10/3/2015</a:t>
+              <a:t>10/7/15</a:t>
             </a:fld>
             <a:endParaRPr lang="en-US"/>
           </a:p>
@@ -1709,7 +1709,7 @@
           <a:p>
             <a:fld id="{7E3245CE-4719-4FC9-B907-BD8BBC34E05C}" type="datetimeFigureOut">
               <a:rPr lang="en-US" smtClean="0"/>
-              <a:t>10/3/2015</a:t>
+              <a:t>10/7/15</a:t>
             </a:fld>
             <a:endParaRPr lang="en-US"/>
           </a:p>
@@ -2076,7 +2076,7 @@
           <a:p>
             <a:fld id="{7E3245CE-4719-4FC9-B907-BD8BBC34E05C}" type="datetimeFigureOut">
               <a:rPr lang="en-US" smtClean="0"/>
-              <a:t>10/3/2015</a:t>
+              <a:t>10/7/15</a:t>
             </a:fld>
             <a:endParaRPr lang="en-US"/>
           </a:p>
@@ -2194,7 +2194,7 @@
           <a:p>
             <a:fld id="{7E3245CE-4719-4FC9-B907-BD8BBC34E05C}" type="datetimeFigureOut">
               <a:rPr lang="en-US" smtClean="0"/>
-              <a:t>10/3/2015</a:t>
+              <a:t>10/7/15</a:t>
             </a:fld>
             <a:endParaRPr lang="en-US"/>
           </a:p>
@@ -2289,7 +2289,7 @@
           <a:p>
             <a:fld id="{7E3245CE-4719-4FC9-B907-BD8BBC34E05C}" type="datetimeFigureOut">
               <a:rPr lang="en-US" smtClean="0"/>
-              <a:t>10/3/2015</a:t>
+              <a:t>10/7/15</a:t>
             </a:fld>
             <a:endParaRPr lang="en-US"/>
           </a:p>
@@ -2566,7 +2566,7 @@
           <a:p>
             <a:fld id="{7E3245CE-4719-4FC9-B907-BD8BBC34E05C}" type="datetimeFigureOut">
               <a:rPr lang="en-US" smtClean="0"/>
-              <a:t>10/3/2015</a:t>
+              <a:t>10/7/15</a:t>
             </a:fld>
             <a:endParaRPr lang="en-US"/>
           </a:p>
@@ -2819,7 +2819,7 @@
           <a:p>
             <a:fld id="{7E3245CE-4719-4FC9-B907-BD8BBC34E05C}" type="datetimeFigureOut">
               <a:rPr lang="en-US" smtClean="0"/>
-              <a:t>10/3/2015</a:t>
+              <a:t>10/7/15</a:t>
             </a:fld>
             <a:endParaRPr lang="en-US"/>
           </a:p>
@@ -2884,9 +2884,16 @@
 <p:sldMaster xmlns:a="http://schemas.openxmlformats.org/drawingml/2006/main" xmlns:r="http://schemas.openxmlformats.org/officeDocument/2006/relationships" xmlns:p="http://schemas.openxmlformats.org/presentationml/2006/main">
   <p:cSld>
     <p:bg>
-      <p:bgRef idx="1001">
-        <a:schemeClr val="bg1"/>
-      </p:bgRef>
+      <p:bgPr>
+        <a:blipFill dpi="0" rotWithShape="1">
+          <a:blip r:embed="rId13"/>
+          <a:srcRect/>
+          <a:stretch>
+            <a:fillRect/>
+          </a:stretch>
+        </a:blipFill>
+        <a:effectLst/>
+      </p:bgPr>
     </p:bg>
     <p:spTree>
       <p:nvGrpSpPr>
@@ -3032,7 +3039,7 @@
           <a:p>
             <a:fld id="{7E3245CE-4719-4FC9-B907-BD8BBC34E05C}" type="datetimeFigureOut">
               <a:rPr lang="en-US" smtClean="0"/>
-              <a:t>10/3/2015</a:t>
+              <a:t>10/7/15</a:t>
             </a:fld>
             <a:endParaRPr lang="en-US"/>
           </a:p>
@@ -3423,16 +3430,6 @@
 <file path=ppt/slides/slide1.xml><?xml version="1.0" encoding="utf-8"?>
 <p:sld xmlns:a="http://schemas.openxmlformats.org/drawingml/2006/main" xmlns:r="http://schemas.openxmlformats.org/officeDocument/2006/relationships" xmlns:p="http://schemas.openxmlformats.org/presentationml/2006/main">
   <p:cSld>
-    <p:bg>
-      <p:bgPr>
-        <a:solidFill>
-          <a:schemeClr val="bg1">
-            <a:alpha val="74000"/>
-          </a:schemeClr>
-        </a:solidFill>
-        <a:effectLst/>
-      </p:bgPr>
-    </p:bg>
     <p:spTree>
       <p:nvGrpSpPr>
         <p:cNvPr id="1" name=""/>
@@ -3531,7 +3528,7 @@
   <p:timing>
     <p:tnLst>
       <p:par>
-        <p:cTn id="1" dur="indefinite" restart="never" nodeType="tmRoot"/>
+        <p:cTn xmlns:p14="http://schemas.microsoft.com/office/powerpoint/2010/main" id="1" dur="indefinite" restart="never" nodeType="tmRoot"/>
       </p:par>
     </p:tnLst>
   </p:timing>
@@ -3674,7 +3671,7 @@
   <p:timing>
     <p:tnLst>
       <p:par>
-        <p:cTn id="1" dur="indefinite" restart="never" nodeType="tmRoot"/>
+        <p:cTn xmlns:p14="http://schemas.microsoft.com/office/powerpoint/2010/main" id="1" dur="indefinite" restart="never" nodeType="tmRoot"/>
       </p:par>
     </p:tnLst>
   </p:timing>
@@ -4231,7 +4228,7 @@
   <p:timing>
     <p:tnLst>
       <p:par>
-        <p:cTn id="1" dur="indefinite" restart="never" nodeType="tmRoot">
+        <p:cTn xmlns:p14="http://schemas.microsoft.com/office/powerpoint/2010/main" id="1" dur="indefinite" restart="never" nodeType="tmRoot">
           <p:childTnLst>
             <p:seq concurrent="1" nextAc="seek">
               <p:cTn id="2" dur="indefinite" nodeType="mainSeq">
@@ -5661,7 +5658,7 @@
   <p:timing>
     <p:tnLst>
       <p:par>
-        <p:cTn id="1" dur="indefinite" restart="never" nodeType="tmRoot">
+        <p:cTn xmlns:p14="http://schemas.microsoft.com/office/powerpoint/2010/main" id="1" dur="indefinite" restart="never" nodeType="tmRoot">
           <p:childTnLst>
             <p:seq concurrent="1" nextAc="seek">
               <p:cTn id="2" dur="indefinite" nodeType="mainSeq">
@@ -6540,11 +6537,7 @@
             </a:r>
             <a:r>
               <a:rPr lang="en-US" sz="2400" dirty="0" smtClean="0"/>
-              <a:t> </a:t>
-            </a:r>
-            <a:r>
-              <a:rPr lang="en-US" sz="2400" dirty="0" smtClean="0"/>
-              <a:t>clone &lt;remote location&gt; (&lt;new location&gt;) </a:t>
+              <a:t> clone &lt;remote location&gt; (&lt;new location&gt;) </a:t>
             </a:r>
             <a:endParaRPr lang="en-US" sz="2400" dirty="0"/>
           </a:p>
@@ -6719,7 +6712,7 @@
   <p:timing>
     <p:tnLst>
       <p:par>
-        <p:cTn id="1" dur="indefinite" restart="never" nodeType="tmRoot">
+        <p:cTn xmlns:p14="http://schemas.microsoft.com/office/powerpoint/2010/main" id="1" dur="indefinite" restart="never" nodeType="tmRoot">
           <p:childTnLst>
             <p:seq concurrent="1" nextAc="seek">
               <p:cTn id="2" dur="indefinite" nodeType="mainSeq">
@@ -6930,11 +6923,7 @@
             </a:r>
             <a:r>
               <a:rPr lang="en-US" dirty="0" smtClean="0"/>
-              <a:t> </a:t>
-            </a:r>
-            <a:r>
-              <a:rPr lang="en-US" dirty="0" smtClean="0"/>
-              <a:t>push</a:t>
+              <a:t> push</a:t>
             </a:r>
           </a:p>
           <a:p>
@@ -7199,11 +7188,7 @@
             </a:r>
             <a:r>
               <a:rPr lang="en-US" dirty="0" smtClean="0"/>
-              <a:t> </a:t>
-            </a:r>
-            <a:r>
-              <a:rPr lang="en-US" dirty="0" smtClean="0"/>
-              <a:t>pull</a:t>
+              <a:t> pull</a:t>
             </a:r>
           </a:p>
           <a:p>
@@ -7218,7 +7203,9 @@
       <p:sp>
         <p:nvSpPr>
           <p:cNvPr id="8" name="Rectangle 7"/>
-          <p:cNvSpPr/>
+          <p:cNvSpPr>
+            <a:spLocks noChangeAspect="1"/>
+          </p:cNvSpPr>
           <p:nvPr/>
         </p:nvSpPr>
         <p:spPr>
@@ -7346,7 +7333,9 @@
       <p:sp>
         <p:nvSpPr>
           <p:cNvPr id="11" name="TextBox 10"/>
-          <p:cNvSpPr txBox="1"/>
+          <p:cNvSpPr txBox="1">
+            <a:spLocks noChangeAspect="1"/>
+          </p:cNvSpPr>
           <p:nvPr/>
         </p:nvSpPr>
         <p:spPr>
@@ -7376,7 +7365,9 @@
       <p:sp>
         <p:nvSpPr>
           <p:cNvPr id="12" name="TextBox 11"/>
-          <p:cNvSpPr txBox="1"/>
+          <p:cNvSpPr txBox="1">
+            <a:spLocks noChangeAspect="1"/>
+          </p:cNvSpPr>
           <p:nvPr/>
         </p:nvSpPr>
         <p:spPr>
@@ -7406,7 +7397,9 @@
       <p:cxnSp>
         <p:nvCxnSpPr>
           <p:cNvPr id="13" name="Straight Arrow Connector 12"/>
-          <p:cNvCxnSpPr/>
+          <p:cNvCxnSpPr>
+            <a:cxnSpLocks noChangeAspect="1"/>
+          </p:cNvCxnSpPr>
           <p:nvPr/>
         </p:nvCxnSpPr>
         <p:spPr>
@@ -7439,7 +7432,9 @@
       <p:cxnSp>
         <p:nvCxnSpPr>
           <p:cNvPr id="14" name="Straight Arrow Connector 13"/>
-          <p:cNvCxnSpPr/>
+          <p:cNvCxnSpPr>
+            <a:cxnSpLocks noChangeAspect="1"/>
+          </p:cNvCxnSpPr>
           <p:nvPr/>
         </p:nvCxnSpPr>
         <p:spPr>
@@ -7482,7 +7477,7 @@
   <p:timing>
     <p:tnLst>
       <p:par>
-        <p:cTn id="1" dur="indefinite" restart="never" nodeType="tmRoot"/>
+        <p:cTn xmlns:p14="http://schemas.microsoft.com/office/powerpoint/2010/main" id="1" dur="indefinite" restart="never" nodeType="tmRoot"/>
       </p:par>
     </p:tnLst>
   </p:timing>
@@ -8021,7 +8016,7 @@
   <p:timing>
     <p:tnLst>
       <p:par>
-        <p:cTn id="1" dur="indefinite" restart="never" nodeType="tmRoot"/>
+        <p:cTn xmlns:p14="http://schemas.microsoft.com/office/powerpoint/2010/main" id="1" dur="indefinite" restart="never" nodeType="tmRoot"/>
       </p:par>
     </p:tnLst>
   </p:timing>
@@ -8284,7 +8279,7 @@
   <p:timing>
     <p:tnLst>
       <p:par>
-        <p:cTn id="1" dur="indefinite" restart="never" nodeType="tmRoot"/>
+        <p:cTn xmlns:p14="http://schemas.microsoft.com/office/powerpoint/2010/main" id="1" dur="indefinite" restart="never" nodeType="tmRoot"/>
       </p:par>
     </p:tnLst>
   </p:timing>
@@ -8320,8 +8315,8 @@
         </p:nvSpPr>
         <p:spPr>
           <a:xfrm>
-            <a:off x="838200" y="365125"/>
-            <a:ext cx="10515600" cy="1079211"/>
+            <a:off x="1376620" y="751609"/>
+            <a:ext cx="2047030" cy="1079211"/>
           </a:xfrm>
         </p:spPr>
         <p:txBody>
@@ -8334,11 +8329,7 @@
             </a:r>
             <a:r>
               <a:rPr lang="en-US" dirty="0" smtClean="0"/>
-              <a:t> </a:t>
-            </a:r>
-            <a:r>
-              <a:rPr lang="en-US" dirty="0" smtClean="0"/>
-              <a:t>diff</a:t>
+              <a:t> diff</a:t>
             </a:r>
             <a:endParaRPr lang="en-US" dirty="0"/>
           </a:p>
@@ -8356,8 +8347,8 @@
         </p:nvSpPr>
         <p:spPr>
           <a:xfrm>
-            <a:off x="838200" y="1776845"/>
-            <a:ext cx="7401790" cy="1080655"/>
+            <a:off x="1376620" y="2082833"/>
+            <a:ext cx="2480107" cy="1080655"/>
           </a:xfrm>
         </p:spPr>
         <p:txBody>
@@ -8393,8 +8384,8 @@
         </p:nvSpPr>
         <p:spPr>
           <a:xfrm>
-            <a:off x="838200" y="3104428"/>
-            <a:ext cx="10515600" cy="1079211"/>
+            <a:off x="5834837" y="751609"/>
+            <a:ext cx="2105554" cy="1079211"/>
           </a:xfrm>
           <a:prstGeom prst="rect">
             <a:avLst/>
@@ -8446,8 +8437,8 @@
         </p:nvSpPr>
         <p:spPr>
           <a:xfrm>
-            <a:off x="838200" y="4517592"/>
-            <a:ext cx="7401790" cy="1080655"/>
+            <a:off x="5834837" y="2082833"/>
+            <a:ext cx="4142187" cy="1080655"/>
           </a:xfrm>
           <a:prstGeom prst="rect">
             <a:avLst/>
@@ -8636,9 +8627,241 @@
             </a:r>
             <a:r>
               <a:rPr lang="en-US" dirty="0" smtClean="0"/>
-              <a:t> help</a:t>
+              <a:t> </a:t>
+            </a:r>
+            <a:r>
+              <a:rPr lang="en-US" dirty="0" smtClean="0"/>
+              <a:t>help [&lt;command&gt;]</a:t>
             </a:r>
             <a:endParaRPr lang="en-US" dirty="0"/>
+          </a:p>
+        </p:txBody>
+      </p:sp>
+      <p:sp>
+        <p:nvSpPr>
+          <p:cNvPr id="6" name="TextBox 5"/>
+          <p:cNvSpPr txBox="1"/>
+          <p:nvPr/>
+        </p:nvSpPr>
+        <p:spPr>
+          <a:xfrm>
+            <a:off x="1376620" y="3166357"/>
+            <a:ext cx="2592610" cy="2031325"/>
+          </a:xfrm>
+          <a:prstGeom prst="rect">
+            <a:avLst/>
+          </a:prstGeom>
+          <a:noFill/>
+        </p:spPr>
+        <p:txBody>
+          <a:bodyPr wrap="square" rtlCol="0">
+            <a:spAutoFit/>
+          </a:bodyPr>
+          <a:lstStyle/>
+          <a:p>
+            <a:r>
+              <a:rPr lang="en-US" dirty="0" smtClean="0"/>
+              <a:t>import math</a:t>
+            </a:r>
+          </a:p>
+          <a:p>
+            <a:endParaRPr lang="en-US" dirty="0"/>
+          </a:p>
+          <a:p>
+            <a:r>
+              <a:rPr lang="en-US" dirty="0" smtClean="0"/>
+              <a:t>A = </a:t>
+            </a:r>
+            <a:r>
+              <a:rPr lang="en-US" dirty="0" err="1" smtClean="0"/>
+              <a:t>math.radians</a:t>
+            </a:r>
+            <a:r>
+              <a:rPr lang="en-US" dirty="0" smtClean="0"/>
+              <a:t>(30)</a:t>
+            </a:r>
+          </a:p>
+          <a:p>
+            <a:r>
+              <a:rPr lang="en-US" dirty="0" smtClean="0">
+                <a:solidFill>
+                  <a:srgbClr val="FF0000"/>
+                </a:solidFill>
+              </a:rPr>
+              <a:t>-B = </a:t>
+            </a:r>
+            <a:r>
+              <a:rPr lang="en-US" dirty="0" err="1" smtClean="0">
+                <a:solidFill>
+                  <a:srgbClr val="FF0000"/>
+                </a:solidFill>
+              </a:rPr>
+              <a:t>math.radians</a:t>
+            </a:r>
+            <a:r>
+              <a:rPr lang="en-US" dirty="0" smtClean="0">
+                <a:solidFill>
+                  <a:srgbClr val="FF0000"/>
+                </a:solidFill>
+              </a:rPr>
+              <a:t>(60)</a:t>
+            </a:r>
+          </a:p>
+          <a:p>
+            <a:r>
+              <a:rPr lang="en-US" dirty="0" smtClean="0">
+                <a:solidFill>
+                  <a:srgbClr val="00FF00"/>
+                </a:solidFill>
+              </a:rPr>
+              <a:t>+B = </a:t>
+            </a:r>
+            <a:r>
+              <a:rPr lang="en-US" dirty="0" err="1" smtClean="0">
+                <a:solidFill>
+                  <a:srgbClr val="00FF00"/>
+                </a:solidFill>
+              </a:rPr>
+              <a:t>math.radians</a:t>
+            </a:r>
+            <a:r>
+              <a:rPr lang="en-US" dirty="0" smtClean="0">
+                <a:solidFill>
+                  <a:srgbClr val="00FF00"/>
+                </a:solidFill>
+              </a:rPr>
+              <a:t>(90)</a:t>
+            </a:r>
+          </a:p>
+          <a:p>
+            <a:endParaRPr lang="en-US" dirty="0">
+              <a:solidFill>
+                <a:srgbClr val="00FF00"/>
+              </a:solidFill>
+            </a:endParaRPr>
+          </a:p>
+          <a:p>
+            <a:r>
+              <a:rPr lang="en-US" dirty="0" smtClean="0">
+                <a:solidFill>
+                  <a:srgbClr val="00FF00"/>
+                </a:solidFill>
+              </a:rPr>
+              <a:t>+C = </a:t>
+            </a:r>
+            <a:r>
+              <a:rPr lang="en-US" dirty="0" err="1" smtClean="0">
+                <a:solidFill>
+                  <a:srgbClr val="00FF00"/>
+                </a:solidFill>
+              </a:rPr>
+              <a:t>math.sin</a:t>
+            </a:r>
+            <a:r>
+              <a:rPr lang="en-US" dirty="0" smtClean="0">
+                <a:solidFill>
+                  <a:srgbClr val="00FF00"/>
+                </a:solidFill>
+              </a:rPr>
+              <a:t>(A)</a:t>
+            </a:r>
+          </a:p>
+        </p:txBody>
+      </p:sp>
+      <p:sp>
+        <p:nvSpPr>
+          <p:cNvPr id="7" name="TextBox 6"/>
+          <p:cNvSpPr txBox="1"/>
+          <p:nvPr/>
+        </p:nvSpPr>
+        <p:spPr>
+          <a:xfrm>
+            <a:off x="5834837" y="3166357"/>
+            <a:ext cx="5559774" cy="1754327"/>
+          </a:xfrm>
+          <a:prstGeom prst="rect">
+            <a:avLst/>
+          </a:prstGeom>
+          <a:noFill/>
+        </p:spPr>
+        <p:txBody>
+          <a:bodyPr wrap="square" rtlCol="0">
+            <a:spAutoFit/>
+          </a:bodyPr>
+          <a:lstStyle/>
+          <a:p>
+            <a:r>
+              <a:rPr lang="en-US" dirty="0" smtClean="0"/>
+              <a:t>The most commonly used </a:t>
+            </a:r>
+            <a:r>
+              <a:rPr lang="en-US" dirty="0" err="1" smtClean="0"/>
+              <a:t>git</a:t>
+            </a:r>
+            <a:r>
+              <a:rPr lang="en-US" dirty="0" smtClean="0"/>
+              <a:t> commands are:</a:t>
+            </a:r>
+          </a:p>
+          <a:p>
+            <a:r>
+              <a:rPr lang="en-US" dirty="0"/>
+              <a:t>	</a:t>
+            </a:r>
+            <a:r>
+              <a:rPr lang="en-US" dirty="0" smtClean="0"/>
+              <a:t>add</a:t>
+            </a:r>
+          </a:p>
+          <a:p>
+            <a:r>
+              <a:rPr lang="en-US" dirty="0" smtClean="0">
+                <a:latin typeface="Wingdings"/>
+                <a:ea typeface="Wingdings"/>
+                <a:cs typeface="Wingdings"/>
+                <a:sym typeface="Wingdings"/>
+              </a:rPr>
+              <a:t>	</a:t>
+            </a:r>
+            <a:endParaRPr lang="en-US" dirty="0" smtClean="0"/>
+          </a:p>
+          <a:p>
+            <a:r>
+              <a:rPr lang="en-US" dirty="0" smtClean="0"/>
+              <a:t> </a:t>
+            </a:r>
+            <a:r>
+              <a:rPr lang="en-US" dirty="0">
+                <a:latin typeface="Wingdings"/>
+                <a:ea typeface="Wingdings"/>
+                <a:cs typeface="Wingdings"/>
+                <a:sym typeface="Wingdings"/>
+              </a:rPr>
+              <a:t>	</a:t>
+            </a:r>
+            <a:endParaRPr lang="en-US" dirty="0"/>
+          </a:p>
+          <a:p>
+            <a:r>
+              <a:rPr lang="en-US" dirty="0" smtClean="0"/>
+              <a:t> </a:t>
+            </a:r>
+            <a:r>
+              <a:rPr lang="en-US" dirty="0">
+                <a:latin typeface="Wingdings"/>
+                <a:ea typeface="Wingdings"/>
+                <a:cs typeface="Wingdings"/>
+                <a:sym typeface="Wingdings"/>
+              </a:rPr>
+              <a:t>	</a:t>
+            </a:r>
+            <a:endParaRPr lang="en-US" dirty="0"/>
+          </a:p>
+          <a:p>
+            <a:r>
+              <a:rPr lang="en-US" dirty="0" smtClean="0"/>
+              <a:t>	tag</a:t>
+            </a:r>
           </a:p>
         </p:txBody>
       </p:sp>
@@ -8655,7 +8878,7 @@
   <p:timing>
     <p:tnLst>
       <p:par>
-        <p:cTn id="1" dur="indefinite" restart="never" nodeType="tmRoot"/>
+        <p:cTn xmlns:p14="http://schemas.microsoft.com/office/powerpoint/2010/main" id="1" dur="indefinite" restart="never" nodeType="tmRoot"/>
       </p:par>
     </p:tnLst>
   </p:timing>
@@ -8687,7 +8910,7 @@
         </p:nvSpPr>
         <p:spPr>
           <a:xfrm>
-            <a:off x="1007918" y="2026227"/>
+            <a:off x="961099" y="1991111"/>
             <a:ext cx="4208318" cy="4031673"/>
           </a:xfrm>
           <a:prstGeom prst="rect">
@@ -8782,7 +9005,7 @@
         <p:spPr>
           <a:xfrm>
             <a:off x="838200" y="365125"/>
-            <a:ext cx="5471160" cy="1325563"/>
+            <a:ext cx="6114444" cy="1325563"/>
           </a:xfrm>
         </p:spPr>
         <p:txBody>
@@ -8795,7 +9018,15 @@
             </a:r>
             <a:r>
               <a:rPr lang="en-US" dirty="0" smtClean="0"/>
-              <a:t> commands diagram</a:t>
+              <a:t> </a:t>
+            </a:r>
+            <a:r>
+              <a:rPr lang="en-US" dirty="0" smtClean="0"/>
+              <a:t>Commands </a:t>
+            </a:r>
+            <a:r>
+              <a:rPr lang="en-US" dirty="0" smtClean="0"/>
+              <a:t>Summary</a:t>
             </a:r>
             <a:endParaRPr lang="en-US" dirty="0"/>
           </a:p>
@@ -8851,11 +9082,6 @@
               </a:rPr>
               <a:t>Commit</a:t>
             </a:r>
-            <a:endParaRPr lang="en-US" dirty="0" smtClean="0">
-              <a:solidFill>
-                <a:srgbClr val="FF0000"/>
-              </a:solidFill>
-            </a:endParaRPr>
           </a:p>
           <a:p>
             <a:r>
@@ -9247,7 +9473,7 @@
   <p:timing>
     <p:tnLst>
       <p:par>
-        <p:cTn id="1" dur="indefinite" restart="never" nodeType="tmRoot"/>
+        <p:cTn xmlns:p14="http://schemas.microsoft.com/office/powerpoint/2010/main" id="1" dur="indefinite" restart="never" nodeType="tmRoot"/>
       </p:par>
     </p:tnLst>
   </p:timing>
@@ -9279,8 +9505,8 @@
         </p:nvSpPr>
         <p:spPr>
           <a:xfrm>
-            <a:off x="8098118" y="1211580"/>
-            <a:ext cx="3838023" cy="1864605"/>
+            <a:off x="4255334" y="1541720"/>
+            <a:ext cx="5000899" cy="2690335"/>
           </a:xfrm>
           <a:prstGeom prst="rect">
             <a:avLst/>
@@ -9326,7 +9552,12 @@
             <p:ph type="title"/>
           </p:nvPr>
         </p:nvSpPr>
-        <p:spPr/>
+        <p:spPr>
+          <a:xfrm>
+            <a:off x="838200" y="365126"/>
+            <a:ext cx="5234172" cy="1070270"/>
+          </a:xfrm>
+        </p:spPr>
         <p:txBody>
           <a:bodyPr/>
           <a:lstStyle/>
@@ -9355,8 +9586,8 @@
         </p:nvSpPr>
         <p:spPr>
           <a:xfrm>
-            <a:off x="838200" y="1825625"/>
-            <a:ext cx="2693670" cy="1250560"/>
+            <a:off x="861609" y="1691011"/>
+            <a:ext cx="2215707" cy="501724"/>
           </a:xfrm>
         </p:spPr>
         <p:txBody>
@@ -9364,26 +9595,26 @@
           <a:lstStyle/>
           <a:p>
             <a:r>
-              <a:rPr lang="en-US" dirty="0" err="1" smtClean="0"/>
+              <a:rPr lang="en-US" b="1" dirty="0" err="1" smtClean="0"/>
               <a:t>Github</a:t>
             </a:r>
             <a:r>
-              <a:rPr lang="en-US" dirty="0" smtClean="0"/>
+              <a:rPr lang="en-US" b="1" dirty="0" smtClean="0"/>
               <a:t> </a:t>
             </a:r>
             <a:r>
-              <a:rPr lang="en-US" dirty="0" smtClean="0">
+              <a:rPr lang="en-US" b="1" dirty="0" smtClean="0">
                 <a:latin typeface="Calibri" panose="020F0502020204030204" pitchFamily="34" charset="0"/>
               </a:rPr>
               <a:t>≠ </a:t>
             </a:r>
             <a:r>
-              <a:rPr lang="en-US" dirty="0" err="1" smtClean="0">
+              <a:rPr lang="en-US" b="1" dirty="0" err="1" smtClean="0">
                 <a:latin typeface="Calibri" panose="020F0502020204030204" pitchFamily="34" charset="0"/>
               </a:rPr>
               <a:t>Git</a:t>
             </a:r>
-            <a:endParaRPr lang="en-US" dirty="0"/>
+            <a:endParaRPr lang="en-US" b="1" dirty="0"/>
           </a:p>
         </p:txBody>
       </p:sp>
@@ -9403,8 +9634,8 @@
         </p:blipFill>
         <p:spPr>
           <a:xfrm>
-            <a:off x="9736524" y="1772973"/>
-            <a:ext cx="1046156" cy="1046156"/>
+            <a:off x="5911461" y="2471466"/>
+            <a:ext cx="1509440" cy="1509440"/>
           </a:xfrm>
           <a:prstGeom prst="rect">
             <a:avLst/>
@@ -9414,13 +9645,15 @@
       <p:cxnSp>
         <p:nvCxnSpPr>
           <p:cNvPr id="9" name="Straight Connector 8"/>
-          <p:cNvCxnSpPr/>
+          <p:cNvCxnSpPr>
+            <a:endCxn id="26" idx="0"/>
+          </p:cNvCxnSpPr>
           <p:nvPr/>
         </p:nvCxnSpPr>
         <p:spPr>
-          <a:xfrm flipH="1">
-            <a:off x="9178290" y="3567696"/>
-            <a:ext cx="7932" cy="901434"/>
+          <a:xfrm>
+            <a:off x="4766931" y="4755115"/>
+            <a:ext cx="2775" cy="360998"/>
           </a:xfrm>
           <a:prstGeom prst="line">
             <a:avLst/>
@@ -9445,13 +9678,15 @@
       <p:cxnSp>
         <p:nvCxnSpPr>
           <p:cNvPr id="10" name="Straight Connector 9"/>
-          <p:cNvCxnSpPr/>
+          <p:cNvCxnSpPr>
+            <a:endCxn id="27" idx="0"/>
+          </p:cNvCxnSpPr>
           <p:nvPr/>
         </p:nvCxnSpPr>
         <p:spPr>
-          <a:xfrm flipH="1" flipV="1">
-            <a:off x="11352966" y="3579802"/>
-            <a:ext cx="834" cy="889328"/>
+          <a:xfrm>
+            <a:off x="8630094" y="4737394"/>
+            <a:ext cx="15497" cy="455509"/>
           </a:xfrm>
           <a:prstGeom prst="line">
             <a:avLst/>
@@ -9480,9 +9715,9 @@
           <p:nvPr/>
         </p:nvCxnSpPr>
         <p:spPr>
-          <a:xfrm>
-            <a:off x="9178290" y="3600450"/>
-            <a:ext cx="2162624" cy="9263"/>
+          <a:xfrm flipV="1">
+            <a:off x="4737396" y="4755115"/>
+            <a:ext cx="3916325" cy="5907"/>
           </a:xfrm>
           <a:prstGeom prst="line">
             <a:avLst/>
@@ -9513,9 +9748,9 @@
           <p:nvPr/>
         </p:nvCxnSpPr>
         <p:spPr>
-          <a:xfrm flipH="1">
-            <a:off x="10237762" y="2819129"/>
-            <a:ext cx="21840" cy="787161"/>
+          <a:xfrm>
+            <a:off x="6666181" y="3980906"/>
+            <a:ext cx="14610" cy="809651"/>
           </a:xfrm>
           <a:prstGeom prst="line">
             <a:avLst/>
@@ -9545,8 +9780,8 @@
         </p:nvCxnSpPr>
         <p:spPr>
           <a:xfrm flipV="1">
-            <a:off x="7969264" y="3323132"/>
-            <a:ext cx="3966877" cy="759"/>
+            <a:off x="4126480" y="4478666"/>
+            <a:ext cx="5168794" cy="1096"/>
           </a:xfrm>
           <a:prstGeom prst="line">
             <a:avLst/>
@@ -9581,8 +9816,8 @@
         </p:nvSpPr>
         <p:spPr>
           <a:xfrm>
-            <a:off x="8098118" y="2495743"/>
-            <a:ext cx="2731770" cy="461665"/>
+            <a:off x="4343938" y="3689353"/>
+            <a:ext cx="1196806" cy="461665"/>
           </a:xfrm>
           <a:prstGeom prst="rect">
             <a:avLst/>
@@ -9619,8 +9854,8 @@
         </p:blipFill>
         <p:spPr>
           <a:xfrm>
-            <a:off x="8655212" y="4458968"/>
-            <a:ext cx="1046156" cy="1046156"/>
+            <a:off x="4014986" y="5116113"/>
+            <a:ext cx="1509440" cy="1509440"/>
           </a:xfrm>
           <a:prstGeom prst="rect">
             <a:avLst/>
@@ -9643,8 +9878,32 @@
         </p:blipFill>
         <p:spPr>
           <a:xfrm>
-            <a:off x="10829888" y="4458968"/>
-            <a:ext cx="1046156" cy="1046156"/>
+            <a:off x="7890871" y="5192903"/>
+            <a:ext cx="1509440" cy="1509440"/>
+          </a:xfrm>
+          <a:prstGeom prst="rect">
+            <a:avLst/>
+          </a:prstGeom>
+        </p:spPr>
+      </p:pic>
+      <p:pic>
+        <p:nvPicPr>
+          <p:cNvPr id="7" name="Picture 6"/>
+          <p:cNvPicPr>
+            <a:picLocks noChangeAspect="1"/>
+          </p:cNvPicPr>
+          <p:nvPr/>
+        </p:nvPicPr>
+        <p:blipFill>
+          <a:blip r:embed="rId3"/>
+          <a:stretch>
+            <a:fillRect/>
+          </a:stretch>
+        </p:blipFill>
+        <p:spPr>
+          <a:xfrm>
+            <a:off x="4054780" y="1388139"/>
+            <a:ext cx="4061406" cy="1505428"/>
           </a:xfrm>
           <a:prstGeom prst="rect">
             <a:avLst/>
@@ -9664,7 +9923,7 @@
   <p:timing>
     <p:tnLst>
       <p:par>
-        <p:cTn id="1" dur="indefinite" restart="never" nodeType="tmRoot"/>
+        <p:cTn xmlns:p14="http://schemas.microsoft.com/office/powerpoint/2010/main" id="1" dur="indefinite" restart="never" nodeType="tmRoot"/>
       </p:par>
     </p:tnLst>
   </p:timing>
@@ -9788,7 +10047,7 @@
   <p:timing>
     <p:tnLst>
       <p:par>
-        <p:cTn id="1" dur="indefinite" restart="never" nodeType="tmRoot"/>
+        <p:cTn xmlns:p14="http://schemas.microsoft.com/office/powerpoint/2010/main" id="1" dur="indefinite" restart="never" nodeType="tmRoot"/>
       </p:par>
     </p:tnLst>
   </p:timing>
@@ -9892,7 +10151,7 @@
   <p:timing>
     <p:tnLst>
       <p:par>
-        <p:cTn id="1" dur="indefinite" restart="never" nodeType="tmRoot"/>
+        <p:cTn xmlns:p14="http://schemas.microsoft.com/office/powerpoint/2010/main" id="1" dur="indefinite" restart="never" nodeType="tmRoot"/>
       </p:par>
     </p:tnLst>
   </p:timing>
@@ -9954,7 +10213,46 @@
           <a:bodyPr/>
           <a:lstStyle/>
           <a:p>
-            <a:endParaRPr lang="en-US"/>
+            <a:r>
+              <a:rPr lang="en-US" dirty="0" smtClean="0"/>
+              <a:t>Why use version contro</a:t>
+            </a:r>
+            <a:r>
+              <a:rPr lang="en-US" dirty="0" smtClean="0"/>
+              <a:t>l</a:t>
+            </a:r>
+          </a:p>
+          <a:p>
+            <a:r>
+              <a:rPr lang="en-US" dirty="0" smtClean="0"/>
+              <a:t>Distributed vs. Centralized Version Control</a:t>
+            </a:r>
+          </a:p>
+          <a:p>
+            <a:r>
+              <a:rPr lang="en-US" dirty="0" err="1" smtClean="0"/>
+              <a:t>Git</a:t>
+            </a:r>
+            <a:r>
+              <a:rPr lang="en-US" dirty="0" smtClean="0"/>
+              <a:t> concepts</a:t>
+            </a:r>
+          </a:p>
+          <a:p>
+            <a:r>
+              <a:rPr lang="en-US" dirty="0" err="1" smtClean="0"/>
+              <a:t>Git</a:t>
+            </a:r>
+            <a:r>
+              <a:rPr lang="en-US" dirty="0" smtClean="0"/>
+              <a:t> commands</a:t>
+            </a:r>
+          </a:p>
+          <a:p>
+            <a:r>
+              <a:rPr lang="en-US" dirty="0" smtClean="0"/>
+              <a:t>Additional topics</a:t>
+            </a:r>
           </a:p>
         </p:txBody>
       </p:sp>
@@ -9971,7 +10269,7 @@
   <p:timing>
     <p:tnLst>
       <p:par>
-        <p:cTn id="1" dur="indefinite" restart="never" nodeType="tmRoot"/>
+        <p:cTn xmlns:p14="http://schemas.microsoft.com/office/powerpoint/2010/main" id="1" dur="indefinite" restart="never" nodeType="tmRoot"/>
       </p:par>
     </p:tnLst>
   </p:timing>
@@ -10103,7 +10401,7 @@
   <p:timing>
     <p:tnLst>
       <p:par>
-        <p:cTn id="1" dur="indefinite" restart="never" nodeType="tmRoot">
+        <p:cTn xmlns:p14="http://schemas.microsoft.com/office/powerpoint/2010/main" id="1" dur="indefinite" restart="never" nodeType="tmRoot">
           <p:childTnLst>
             <p:seq concurrent="1" nextAc="seek">
               <p:cTn id="2" dur="indefinite" nodeType="mainSeq">
@@ -10635,7 +10933,7 @@
   <p:timing>
     <p:tnLst>
       <p:par>
-        <p:cTn id="1" dur="indefinite" restart="never" nodeType="tmRoot">
+        <p:cTn xmlns:p14="http://schemas.microsoft.com/office/powerpoint/2010/main" id="1" dur="indefinite" restart="never" nodeType="tmRoot">
           <p:childTnLst>
             <p:seq concurrent="1" nextAc="seek">
               <p:cTn id="2" dur="indefinite" nodeType="mainSeq">
@@ -11108,7 +11406,7 @@
   <p:timing>
     <p:tnLst>
       <p:par>
-        <p:cTn id="1" dur="indefinite" restart="never" nodeType="tmRoot"/>
+        <p:cTn xmlns:p14="http://schemas.microsoft.com/office/powerpoint/2010/main" id="1" dur="indefinite" restart="never" nodeType="tmRoot"/>
       </p:par>
     </p:tnLst>
   </p:timing>
@@ -11228,7 +11526,7 @@
   <p:timing>
     <p:tnLst>
       <p:par>
-        <p:cTn id="1" dur="indefinite" restart="never" nodeType="tmRoot"/>
+        <p:cTn xmlns:p14="http://schemas.microsoft.com/office/powerpoint/2010/main" id="1" dur="indefinite" restart="never" nodeType="tmRoot"/>
       </p:par>
     </p:tnLst>
   </p:timing>
@@ -11375,7 +11673,7 @@
   <p:timing>
     <p:tnLst>
       <p:par>
-        <p:cTn id="1" dur="indefinite" restart="never" nodeType="tmRoot"/>
+        <p:cTn xmlns:p14="http://schemas.microsoft.com/office/powerpoint/2010/main" id="1" dur="indefinite" restart="never" nodeType="tmRoot"/>
       </p:par>
     </p:tnLst>
   </p:timing>
@@ -12097,7 +12395,7 @@
   <p:timing>
     <p:tnLst>
       <p:par>
-        <p:cTn id="1" dur="indefinite" restart="never" nodeType="tmRoot">
+        <p:cTn xmlns:p14="http://schemas.microsoft.com/office/powerpoint/2010/main" id="1" dur="indefinite" restart="never" nodeType="tmRoot">
           <p:childTnLst>
             <p:seq concurrent="1" nextAc="seek">
               <p:cTn id="2" dur="indefinite" nodeType="mainSeq">
@@ -13581,7 +13879,7 @@
   <p:timing>
     <p:tnLst>
       <p:par>
-        <p:cTn id="1" dur="indefinite" restart="never" nodeType="tmRoot">
+        <p:cTn xmlns:p14="http://schemas.microsoft.com/office/powerpoint/2010/main" id="1" dur="indefinite" restart="never" nodeType="tmRoot">
           <p:childTnLst>
             <p:seq concurrent="1" nextAc="seek">
               <p:cTn id="2" dur="indefinite" nodeType="mainSeq">
@@ -14643,7 +14941,7 @@
   <a:extraClrSchemeLst/>
   <a:extLst>
     <a:ext uri="{05A4C25C-085E-4340-85A3-A5531E510DB2}">
-      <thm15:themeFamily xmlns:thm15="http://schemas.microsoft.com/office/thememl/2012/main" name="Office Theme" id="{62F939B6-93AF-4DB8-9C6B-D6C7DFDC589F}" vid="{4A3C46E8-61CC-4603-A589-7422A47A8E4A}"/>
+      <thm15:themeFamily xmlns:thm15="http://schemas.microsoft.com/office/thememl/2012/main" xmlns="" name="Office Theme" id="{62F939B6-93AF-4DB8-9C6B-D6C7DFDC589F}" vid="{4A3C46E8-61CC-4603-A589-7422A47A8E4A}"/>
     </a:ext>
   </a:extLst>
 </a:theme>
@@ -14692,7 +14990,7 @@
     </a:clrScheme>
     <a:fontScheme name="Office">
       <a:majorFont>
-        <a:latin typeface="Calibri Light" panose="020F0302020204030204"/>
+        <a:latin typeface="Calibri Light"/>
         <a:ea typeface=""/>
         <a:cs typeface=""/>
         <a:font script="Jpan" typeface="ＭＳ Ｐゴシック"/>
@@ -14727,7 +15025,7 @@
         <a:font script="Geor" typeface="Sylfaen"/>
       </a:majorFont>
       <a:minorFont>
-        <a:latin typeface="Calibri" panose="020F0502020204030204"/>
+        <a:latin typeface="Calibri"/>
         <a:ea typeface=""/>
         <a:cs typeface=""/>
         <a:font script="Jpan" typeface="ＭＳ Ｐゴシック"/>
@@ -14904,7 +15202,7 @@
   <a:extraClrSchemeLst/>
   <a:extLst>
     <a:ext uri="{05A4C25C-085E-4340-85A3-A5531E510DB2}">
-      <thm15:themeFamily xmlns:thm15="http://schemas.microsoft.com/office/thememl/2012/main" name="Office Theme" id="{62F939B6-93AF-4DB8-9C6B-D6C7DFDC589F}" vid="{4A3C46E8-61CC-4603-A589-7422A47A8E4A}"/>
+      <thm15:themeFamily xmlns:thm15="http://schemas.microsoft.com/office/thememl/2012/main" xmlns="" name="Office Theme" id="{62F939B6-93AF-4DB8-9C6B-D6C7DFDC589F}" vid="{4A3C46E8-61CC-4603-A589-7422A47A8E4A}"/>
     </a:ext>
   </a:extLst>
 </a:theme>

</xml_diff>